<commit_message>
Cleaned up Lesson 1
Reorganized slides in Lesson 1, moved SysLog to Lesson 8.

Fixed layout in multiple slides, added comments and explanations to some that needed it. Also updated a few screenshots, taking them from another presentation.
</commit_message>
<xml_diff>
--- a/Trunk/Getting Started Material/DCAF Training/8 Debugging DCAF.pptx
+++ b/Trunk/Getting Started Material/DCAF Training/8 Debugging DCAF.pptx
@@ -4,11 +4,17 @@
   <p:sldMasterIdLst>
     <p:sldMasterId id="2147483648" r:id="rId1"/>
   </p:sldMasterIdLst>
+  <p:notesMasterIdLst>
+    <p:notesMasterId r:id="rId9"/>
+  </p:notesMasterIdLst>
   <p:sldIdLst>
     <p:sldId id="256" r:id="rId2"/>
     <p:sldId id="257" r:id="rId3"/>
-    <p:sldId id="284" r:id="rId4"/>
-    <p:sldId id="285" r:id="rId5"/>
+    <p:sldId id="280" r:id="rId4"/>
+    <p:sldId id="279" r:id="rId5"/>
+    <p:sldId id="284" r:id="rId6"/>
+    <p:sldId id="285" r:id="rId7"/>
+    <p:sldId id="359" r:id="rId8"/>
   </p:sldIdLst>
   <p:sldSz cx="12192000" cy="6858000"/>
   <p:notesSz cx="6858000" cy="9144000"/>
@@ -115,6 +121,442 @@
 </p:presentation>
 </file>
 
+<file path=ppt/notesMasters/notesMaster1.xml><?xml version="1.0" encoding="utf-8"?>
+<p:notesMaster xmlns:a="http://schemas.openxmlformats.org/drawingml/2006/main" xmlns:r="http://schemas.openxmlformats.org/officeDocument/2006/relationships" xmlns:p="http://schemas.openxmlformats.org/presentationml/2006/main">
+  <p:cSld>
+    <p:bg>
+      <p:bgRef idx="1001">
+        <a:schemeClr val="bg1"/>
+      </p:bgRef>
+    </p:bg>
+    <p:spTree>
+      <p:nvGrpSpPr>
+        <p:cNvPr id="1" name=""/>
+        <p:cNvGrpSpPr/>
+        <p:nvPr/>
+      </p:nvGrpSpPr>
+      <p:grpSpPr>
+        <a:xfrm>
+          <a:off x="0" y="0"/>
+          <a:ext cx="0" cy="0"/>
+          <a:chOff x="0" y="0"/>
+          <a:chExt cx="0" cy="0"/>
+        </a:xfrm>
+      </p:grpSpPr>
+      <p:sp>
+        <p:nvSpPr>
+          <p:cNvPr id="2" name="Header Placeholder 1"/>
+          <p:cNvSpPr>
+            <a:spLocks noGrp="1"/>
+          </p:cNvSpPr>
+          <p:nvPr>
+            <p:ph type="hdr" sz="quarter"/>
+          </p:nvPr>
+        </p:nvSpPr>
+        <p:spPr>
+          <a:xfrm>
+            <a:off x="0" y="0"/>
+            <a:ext cx="2971800" cy="458788"/>
+          </a:xfrm>
+          <a:prstGeom prst="rect">
+            <a:avLst/>
+          </a:prstGeom>
+        </p:spPr>
+        <p:txBody>
+          <a:bodyPr vert="horz" lIns="91440" tIns="45720" rIns="91440" bIns="45720" rtlCol="0"/>
+          <a:lstStyle>
+            <a:lvl1pPr algn="l">
+              <a:defRPr sz="1200"/>
+            </a:lvl1pPr>
+          </a:lstStyle>
+          <a:p>
+            <a:endParaRPr lang="en-US"/>
+          </a:p>
+        </p:txBody>
+      </p:sp>
+      <p:sp>
+        <p:nvSpPr>
+          <p:cNvPr id="3" name="Date Placeholder 2"/>
+          <p:cNvSpPr>
+            <a:spLocks noGrp="1"/>
+          </p:cNvSpPr>
+          <p:nvPr>
+            <p:ph type="dt" idx="1"/>
+          </p:nvPr>
+        </p:nvSpPr>
+        <p:spPr>
+          <a:xfrm>
+            <a:off x="3884613" y="0"/>
+            <a:ext cx="2971800" cy="458788"/>
+          </a:xfrm>
+          <a:prstGeom prst="rect">
+            <a:avLst/>
+          </a:prstGeom>
+        </p:spPr>
+        <p:txBody>
+          <a:bodyPr vert="horz" lIns="91440" tIns="45720" rIns="91440" bIns="45720" rtlCol="0"/>
+          <a:lstStyle>
+            <a:lvl1pPr algn="r">
+              <a:defRPr sz="1200"/>
+            </a:lvl1pPr>
+          </a:lstStyle>
+          <a:p>
+            <a:fld id="{E3E5E4E2-2D1E-49FF-9D26-9043035DAE61}" type="datetimeFigureOut">
+              <a:rPr lang="en-US" smtClean="0"/>
+              <a:t>2018-06-12</a:t>
+            </a:fld>
+            <a:endParaRPr lang="en-US"/>
+          </a:p>
+        </p:txBody>
+      </p:sp>
+      <p:sp>
+        <p:nvSpPr>
+          <p:cNvPr id="4" name="Slide Image Placeholder 3"/>
+          <p:cNvSpPr>
+            <a:spLocks noGrp="1" noRot="1" noChangeAspect="1"/>
+          </p:cNvSpPr>
+          <p:nvPr>
+            <p:ph type="sldImg" idx="2"/>
+          </p:nvPr>
+        </p:nvSpPr>
+        <p:spPr>
+          <a:xfrm>
+            <a:off x="685800" y="1143000"/>
+            <a:ext cx="5486400" cy="3086100"/>
+          </a:xfrm>
+          <a:prstGeom prst="rect">
+            <a:avLst/>
+          </a:prstGeom>
+          <a:noFill/>
+          <a:ln w="12700">
+            <a:solidFill>
+              <a:prstClr val="black"/>
+            </a:solidFill>
+          </a:ln>
+        </p:spPr>
+        <p:txBody>
+          <a:bodyPr vert="horz" lIns="91440" tIns="45720" rIns="91440" bIns="45720" rtlCol="0" anchor="ctr"/>
+          <a:lstStyle/>
+          <a:p>
+            <a:endParaRPr lang="en-US"/>
+          </a:p>
+        </p:txBody>
+      </p:sp>
+      <p:sp>
+        <p:nvSpPr>
+          <p:cNvPr id="5" name="Notes Placeholder 4"/>
+          <p:cNvSpPr>
+            <a:spLocks noGrp="1"/>
+          </p:cNvSpPr>
+          <p:nvPr>
+            <p:ph type="body" sz="quarter" idx="3"/>
+          </p:nvPr>
+        </p:nvSpPr>
+        <p:spPr>
+          <a:xfrm>
+            <a:off x="685800" y="4400550"/>
+            <a:ext cx="5486400" cy="3600450"/>
+          </a:xfrm>
+          <a:prstGeom prst="rect">
+            <a:avLst/>
+          </a:prstGeom>
+        </p:spPr>
+        <p:txBody>
+          <a:bodyPr vert="horz" lIns="91440" tIns="45720" rIns="91440" bIns="45720" rtlCol="0"/>
+          <a:lstStyle/>
+          <a:p>
+            <a:pPr lvl="0"/>
+            <a:r>
+              <a:rPr lang="en-US"/>
+              <a:t>Edit Master text styles</a:t>
+            </a:r>
+          </a:p>
+          <a:p>
+            <a:pPr lvl="1"/>
+            <a:r>
+              <a:rPr lang="en-US"/>
+              <a:t>Second level</a:t>
+            </a:r>
+          </a:p>
+          <a:p>
+            <a:pPr lvl="2"/>
+            <a:r>
+              <a:rPr lang="en-US"/>
+              <a:t>Third level</a:t>
+            </a:r>
+          </a:p>
+          <a:p>
+            <a:pPr lvl="3"/>
+            <a:r>
+              <a:rPr lang="en-US"/>
+              <a:t>Fourth level</a:t>
+            </a:r>
+          </a:p>
+          <a:p>
+            <a:pPr lvl="4"/>
+            <a:r>
+              <a:rPr lang="en-US"/>
+              <a:t>Fifth level</a:t>
+            </a:r>
+          </a:p>
+        </p:txBody>
+      </p:sp>
+      <p:sp>
+        <p:nvSpPr>
+          <p:cNvPr id="6" name="Footer Placeholder 5"/>
+          <p:cNvSpPr>
+            <a:spLocks noGrp="1"/>
+          </p:cNvSpPr>
+          <p:nvPr>
+            <p:ph type="ftr" sz="quarter" idx="4"/>
+          </p:nvPr>
+        </p:nvSpPr>
+        <p:spPr>
+          <a:xfrm>
+            <a:off x="0" y="8685213"/>
+            <a:ext cx="2971800" cy="458787"/>
+          </a:xfrm>
+          <a:prstGeom prst="rect">
+            <a:avLst/>
+          </a:prstGeom>
+        </p:spPr>
+        <p:txBody>
+          <a:bodyPr vert="horz" lIns="91440" tIns="45720" rIns="91440" bIns="45720" rtlCol="0" anchor="b"/>
+          <a:lstStyle>
+            <a:lvl1pPr algn="l">
+              <a:defRPr sz="1200"/>
+            </a:lvl1pPr>
+          </a:lstStyle>
+          <a:p>
+            <a:endParaRPr lang="en-US"/>
+          </a:p>
+        </p:txBody>
+      </p:sp>
+      <p:sp>
+        <p:nvSpPr>
+          <p:cNvPr id="7" name="Slide Number Placeholder 6"/>
+          <p:cNvSpPr>
+            <a:spLocks noGrp="1"/>
+          </p:cNvSpPr>
+          <p:nvPr>
+            <p:ph type="sldNum" sz="quarter" idx="5"/>
+          </p:nvPr>
+        </p:nvSpPr>
+        <p:spPr>
+          <a:xfrm>
+            <a:off x="3884613" y="8685213"/>
+            <a:ext cx="2971800" cy="458787"/>
+          </a:xfrm>
+          <a:prstGeom prst="rect">
+            <a:avLst/>
+          </a:prstGeom>
+        </p:spPr>
+        <p:txBody>
+          <a:bodyPr vert="horz" lIns="91440" tIns="45720" rIns="91440" bIns="45720" rtlCol="0" anchor="b"/>
+          <a:lstStyle>
+            <a:lvl1pPr algn="r">
+              <a:defRPr sz="1200"/>
+            </a:lvl1pPr>
+          </a:lstStyle>
+          <a:p>
+            <a:fld id="{6BFF3EFC-B7E2-4F0E-9300-F6EC17A9DE76}" type="slidenum">
+              <a:rPr lang="en-US" smtClean="0"/>
+              <a:t>‹#›</a:t>
+            </a:fld>
+            <a:endParaRPr lang="en-US"/>
+          </a:p>
+        </p:txBody>
+      </p:sp>
+    </p:spTree>
+    <p:extLst>
+      <p:ext uri="{BB962C8B-B14F-4D97-AF65-F5344CB8AC3E}">
+        <p14:creationId xmlns:p14="http://schemas.microsoft.com/office/powerpoint/2010/main" val="1409604420"/>
+      </p:ext>
+    </p:extLst>
+  </p:cSld>
+  <p:clrMap bg1="lt1" tx1="dk1" bg2="lt2" tx2="dk2" accent1="accent1" accent2="accent2" accent3="accent3" accent4="accent4" accent5="accent5" accent6="accent6" hlink="hlink" folHlink="folHlink"/>
+  <p:notesStyle>
+    <a:lvl1pPr marL="0" algn="l" defTabSz="914400" rtl="0" eaLnBrk="1" latinLnBrk="0" hangingPunct="1">
+      <a:defRPr sz="1200" kern="1200">
+        <a:solidFill>
+          <a:schemeClr val="tx1"/>
+        </a:solidFill>
+        <a:latin typeface="+mn-lt"/>
+        <a:ea typeface="+mn-ea"/>
+        <a:cs typeface="+mn-cs"/>
+      </a:defRPr>
+    </a:lvl1pPr>
+    <a:lvl2pPr marL="457200" algn="l" defTabSz="914400" rtl="0" eaLnBrk="1" latinLnBrk="0" hangingPunct="1">
+      <a:defRPr sz="1200" kern="1200">
+        <a:solidFill>
+          <a:schemeClr val="tx1"/>
+        </a:solidFill>
+        <a:latin typeface="+mn-lt"/>
+        <a:ea typeface="+mn-ea"/>
+        <a:cs typeface="+mn-cs"/>
+      </a:defRPr>
+    </a:lvl2pPr>
+    <a:lvl3pPr marL="914400" algn="l" defTabSz="914400" rtl="0" eaLnBrk="1" latinLnBrk="0" hangingPunct="1">
+      <a:defRPr sz="1200" kern="1200">
+        <a:solidFill>
+          <a:schemeClr val="tx1"/>
+        </a:solidFill>
+        <a:latin typeface="+mn-lt"/>
+        <a:ea typeface="+mn-ea"/>
+        <a:cs typeface="+mn-cs"/>
+      </a:defRPr>
+    </a:lvl3pPr>
+    <a:lvl4pPr marL="1371600" algn="l" defTabSz="914400" rtl="0" eaLnBrk="1" latinLnBrk="0" hangingPunct="1">
+      <a:defRPr sz="1200" kern="1200">
+        <a:solidFill>
+          <a:schemeClr val="tx1"/>
+        </a:solidFill>
+        <a:latin typeface="+mn-lt"/>
+        <a:ea typeface="+mn-ea"/>
+        <a:cs typeface="+mn-cs"/>
+      </a:defRPr>
+    </a:lvl4pPr>
+    <a:lvl5pPr marL="1828800" algn="l" defTabSz="914400" rtl="0" eaLnBrk="1" latinLnBrk="0" hangingPunct="1">
+      <a:defRPr sz="1200" kern="1200">
+        <a:solidFill>
+          <a:schemeClr val="tx1"/>
+        </a:solidFill>
+        <a:latin typeface="+mn-lt"/>
+        <a:ea typeface="+mn-ea"/>
+        <a:cs typeface="+mn-cs"/>
+      </a:defRPr>
+    </a:lvl5pPr>
+    <a:lvl6pPr marL="2286000" algn="l" defTabSz="914400" rtl="0" eaLnBrk="1" latinLnBrk="0" hangingPunct="1">
+      <a:defRPr sz="1200" kern="1200">
+        <a:solidFill>
+          <a:schemeClr val="tx1"/>
+        </a:solidFill>
+        <a:latin typeface="+mn-lt"/>
+        <a:ea typeface="+mn-ea"/>
+        <a:cs typeface="+mn-cs"/>
+      </a:defRPr>
+    </a:lvl6pPr>
+    <a:lvl7pPr marL="2743200" algn="l" defTabSz="914400" rtl="0" eaLnBrk="1" latinLnBrk="0" hangingPunct="1">
+      <a:defRPr sz="1200" kern="1200">
+        <a:solidFill>
+          <a:schemeClr val="tx1"/>
+        </a:solidFill>
+        <a:latin typeface="+mn-lt"/>
+        <a:ea typeface="+mn-ea"/>
+        <a:cs typeface="+mn-cs"/>
+      </a:defRPr>
+    </a:lvl7pPr>
+    <a:lvl8pPr marL="3200400" algn="l" defTabSz="914400" rtl="0" eaLnBrk="1" latinLnBrk="0" hangingPunct="1">
+      <a:defRPr sz="1200" kern="1200">
+        <a:solidFill>
+          <a:schemeClr val="tx1"/>
+        </a:solidFill>
+        <a:latin typeface="+mn-lt"/>
+        <a:ea typeface="+mn-ea"/>
+        <a:cs typeface="+mn-cs"/>
+      </a:defRPr>
+    </a:lvl8pPr>
+    <a:lvl9pPr marL="3657600" algn="l" defTabSz="914400" rtl="0" eaLnBrk="1" latinLnBrk="0" hangingPunct="1">
+      <a:defRPr sz="1200" kern="1200">
+        <a:solidFill>
+          <a:schemeClr val="tx1"/>
+        </a:solidFill>
+        <a:latin typeface="+mn-lt"/>
+        <a:ea typeface="+mn-ea"/>
+        <a:cs typeface="+mn-cs"/>
+      </a:defRPr>
+    </a:lvl9pPr>
+  </p:notesStyle>
+</p:notesMaster>
+</file>
+
+<file path=ppt/notesSlides/notesSlide1.xml><?xml version="1.0" encoding="utf-8"?>
+<p:notes xmlns:a="http://schemas.openxmlformats.org/drawingml/2006/main" xmlns:r="http://schemas.openxmlformats.org/officeDocument/2006/relationships" xmlns:p="http://schemas.openxmlformats.org/presentationml/2006/main">
+  <p:cSld>
+    <p:spTree>
+      <p:nvGrpSpPr>
+        <p:cNvPr id="1" name=""/>
+        <p:cNvGrpSpPr/>
+        <p:nvPr/>
+      </p:nvGrpSpPr>
+      <p:grpSpPr>
+        <a:xfrm>
+          <a:off x="0" y="0"/>
+          <a:ext cx="0" cy="0"/>
+          <a:chOff x="0" y="0"/>
+          <a:chExt cx="0" cy="0"/>
+        </a:xfrm>
+      </p:grpSpPr>
+      <p:sp>
+        <p:nvSpPr>
+          <p:cNvPr id="2" name="Slide Image Placeholder 1"/>
+          <p:cNvSpPr>
+            <a:spLocks noGrp="1" noRot="1" noChangeAspect="1"/>
+          </p:cNvSpPr>
+          <p:nvPr>
+            <p:ph type="sldImg"/>
+          </p:nvPr>
+        </p:nvSpPr>
+        <p:spPr/>
+      </p:sp>
+      <p:sp>
+        <p:nvSpPr>
+          <p:cNvPr id="3" name="Notes Placeholder 2"/>
+          <p:cNvSpPr>
+            <a:spLocks noGrp="1"/>
+          </p:cNvSpPr>
+          <p:nvPr>
+            <p:ph type="body" idx="1"/>
+          </p:nvPr>
+        </p:nvSpPr>
+        <p:spPr/>
+        <p:txBody>
+          <a:bodyPr/>
+          <a:lstStyle/>
+          <a:p>
+            <a:r>
+              <a:rPr lang="en-US" dirty="0"/>
+              <a:t>Add WIF</a:t>
+            </a:r>
+          </a:p>
+        </p:txBody>
+      </p:sp>
+      <p:sp>
+        <p:nvSpPr>
+          <p:cNvPr id="4" name="Slide Number Placeholder 3"/>
+          <p:cNvSpPr>
+            <a:spLocks noGrp="1"/>
+          </p:cNvSpPr>
+          <p:nvPr>
+            <p:ph type="sldNum" sz="quarter" idx="10"/>
+          </p:nvPr>
+        </p:nvSpPr>
+        <p:spPr/>
+        <p:txBody>
+          <a:bodyPr/>
+          <a:lstStyle/>
+          <a:p>
+            <a:fld id="{851B3976-BA5C-4172-B420-FFE6D6004C76}" type="slidenum">
+              <a:rPr lang="en-US" smtClean="0"/>
+              <a:t>7</a:t>
+            </a:fld>
+            <a:endParaRPr lang="en-US" dirty="0"/>
+          </a:p>
+        </p:txBody>
+      </p:sp>
+    </p:spTree>
+    <p:extLst>
+      <p:ext uri="{BB962C8B-B14F-4D97-AF65-F5344CB8AC3E}">
+        <p14:creationId xmlns:p14="http://schemas.microsoft.com/office/powerpoint/2010/main" val="2158053664"/>
+      </p:ext>
+    </p:extLst>
+  </p:cSld>
+  <p:clrMapOvr>
+    <a:masterClrMapping/>
+  </p:clrMapOvr>
+</p:notes>
+</file>
+
 <file path=ppt/slideLayouts/slideLayout1.xml><?xml version="1.0" encoding="utf-8"?>
 <p:sldLayout xmlns:a="http://schemas.openxmlformats.org/drawingml/2006/main" xmlns:r="http://schemas.openxmlformats.org/officeDocument/2006/relationships" xmlns:p="http://schemas.openxmlformats.org/presentationml/2006/main" type="title" preserve="1">
   <p:cSld name="Title Slide">
@@ -262,7 +704,7 @@
           <a:p>
             <a:fld id="{86E674FB-04A2-4C43-8E96-48380D248600}" type="datetimeFigureOut">
               <a:rPr lang="en-US" smtClean="0"/>
-              <a:t>6/6/2018</a:t>
+              <a:t>2018-06-12</a:t>
             </a:fld>
             <a:endParaRPr lang="en-US"/>
           </a:p>
@@ -460,7 +902,7 @@
           <a:p>
             <a:fld id="{86E674FB-04A2-4C43-8E96-48380D248600}" type="datetimeFigureOut">
               <a:rPr lang="en-US" smtClean="0"/>
-              <a:t>6/6/2018</a:t>
+              <a:t>2018-06-12</a:t>
             </a:fld>
             <a:endParaRPr lang="en-US"/>
           </a:p>
@@ -668,7 +1110,7 @@
           <a:p>
             <a:fld id="{86E674FB-04A2-4C43-8E96-48380D248600}" type="datetimeFigureOut">
               <a:rPr lang="en-US" smtClean="0"/>
-              <a:t>6/6/2018</a:t>
+              <a:t>2018-06-12</a:t>
             </a:fld>
             <a:endParaRPr lang="en-US"/>
           </a:p>
@@ -866,7 +1308,7 @@
           <a:p>
             <a:fld id="{86E674FB-04A2-4C43-8E96-48380D248600}" type="datetimeFigureOut">
               <a:rPr lang="en-US" smtClean="0"/>
-              <a:t>6/6/2018</a:t>
+              <a:t>2018-06-12</a:t>
             </a:fld>
             <a:endParaRPr lang="en-US"/>
           </a:p>
@@ -1141,7 +1583,7 @@
           <a:p>
             <a:fld id="{86E674FB-04A2-4C43-8E96-48380D248600}" type="datetimeFigureOut">
               <a:rPr lang="en-US" smtClean="0"/>
-              <a:t>6/6/2018</a:t>
+              <a:t>2018-06-12</a:t>
             </a:fld>
             <a:endParaRPr lang="en-US"/>
           </a:p>
@@ -1406,7 +1848,7 @@
           <a:p>
             <a:fld id="{86E674FB-04A2-4C43-8E96-48380D248600}" type="datetimeFigureOut">
               <a:rPr lang="en-US" smtClean="0"/>
-              <a:t>6/6/2018</a:t>
+              <a:t>2018-06-12</a:t>
             </a:fld>
             <a:endParaRPr lang="en-US"/>
           </a:p>
@@ -1818,7 +2260,7 @@
           <a:p>
             <a:fld id="{86E674FB-04A2-4C43-8E96-48380D248600}" type="datetimeFigureOut">
               <a:rPr lang="en-US" smtClean="0"/>
-              <a:t>6/6/2018</a:t>
+              <a:t>2018-06-12</a:t>
             </a:fld>
             <a:endParaRPr lang="en-US"/>
           </a:p>
@@ -1959,7 +2401,7 @@
           <a:p>
             <a:fld id="{86E674FB-04A2-4C43-8E96-48380D248600}" type="datetimeFigureOut">
               <a:rPr lang="en-US" smtClean="0"/>
-              <a:t>6/6/2018</a:t>
+              <a:t>2018-06-12</a:t>
             </a:fld>
             <a:endParaRPr lang="en-US"/>
           </a:p>
@@ -2072,7 +2514,7 @@
           <a:p>
             <a:fld id="{86E674FB-04A2-4C43-8E96-48380D248600}" type="datetimeFigureOut">
               <a:rPr lang="en-US" smtClean="0"/>
-              <a:t>6/6/2018</a:t>
+              <a:t>2018-06-12</a:t>
             </a:fld>
             <a:endParaRPr lang="en-US"/>
           </a:p>
@@ -2383,7 +2825,7 @@
           <a:p>
             <a:fld id="{86E674FB-04A2-4C43-8E96-48380D248600}" type="datetimeFigureOut">
               <a:rPr lang="en-US" smtClean="0"/>
-              <a:t>6/6/2018</a:t>
+              <a:t>2018-06-12</a:t>
             </a:fld>
             <a:endParaRPr lang="en-US"/>
           </a:p>
@@ -2671,7 +3113,7 @@
           <a:p>
             <a:fld id="{86E674FB-04A2-4C43-8E96-48380D248600}" type="datetimeFigureOut">
               <a:rPr lang="en-US" smtClean="0"/>
-              <a:t>6/6/2018</a:t>
+              <a:t>2018-06-12</a:t>
             </a:fld>
             <a:endParaRPr lang="en-US"/>
           </a:p>
@@ -2912,7 +3354,7 @@
           <a:p>
             <a:fld id="{86E674FB-04A2-4C43-8E96-48380D248600}" type="datetimeFigureOut">
               <a:rPr lang="en-US" smtClean="0"/>
-              <a:t>6/6/2018</a:t>
+              <a:t>2018-06-12</a:t>
             </a:fld>
             <a:endParaRPr lang="en-US"/>
           </a:p>
@@ -3549,7 +3991,261 @@
           <a:p>
             <a:r>
               <a:rPr lang="en-US" dirty="0"/>
-              <a:t>System Log View</a:t>
+              <a:t>Error Management</a:t>
+            </a:r>
+          </a:p>
+        </p:txBody>
+      </p:sp>
+      <p:pic>
+        <p:nvPicPr>
+          <p:cNvPr id="4" name="Content Placeholder 3"/>
+          <p:cNvPicPr>
+            <a:picLocks noGrp="1" noChangeAspect="1"/>
+          </p:cNvPicPr>
+          <p:nvPr>
+            <p:ph idx="1"/>
+          </p:nvPr>
+        </p:nvPicPr>
+        <p:blipFill>
+          <a:blip r:embed="rId2"/>
+          <a:stretch>
+            <a:fillRect/>
+          </a:stretch>
+        </p:blipFill>
+        <p:spPr>
+          <a:xfrm>
+            <a:off x="7435371" y="1888576"/>
+            <a:ext cx="3133725" cy="3514725"/>
+          </a:xfrm>
+          <a:prstGeom prst="rect">
+            <a:avLst/>
+          </a:prstGeom>
+        </p:spPr>
+      </p:pic>
+      <p:pic>
+        <p:nvPicPr>
+          <p:cNvPr id="5" name="Picture 4"/>
+          <p:cNvPicPr>
+            <a:picLocks noChangeAspect="1"/>
+          </p:cNvPicPr>
+          <p:nvPr/>
+        </p:nvPicPr>
+        <p:blipFill>
+          <a:blip r:embed="rId3"/>
+          <a:stretch>
+            <a:fillRect/>
+          </a:stretch>
+        </p:blipFill>
+        <p:spPr>
+          <a:xfrm>
+            <a:off x="2584069" y="1690688"/>
+            <a:ext cx="2762250" cy="2447925"/>
+          </a:xfrm>
+          <a:prstGeom prst="rect">
+            <a:avLst/>
+          </a:prstGeom>
+        </p:spPr>
+      </p:pic>
+      <p:pic>
+        <p:nvPicPr>
+          <p:cNvPr id="6" name="Picture 5"/>
+          <p:cNvPicPr>
+            <a:picLocks noChangeAspect="1"/>
+          </p:cNvPicPr>
+          <p:nvPr/>
+        </p:nvPicPr>
+        <p:blipFill>
+          <a:blip r:embed="rId4"/>
+          <a:stretch>
+            <a:fillRect/>
+          </a:stretch>
+        </p:blipFill>
+        <p:spPr>
+          <a:xfrm>
+            <a:off x="845757" y="4388137"/>
+            <a:ext cx="6238875" cy="1809750"/>
+          </a:xfrm>
+          <a:prstGeom prst="rect">
+            <a:avLst/>
+          </a:prstGeom>
+        </p:spPr>
+      </p:pic>
+    </p:spTree>
+    <p:extLst>
+      <p:ext uri="{BB962C8B-B14F-4D97-AF65-F5344CB8AC3E}">
+        <p14:creationId xmlns:p14="http://schemas.microsoft.com/office/powerpoint/2010/main" val="124256229"/>
+      </p:ext>
+    </p:extLst>
+  </p:cSld>
+  <p:clrMapOvr>
+    <a:masterClrMapping/>
+  </p:clrMapOvr>
+</p:sld>
+</file>
+
+<file path=ppt/slides/slide4.xml><?xml version="1.0" encoding="utf-8"?>
+<p:sld xmlns:a="http://schemas.openxmlformats.org/drawingml/2006/main" xmlns:r="http://schemas.openxmlformats.org/officeDocument/2006/relationships" xmlns:p="http://schemas.openxmlformats.org/presentationml/2006/main">
+  <p:cSld>
+    <p:spTree>
+      <p:nvGrpSpPr>
+        <p:cNvPr id="1" name=""/>
+        <p:cNvGrpSpPr/>
+        <p:nvPr/>
+      </p:nvGrpSpPr>
+      <p:grpSpPr>
+        <a:xfrm>
+          <a:off x="0" y="0"/>
+          <a:ext cx="0" cy="0"/>
+          <a:chOff x="0" y="0"/>
+          <a:chExt cx="0" cy="0"/>
+        </a:xfrm>
+      </p:grpSpPr>
+      <p:sp>
+        <p:nvSpPr>
+          <p:cNvPr id="2" name="Title 1"/>
+          <p:cNvSpPr>
+            <a:spLocks noGrp="1"/>
+          </p:cNvSpPr>
+          <p:nvPr>
+            <p:ph type="title"/>
+          </p:nvPr>
+        </p:nvSpPr>
+        <p:spPr/>
+        <p:txBody>
+          <a:bodyPr/>
+          <a:lstStyle/>
+          <a:p>
+            <a:r>
+              <a:rPr lang="en-US" dirty="0"/>
+              <a:t>Syslog</a:t>
+            </a:r>
+          </a:p>
+        </p:txBody>
+      </p:sp>
+      <p:sp>
+        <p:nvSpPr>
+          <p:cNvPr id="3" name="Content Placeholder 2"/>
+          <p:cNvSpPr>
+            <a:spLocks noGrp="1"/>
+          </p:cNvSpPr>
+          <p:nvPr>
+            <p:ph idx="1"/>
+          </p:nvPr>
+        </p:nvSpPr>
+        <p:spPr/>
+        <p:txBody>
+          <a:bodyPr/>
+          <a:lstStyle/>
+          <a:p>
+            <a:r>
+              <a:rPr lang="en-US" dirty="0"/>
+              <a:t>Available in Linux RT Targets</a:t>
+            </a:r>
+          </a:p>
+          <a:p>
+            <a:r>
+              <a:rPr lang="en-US" dirty="0"/>
+              <a:t>Event sent to Log:</a:t>
+            </a:r>
+          </a:p>
+          <a:p>
+            <a:pPr lvl="1"/>
+            <a:r>
+              <a:rPr lang="en-US" dirty="0"/>
+              <a:t>Initialization and shutdown of all software modules</a:t>
+            </a:r>
+          </a:p>
+          <a:p>
+            <a:pPr lvl="1"/>
+            <a:r>
+              <a:rPr lang="en-US" dirty="0"/>
+              <a:t>Any error reported to the engine</a:t>
+            </a:r>
+          </a:p>
+          <a:p>
+            <a:pPr lvl="1"/>
+            <a:r>
+              <a:rPr lang="en-US" dirty="0"/>
+              <a:t>Any module trace messages added via the API</a:t>
+            </a:r>
+          </a:p>
+          <a:p>
+            <a:endParaRPr lang="en-US" dirty="0"/>
+          </a:p>
+        </p:txBody>
+      </p:sp>
+      <p:pic>
+        <p:nvPicPr>
+          <p:cNvPr id="5" name="Picture 4"/>
+          <p:cNvPicPr>
+            <a:picLocks noChangeAspect="1"/>
+          </p:cNvPicPr>
+          <p:nvPr/>
+        </p:nvPicPr>
+        <p:blipFill>
+          <a:blip r:embed="rId2"/>
+          <a:stretch>
+            <a:fillRect/>
+          </a:stretch>
+        </p:blipFill>
+        <p:spPr>
+          <a:xfrm>
+            <a:off x="765507" y="4436698"/>
+            <a:ext cx="9376010" cy="1875202"/>
+          </a:xfrm>
+          <a:prstGeom prst="rect">
+            <a:avLst/>
+          </a:prstGeom>
+        </p:spPr>
+      </p:pic>
+    </p:spTree>
+    <p:extLst>
+      <p:ext uri="{BB962C8B-B14F-4D97-AF65-F5344CB8AC3E}">
+        <p14:creationId xmlns:p14="http://schemas.microsoft.com/office/powerpoint/2010/main" val="292420189"/>
+      </p:ext>
+    </p:extLst>
+  </p:cSld>
+  <p:clrMapOvr>
+    <a:masterClrMapping/>
+  </p:clrMapOvr>
+</p:sld>
+</file>
+
+<file path=ppt/slides/slide5.xml><?xml version="1.0" encoding="utf-8"?>
+<p:sld xmlns:a="http://schemas.openxmlformats.org/drawingml/2006/main" xmlns:r="http://schemas.openxmlformats.org/officeDocument/2006/relationships" xmlns:p="http://schemas.openxmlformats.org/presentationml/2006/main">
+  <p:cSld>
+    <p:spTree>
+      <p:nvGrpSpPr>
+        <p:cNvPr id="1" name=""/>
+        <p:cNvGrpSpPr/>
+        <p:nvPr/>
+      </p:nvGrpSpPr>
+      <p:grpSpPr>
+        <a:xfrm>
+          <a:off x="0" y="0"/>
+          <a:ext cx="0" cy="0"/>
+          <a:chOff x="0" y="0"/>
+          <a:chExt cx="0" cy="0"/>
+        </a:xfrm>
+      </p:grpSpPr>
+      <p:sp>
+        <p:nvSpPr>
+          <p:cNvPr id="2" name="Title 1"/>
+          <p:cNvSpPr>
+            <a:spLocks noGrp="1"/>
+          </p:cNvSpPr>
+          <p:nvPr>
+            <p:ph type="title"/>
+          </p:nvPr>
+        </p:nvSpPr>
+        <p:spPr/>
+        <p:txBody>
+          <a:bodyPr/>
+          <a:lstStyle/>
+          <a:p>
+            <a:r>
+              <a:rPr lang="en-US" dirty="0"/>
+              <a:t>Syslog - System Log View</a:t>
             </a:r>
           </a:p>
         </p:txBody>
@@ -3579,7 +4275,7 @@
         </p:blipFill>
         <p:spPr bwMode="auto">
           <a:xfrm>
-            <a:off x="648229" y="1139038"/>
+            <a:off x="652462" y="1383412"/>
             <a:ext cx="10887075" cy="4091176"/>
           </a:xfrm>
           <a:prstGeom prst="rect">
@@ -3610,7 +4306,7 @@
 </p:sld>
 </file>
 
-<file path=ppt/slides/slide4.xml><?xml version="1.0" encoding="utf-8"?>
+<file path=ppt/slides/slide6.xml><?xml version="1.0" encoding="utf-8"?>
 <p:sld xmlns:a="http://schemas.openxmlformats.org/drawingml/2006/main" xmlns:r="http://schemas.openxmlformats.org/officeDocument/2006/relationships" xmlns:p="http://schemas.openxmlformats.org/presentationml/2006/main">
   <p:cSld>
     <p:spTree>
@@ -3644,7 +4340,7 @@
           <a:p>
             <a:r>
               <a:rPr lang="en-US" dirty="0"/>
-              <a:t>System Log View</a:t>
+              <a:t>Syslog - System Log View</a:t>
             </a:r>
           </a:p>
         </p:txBody>
@@ -3694,6 +4390,142 @@
     <p:extLst>
       <p:ext uri="{BB962C8B-B14F-4D97-AF65-F5344CB8AC3E}">
         <p14:creationId xmlns:p14="http://schemas.microsoft.com/office/powerpoint/2010/main" val="3135684955"/>
+      </p:ext>
+    </p:extLst>
+  </p:cSld>
+  <p:clrMapOvr>
+    <a:masterClrMapping/>
+  </p:clrMapOvr>
+</p:sld>
+</file>
+
+<file path=ppt/slides/slide7.xml><?xml version="1.0" encoding="utf-8"?>
+<p:sld xmlns:a="http://schemas.openxmlformats.org/drawingml/2006/main" xmlns:r="http://schemas.openxmlformats.org/officeDocument/2006/relationships" xmlns:p="http://schemas.openxmlformats.org/presentationml/2006/main">
+  <p:cSld>
+    <p:spTree>
+      <p:nvGrpSpPr>
+        <p:cNvPr id="1" name=""/>
+        <p:cNvGrpSpPr/>
+        <p:nvPr/>
+      </p:nvGrpSpPr>
+      <p:grpSpPr>
+        <a:xfrm>
+          <a:off x="0" y="0"/>
+          <a:ext cx="0" cy="0"/>
+          <a:chOff x="0" y="0"/>
+          <a:chExt cx="0" cy="0"/>
+        </a:xfrm>
+      </p:grpSpPr>
+      <p:sp>
+        <p:nvSpPr>
+          <p:cNvPr id="2" name="Title 1">
+            <a:extLst>
+              <a:ext uri="{FF2B5EF4-FFF2-40B4-BE49-F238E27FC236}">
+                <a16:creationId xmlns:a16="http://schemas.microsoft.com/office/drawing/2014/main" id="{AABED4E5-1885-4213-AB73-5A879018F720}"/>
+              </a:ext>
+            </a:extLst>
+          </p:cNvPr>
+          <p:cNvSpPr>
+            <a:spLocks noGrp="1"/>
+          </p:cNvSpPr>
+          <p:nvPr>
+            <p:ph type="title"/>
+          </p:nvPr>
+        </p:nvSpPr>
+        <p:spPr/>
+        <p:txBody>
+          <a:bodyPr/>
+          <a:lstStyle/>
+          <a:p>
+            <a:r>
+              <a:rPr lang="en-US" dirty="0"/>
+              <a:t>Syslog</a:t>
+            </a:r>
+          </a:p>
+        </p:txBody>
+      </p:sp>
+      <p:sp>
+        <p:nvSpPr>
+          <p:cNvPr id="6" name="Content Placeholder 5">
+            <a:extLst>
+              <a:ext uri="{FF2B5EF4-FFF2-40B4-BE49-F238E27FC236}">
+                <a16:creationId xmlns:a16="http://schemas.microsoft.com/office/drawing/2014/main" id="{088F3AB2-213F-40DE-89FE-B050C108D933}"/>
+              </a:ext>
+            </a:extLst>
+          </p:cNvPr>
+          <p:cNvSpPr>
+            <a:spLocks noGrp="1"/>
+          </p:cNvSpPr>
+          <p:nvPr>
+            <p:ph sz="half" idx="1"/>
+          </p:nvPr>
+        </p:nvSpPr>
+        <p:spPr/>
+        <p:txBody>
+          <a:bodyPr/>
+          <a:lstStyle/>
+          <a:p>
+            <a:r>
+              <a:rPr lang="en-US" dirty="0"/>
+              <a:t>NI Linux RT targets </a:t>
+            </a:r>
+            <a:r>
+              <a:rPr lang="en-US" b="1" dirty="0"/>
+              <a:t>already have </a:t>
+            </a:r>
+            <a:r>
+              <a:rPr lang="en-US" dirty="0"/>
+              <a:t>a syslog-ng daemon running</a:t>
+            </a:r>
+          </a:p>
+          <a:p>
+            <a:r>
+              <a:rPr lang="en-US" dirty="0"/>
+              <a:t>DCAF taps into the existing background process to log and report messages</a:t>
+            </a:r>
+          </a:p>
+          <a:p>
+            <a:r>
+              <a:rPr lang="en-US" dirty="0"/>
+              <a:t>You can, too!</a:t>
+            </a:r>
+          </a:p>
+        </p:txBody>
+      </p:sp>
+      <p:pic>
+        <p:nvPicPr>
+          <p:cNvPr id="7" name="Picture 6">
+            <a:extLst>
+              <a:ext uri="{FF2B5EF4-FFF2-40B4-BE49-F238E27FC236}">
+                <a16:creationId xmlns:a16="http://schemas.microsoft.com/office/drawing/2014/main" id="{34BA4BC9-2EE0-464D-913D-5FCABF71CEC1}"/>
+              </a:ext>
+            </a:extLst>
+          </p:cNvPr>
+          <p:cNvPicPr>
+            <a:picLocks noChangeAspect="1"/>
+          </p:cNvPicPr>
+          <p:nvPr/>
+        </p:nvPicPr>
+        <p:blipFill>
+          <a:blip r:embed="rId3"/>
+          <a:stretch>
+            <a:fillRect/>
+          </a:stretch>
+        </p:blipFill>
+        <p:spPr>
+          <a:xfrm>
+            <a:off x="6172200" y="1143122"/>
+            <a:ext cx="5930747" cy="4571755"/>
+          </a:xfrm>
+          <a:prstGeom prst="rect">
+            <a:avLst/>
+          </a:prstGeom>
+        </p:spPr>
+      </p:pic>
+    </p:spTree>
+    <p:extLst>
+      <p:ext uri="{BB962C8B-B14F-4D97-AF65-F5344CB8AC3E}">
+        <p14:creationId xmlns:p14="http://schemas.microsoft.com/office/powerpoint/2010/main" val="2600151340"/>
       </p:ext>
     </p:extLst>
   </p:cSld>
@@ -3996,4 +4828,299 @@
     </a:ext>
   </a:extLst>
 </a:theme>
+</file>
+
+<file path=ppt/theme/theme2.xml><?xml version="1.0" encoding="utf-8"?>
+<a:theme xmlns:a="http://schemas.openxmlformats.org/drawingml/2006/main" name="Office Theme">
+  <a:themeElements>
+    <a:clrScheme name="Office">
+      <a:dk1>
+        <a:sysClr val="windowText" lastClr="000000"/>
+      </a:dk1>
+      <a:lt1>
+        <a:sysClr val="window" lastClr="FFFFFF"/>
+      </a:lt1>
+      <a:dk2>
+        <a:srgbClr val="44546A"/>
+      </a:dk2>
+      <a:lt2>
+        <a:srgbClr val="E7E6E6"/>
+      </a:lt2>
+      <a:accent1>
+        <a:srgbClr val="4472C4"/>
+      </a:accent1>
+      <a:accent2>
+        <a:srgbClr val="ED7D31"/>
+      </a:accent2>
+      <a:accent3>
+        <a:srgbClr val="A5A5A5"/>
+      </a:accent3>
+      <a:accent4>
+        <a:srgbClr val="FFC000"/>
+      </a:accent4>
+      <a:accent5>
+        <a:srgbClr val="5B9BD5"/>
+      </a:accent5>
+      <a:accent6>
+        <a:srgbClr val="70AD47"/>
+      </a:accent6>
+      <a:hlink>
+        <a:srgbClr val="0563C1"/>
+      </a:hlink>
+      <a:folHlink>
+        <a:srgbClr val="954F72"/>
+      </a:folHlink>
+    </a:clrScheme>
+    <a:fontScheme name="Office">
+      <a:majorFont>
+        <a:latin typeface="Calibri Light" panose="020F0302020204030204"/>
+        <a:ea typeface=""/>
+        <a:cs typeface=""/>
+        <a:font script="Jpan" typeface="游ゴシック Light"/>
+        <a:font script="Hang" typeface="맑은 고딕"/>
+        <a:font script="Hans" typeface="等线 Light"/>
+        <a:font script="Hant" typeface="新細明體"/>
+        <a:font script="Arab" typeface="Times New Roman"/>
+        <a:font script="Hebr" typeface="Times New Roman"/>
+        <a:font script="Thai" typeface="Angsana New"/>
+        <a:font script="Ethi" typeface="Nyala"/>
+        <a:font script="Beng" typeface="Vrinda"/>
+        <a:font script="Gujr" typeface="Shruti"/>
+        <a:font script="Khmr" typeface="MoolBoran"/>
+        <a:font script="Knda" typeface="Tunga"/>
+        <a:font script="Guru" typeface="Raavi"/>
+        <a:font script="Cans" typeface="Euphemia"/>
+        <a:font script="Cher" typeface="Plantagenet Cherokee"/>
+        <a:font script="Yiii" typeface="Microsoft Yi Baiti"/>
+        <a:font script="Tibt" typeface="Microsoft Himalaya"/>
+        <a:font script="Thaa" typeface="MV Boli"/>
+        <a:font script="Deva" typeface="Mangal"/>
+        <a:font script="Telu" typeface="Gautami"/>
+        <a:font script="Taml" typeface="Latha"/>
+        <a:font script="Syrc" typeface="Estrangelo Edessa"/>
+        <a:font script="Orya" typeface="Kalinga"/>
+        <a:font script="Mlym" typeface="Kartika"/>
+        <a:font script="Laoo" typeface="DokChampa"/>
+        <a:font script="Sinh" typeface="Iskoola Pota"/>
+        <a:font script="Mong" typeface="Mongolian Baiti"/>
+        <a:font script="Viet" typeface="Times New Roman"/>
+        <a:font script="Uigh" typeface="Microsoft Uighur"/>
+        <a:font script="Geor" typeface="Sylfaen"/>
+        <a:font script="Armn" typeface="Arial"/>
+        <a:font script="Bugi" typeface="Leelawadee UI"/>
+        <a:font script="Bopo" typeface="Microsoft JhengHei"/>
+        <a:font script="Java" typeface="Javanese Text"/>
+        <a:font script="Lisu" typeface="Segoe UI"/>
+        <a:font script="Mymr" typeface="Myanmar Text"/>
+        <a:font script="Nkoo" typeface="Ebrima"/>
+        <a:font script="Olck" typeface="Nirmala UI"/>
+        <a:font script="Osma" typeface="Ebrima"/>
+        <a:font script="Phag" typeface="Phagspa"/>
+        <a:font script="Syrn" typeface="Estrangelo Edessa"/>
+        <a:font script="Syrj" typeface="Estrangelo Edessa"/>
+        <a:font script="Syre" typeface="Estrangelo Edessa"/>
+        <a:font script="Sora" typeface="Nirmala UI"/>
+        <a:font script="Tale" typeface="Microsoft Tai Le"/>
+        <a:font script="Talu" typeface="Microsoft New Tai Lue"/>
+        <a:font script="Tfng" typeface="Ebrima"/>
+      </a:majorFont>
+      <a:minorFont>
+        <a:latin typeface="Calibri" panose="020F0502020204030204"/>
+        <a:ea typeface=""/>
+        <a:cs typeface=""/>
+        <a:font script="Jpan" typeface="游ゴシック"/>
+        <a:font script="Hang" typeface="맑은 고딕"/>
+        <a:font script="Hans" typeface="等线"/>
+        <a:font script="Hant" typeface="新細明體"/>
+        <a:font script="Arab" typeface="Arial"/>
+        <a:font script="Hebr" typeface="Arial"/>
+        <a:font script="Thai" typeface="Cordia New"/>
+        <a:font script="Ethi" typeface="Nyala"/>
+        <a:font script="Beng" typeface="Vrinda"/>
+        <a:font script="Gujr" typeface="Shruti"/>
+        <a:font script="Khmr" typeface="DaunPenh"/>
+        <a:font script="Knda" typeface="Tunga"/>
+        <a:font script="Guru" typeface="Raavi"/>
+        <a:font script="Cans" typeface="Euphemia"/>
+        <a:font script="Cher" typeface="Plantagenet Cherokee"/>
+        <a:font script="Yiii" typeface="Microsoft Yi Baiti"/>
+        <a:font script="Tibt" typeface="Microsoft Himalaya"/>
+        <a:font script="Thaa" typeface="MV Boli"/>
+        <a:font script="Deva" typeface="Mangal"/>
+        <a:font script="Telu" typeface="Gautami"/>
+        <a:font script="Taml" typeface="Latha"/>
+        <a:font script="Syrc" typeface="Estrangelo Edessa"/>
+        <a:font script="Orya" typeface="Kalinga"/>
+        <a:font script="Mlym" typeface="Kartika"/>
+        <a:font script="Laoo" typeface="DokChampa"/>
+        <a:font script="Sinh" typeface="Iskoola Pota"/>
+        <a:font script="Mong" typeface="Mongolian Baiti"/>
+        <a:font script="Viet" typeface="Arial"/>
+        <a:font script="Uigh" typeface="Microsoft Uighur"/>
+        <a:font script="Geor" typeface="Sylfaen"/>
+        <a:font script="Armn" typeface="Arial"/>
+        <a:font script="Bugi" typeface="Leelawadee UI"/>
+        <a:font script="Bopo" typeface="Microsoft JhengHei"/>
+        <a:font script="Java" typeface="Javanese Text"/>
+        <a:font script="Lisu" typeface="Segoe UI"/>
+        <a:font script="Mymr" typeface="Myanmar Text"/>
+        <a:font script="Nkoo" typeface="Ebrima"/>
+        <a:font script="Olck" typeface="Nirmala UI"/>
+        <a:font script="Osma" typeface="Ebrima"/>
+        <a:font script="Phag" typeface="Phagspa"/>
+        <a:font script="Syrn" typeface="Estrangelo Edessa"/>
+        <a:font script="Syrj" typeface="Estrangelo Edessa"/>
+        <a:font script="Syre" typeface="Estrangelo Edessa"/>
+        <a:font script="Sora" typeface="Nirmala UI"/>
+        <a:font script="Tale" typeface="Microsoft Tai Le"/>
+        <a:font script="Talu" typeface="Microsoft New Tai Lue"/>
+        <a:font script="Tfng" typeface="Ebrima"/>
+      </a:minorFont>
+    </a:fontScheme>
+    <a:fmtScheme name="Office">
+      <a:fillStyleLst>
+        <a:solidFill>
+          <a:schemeClr val="phClr"/>
+        </a:solidFill>
+        <a:gradFill rotWithShape="1">
+          <a:gsLst>
+            <a:gs pos="0">
+              <a:schemeClr val="phClr">
+                <a:lumMod val="110000"/>
+                <a:satMod val="105000"/>
+                <a:tint val="67000"/>
+              </a:schemeClr>
+            </a:gs>
+            <a:gs pos="50000">
+              <a:schemeClr val="phClr">
+                <a:lumMod val="105000"/>
+                <a:satMod val="103000"/>
+                <a:tint val="73000"/>
+              </a:schemeClr>
+            </a:gs>
+            <a:gs pos="100000">
+              <a:schemeClr val="phClr">
+                <a:lumMod val="105000"/>
+                <a:satMod val="109000"/>
+                <a:tint val="81000"/>
+              </a:schemeClr>
+            </a:gs>
+          </a:gsLst>
+          <a:lin ang="5400000" scaled="0"/>
+        </a:gradFill>
+        <a:gradFill rotWithShape="1">
+          <a:gsLst>
+            <a:gs pos="0">
+              <a:schemeClr val="phClr">
+                <a:satMod val="103000"/>
+                <a:lumMod val="102000"/>
+                <a:tint val="94000"/>
+              </a:schemeClr>
+            </a:gs>
+            <a:gs pos="50000">
+              <a:schemeClr val="phClr">
+                <a:satMod val="110000"/>
+                <a:lumMod val="100000"/>
+                <a:shade val="100000"/>
+              </a:schemeClr>
+            </a:gs>
+            <a:gs pos="100000">
+              <a:schemeClr val="phClr">
+                <a:lumMod val="99000"/>
+                <a:satMod val="120000"/>
+                <a:shade val="78000"/>
+              </a:schemeClr>
+            </a:gs>
+          </a:gsLst>
+          <a:lin ang="5400000" scaled="0"/>
+        </a:gradFill>
+      </a:fillStyleLst>
+      <a:lnStyleLst>
+        <a:ln w="6350" cap="flat" cmpd="sng" algn="ctr">
+          <a:solidFill>
+            <a:schemeClr val="phClr"/>
+          </a:solidFill>
+          <a:prstDash val="solid"/>
+          <a:miter lim="800000"/>
+        </a:ln>
+        <a:ln w="12700" cap="flat" cmpd="sng" algn="ctr">
+          <a:solidFill>
+            <a:schemeClr val="phClr"/>
+          </a:solidFill>
+          <a:prstDash val="solid"/>
+          <a:miter lim="800000"/>
+        </a:ln>
+        <a:ln w="19050" cap="flat" cmpd="sng" algn="ctr">
+          <a:solidFill>
+            <a:schemeClr val="phClr"/>
+          </a:solidFill>
+          <a:prstDash val="solid"/>
+          <a:miter lim="800000"/>
+        </a:ln>
+      </a:lnStyleLst>
+      <a:effectStyleLst>
+        <a:effectStyle>
+          <a:effectLst/>
+        </a:effectStyle>
+        <a:effectStyle>
+          <a:effectLst/>
+        </a:effectStyle>
+        <a:effectStyle>
+          <a:effectLst>
+            <a:outerShdw blurRad="57150" dist="19050" dir="5400000" algn="ctr" rotWithShape="0">
+              <a:srgbClr val="000000">
+                <a:alpha val="63000"/>
+              </a:srgbClr>
+            </a:outerShdw>
+          </a:effectLst>
+        </a:effectStyle>
+      </a:effectStyleLst>
+      <a:bgFillStyleLst>
+        <a:solidFill>
+          <a:schemeClr val="phClr"/>
+        </a:solidFill>
+        <a:solidFill>
+          <a:schemeClr val="phClr">
+            <a:tint val="95000"/>
+            <a:satMod val="170000"/>
+          </a:schemeClr>
+        </a:solidFill>
+        <a:gradFill rotWithShape="1">
+          <a:gsLst>
+            <a:gs pos="0">
+              <a:schemeClr val="phClr">
+                <a:tint val="93000"/>
+                <a:satMod val="150000"/>
+                <a:shade val="98000"/>
+                <a:lumMod val="102000"/>
+              </a:schemeClr>
+            </a:gs>
+            <a:gs pos="50000">
+              <a:schemeClr val="phClr">
+                <a:tint val="98000"/>
+                <a:satMod val="130000"/>
+                <a:shade val="90000"/>
+                <a:lumMod val="103000"/>
+              </a:schemeClr>
+            </a:gs>
+            <a:gs pos="100000">
+              <a:schemeClr val="phClr">
+                <a:shade val="63000"/>
+                <a:satMod val="120000"/>
+              </a:schemeClr>
+            </a:gs>
+          </a:gsLst>
+          <a:lin ang="5400000" scaled="0"/>
+        </a:gradFill>
+      </a:bgFillStyleLst>
+    </a:fmtScheme>
+  </a:themeElements>
+  <a:objectDefaults/>
+  <a:extraClrSchemeLst/>
+  <a:extLst>
+    <a:ext uri="{05A4C25C-085E-4340-85A3-A5531E510DB2}">
+      <thm15:themeFamily xmlns:thm15="http://schemas.microsoft.com/office/thememl/2012/main" name="Office Theme" id="{62F939B6-93AF-4DB8-9C6B-D6C7DFDC589F}" vid="{4A3C46E8-61CC-4603-A589-7422A47A8E4A}"/>
+    </a:ext>
+  </a:extLst>
+</a:theme>
 </file>
</xml_diff>

<commit_message>
Imporved the flow a little still needs more work
</commit_message>
<xml_diff>
--- a/Trunk/Getting Started Material/DCAF Training/8 Debugging DCAF.pptx
+++ b/Trunk/Getting Started Material/DCAF Training/8 Debugging DCAF.pptx
@@ -5,22 +5,31 @@
     <p:sldMasterId id="2147483660" r:id="rId1"/>
   </p:sldMasterIdLst>
   <p:notesMasterIdLst>
-    <p:notesMasterId r:id="rId15"/>
+    <p:notesMasterId r:id="rId24"/>
   </p:notesMasterIdLst>
   <p:sldIdLst>
     <p:sldId id="256" r:id="rId2"/>
     <p:sldId id="257" r:id="rId3"/>
-    <p:sldId id="360" r:id="rId4"/>
-    <p:sldId id="280" r:id="rId5"/>
-    <p:sldId id="361" r:id="rId6"/>
-    <p:sldId id="362" r:id="rId7"/>
-    <p:sldId id="363" r:id="rId8"/>
-    <p:sldId id="279" r:id="rId9"/>
-    <p:sldId id="284" r:id="rId10"/>
-    <p:sldId id="285" r:id="rId11"/>
-    <p:sldId id="359" r:id="rId12"/>
-    <p:sldId id="364" r:id="rId13"/>
-    <p:sldId id="365" r:id="rId14"/>
+    <p:sldId id="367" r:id="rId4"/>
+    <p:sldId id="366" r:id="rId5"/>
+    <p:sldId id="360" r:id="rId6"/>
+    <p:sldId id="369" r:id="rId7"/>
+    <p:sldId id="368" r:id="rId8"/>
+    <p:sldId id="370" r:id="rId9"/>
+    <p:sldId id="280" r:id="rId10"/>
+    <p:sldId id="361" r:id="rId11"/>
+    <p:sldId id="371" r:id="rId12"/>
+    <p:sldId id="362" r:id="rId13"/>
+    <p:sldId id="372" r:id="rId14"/>
+    <p:sldId id="373" r:id="rId15"/>
+    <p:sldId id="363" r:id="rId16"/>
+    <p:sldId id="279" r:id="rId17"/>
+    <p:sldId id="284" r:id="rId18"/>
+    <p:sldId id="285" r:id="rId19"/>
+    <p:sldId id="359" r:id="rId20"/>
+    <p:sldId id="365" r:id="rId21"/>
+    <p:sldId id="374" r:id="rId22"/>
+    <p:sldId id="375" r:id="rId23"/>
   </p:sldIdLst>
   <p:sldSz cx="12192000" cy="6858000"/>
   <p:notesSz cx="6858000" cy="9144000"/>
@@ -209,7 +218,7 @@
           <a:p>
             <a:fld id="{E3E5E4E2-2D1E-49FF-9D26-9043035DAE61}" type="datetimeFigureOut">
               <a:rPr lang="en-US" smtClean="0"/>
-              <a:t>2018-06-27</a:t>
+              <a:t>7/10/2018</a:t>
             </a:fld>
             <a:endParaRPr lang="en-US"/>
           </a:p>
@@ -522,8 +531,11 @@
           <a:p>
             <a:r>
               <a:rPr lang="en-US" dirty="0"/>
-              <a:t>Add WIF</a:t>
-            </a:r>
+              <a:t>Blaming the engine.</a:t>
+            </a:r>
+          </a:p>
+          <a:p>
+            <a:endParaRPr lang="en-US" dirty="0"/>
           </a:p>
         </p:txBody>
       </p:sp>
@@ -542,9 +554,180 @@
           <a:bodyPr/>
           <a:lstStyle/>
           <a:p>
+            <a:fld id="{6BFF3EFC-B7E2-4F0E-9300-F6EC17A9DE76}" type="slidenum">
+              <a:rPr lang="en-US" smtClean="0"/>
+              <a:t>7</a:t>
+            </a:fld>
+            <a:endParaRPr lang="en-US"/>
+          </a:p>
+        </p:txBody>
+      </p:sp>
+    </p:spTree>
+    <p:extLst>
+      <p:ext uri="{BB962C8B-B14F-4D97-AF65-F5344CB8AC3E}">
+        <p14:creationId xmlns:p14="http://schemas.microsoft.com/office/powerpoint/2010/main" val="3626685704"/>
+      </p:ext>
+    </p:extLst>
+  </p:cSld>
+  <p:clrMapOvr>
+    <a:masterClrMapping/>
+  </p:clrMapOvr>
+</p:notes>
+</file>
+
+<file path=ppt/notesSlides/notesSlide2.xml><?xml version="1.0" encoding="utf-8"?>
+<p:notes xmlns:a="http://schemas.openxmlformats.org/drawingml/2006/main" xmlns:r="http://schemas.openxmlformats.org/officeDocument/2006/relationships" xmlns:p="http://schemas.openxmlformats.org/presentationml/2006/main">
+  <p:cSld>
+    <p:spTree>
+      <p:nvGrpSpPr>
+        <p:cNvPr id="1" name=""/>
+        <p:cNvGrpSpPr/>
+        <p:nvPr/>
+      </p:nvGrpSpPr>
+      <p:grpSpPr>
+        <a:xfrm>
+          <a:off x="0" y="0"/>
+          <a:ext cx="0" cy="0"/>
+          <a:chOff x="0" y="0"/>
+          <a:chExt cx="0" cy="0"/>
+        </a:xfrm>
+      </p:grpSpPr>
+      <p:sp>
+        <p:nvSpPr>
+          <p:cNvPr id="2" name="Slide Image Placeholder 1"/>
+          <p:cNvSpPr>
+            <a:spLocks noGrp="1" noRot="1" noChangeAspect="1"/>
+          </p:cNvSpPr>
+          <p:nvPr>
+            <p:ph type="sldImg"/>
+          </p:nvPr>
+        </p:nvSpPr>
+        <p:spPr/>
+      </p:sp>
+      <p:sp>
+        <p:nvSpPr>
+          <p:cNvPr id="3" name="Notes Placeholder 2"/>
+          <p:cNvSpPr>
+            <a:spLocks noGrp="1"/>
+          </p:cNvSpPr>
+          <p:nvPr>
+            <p:ph type="body" idx="1"/>
+          </p:nvPr>
+        </p:nvSpPr>
+        <p:spPr/>
+        <p:txBody>
+          <a:bodyPr/>
+          <a:lstStyle/>
+          <a:p>
+            <a:endParaRPr lang="en-US" dirty="0"/>
+          </a:p>
+        </p:txBody>
+      </p:sp>
+      <p:sp>
+        <p:nvSpPr>
+          <p:cNvPr id="4" name="Slide Number Placeholder 3"/>
+          <p:cNvSpPr>
+            <a:spLocks noGrp="1"/>
+          </p:cNvSpPr>
+          <p:nvPr>
+            <p:ph type="sldNum" sz="quarter" idx="10"/>
+          </p:nvPr>
+        </p:nvSpPr>
+        <p:spPr/>
+        <p:txBody>
+          <a:bodyPr/>
+          <a:lstStyle/>
+          <a:p>
+            <a:fld id="{6BFF3EFC-B7E2-4F0E-9300-F6EC17A9DE76}" type="slidenum">
+              <a:rPr lang="en-US" smtClean="0"/>
+              <a:t>9</a:t>
+            </a:fld>
+            <a:endParaRPr lang="en-US"/>
+          </a:p>
+        </p:txBody>
+      </p:sp>
+    </p:spTree>
+    <p:extLst>
+      <p:ext uri="{BB962C8B-B14F-4D97-AF65-F5344CB8AC3E}">
+        <p14:creationId xmlns:p14="http://schemas.microsoft.com/office/powerpoint/2010/main" val="2472073038"/>
+      </p:ext>
+    </p:extLst>
+  </p:cSld>
+  <p:clrMapOvr>
+    <a:masterClrMapping/>
+  </p:clrMapOvr>
+</p:notes>
+</file>
+
+<file path=ppt/notesSlides/notesSlide3.xml><?xml version="1.0" encoding="utf-8"?>
+<p:notes xmlns:a="http://schemas.openxmlformats.org/drawingml/2006/main" xmlns:r="http://schemas.openxmlformats.org/officeDocument/2006/relationships" xmlns:p="http://schemas.openxmlformats.org/presentationml/2006/main">
+  <p:cSld>
+    <p:spTree>
+      <p:nvGrpSpPr>
+        <p:cNvPr id="1" name=""/>
+        <p:cNvGrpSpPr/>
+        <p:nvPr/>
+      </p:nvGrpSpPr>
+      <p:grpSpPr>
+        <a:xfrm>
+          <a:off x="0" y="0"/>
+          <a:ext cx="0" cy="0"/>
+          <a:chOff x="0" y="0"/>
+          <a:chExt cx="0" cy="0"/>
+        </a:xfrm>
+      </p:grpSpPr>
+      <p:sp>
+        <p:nvSpPr>
+          <p:cNvPr id="2" name="Slide Image Placeholder 1"/>
+          <p:cNvSpPr>
+            <a:spLocks noGrp="1" noRot="1" noChangeAspect="1"/>
+          </p:cNvSpPr>
+          <p:nvPr>
+            <p:ph type="sldImg"/>
+          </p:nvPr>
+        </p:nvSpPr>
+        <p:spPr/>
+      </p:sp>
+      <p:sp>
+        <p:nvSpPr>
+          <p:cNvPr id="3" name="Notes Placeholder 2"/>
+          <p:cNvSpPr>
+            <a:spLocks noGrp="1"/>
+          </p:cNvSpPr>
+          <p:nvPr>
+            <p:ph type="body" idx="1"/>
+          </p:nvPr>
+        </p:nvSpPr>
+        <p:spPr/>
+        <p:txBody>
+          <a:bodyPr/>
+          <a:lstStyle/>
+          <a:p>
+            <a:r>
+              <a:rPr lang="en-US" dirty="0"/>
+              <a:t>Add WIF</a:t>
+            </a:r>
+          </a:p>
+        </p:txBody>
+      </p:sp>
+      <p:sp>
+        <p:nvSpPr>
+          <p:cNvPr id="4" name="Slide Number Placeholder 3"/>
+          <p:cNvSpPr>
+            <a:spLocks noGrp="1"/>
+          </p:cNvSpPr>
+          <p:nvPr>
+            <p:ph type="sldNum" sz="quarter" idx="10"/>
+          </p:nvPr>
+        </p:nvSpPr>
+        <p:spPr/>
+        <p:txBody>
+          <a:bodyPr/>
+          <a:lstStyle/>
+          <a:p>
             <a:fld id="{851B3976-BA5C-4172-B420-FFE6D6004C76}" type="slidenum">
               <a:rPr lang="en-US" smtClean="0"/>
-              <a:t>11</a:t>
+              <a:t>19</a:t>
             </a:fld>
             <a:endParaRPr lang="en-US" dirty="0"/>
           </a:p>
@@ -3738,7 +3921,7 @@
           <a:p>
             <a:fld id="{86E674FB-04A2-4C43-8E96-48380D248600}" type="datetimeFigureOut">
               <a:rPr lang="en-US" smtClean="0"/>
-              <a:t>2018-06-27</a:t>
+              <a:t>7/10/2018</a:t>
             </a:fld>
             <a:endParaRPr lang="en-US"/>
           </a:p>
@@ -4435,7 +4618,7 @@
           <a:p>
             <a:fld id="{86E674FB-04A2-4C43-8E96-48380D248600}" type="datetimeFigureOut">
               <a:rPr lang="en-US" smtClean="0"/>
-              <a:t>2018-06-27</a:t>
+              <a:t>7/10/2018</a:t>
             </a:fld>
             <a:endParaRPr lang="en-US"/>
           </a:p>
@@ -7203,7 +7386,10 @@
           <a:bodyPr/>
           <a:lstStyle/>
           <a:p>
-            <a:endParaRPr lang="en-US" dirty="0"/>
+            <a:r>
+              <a:rPr lang="en-US" dirty="0"/>
+              <a:t>Benjamin Celis, Simon Perez Santa Maria</a:t>
+            </a:r>
           </a:p>
         </p:txBody>
       </p:sp>
@@ -7264,12 +7450,18 @@
       </p:grpSpPr>
       <p:sp>
         <p:nvSpPr>
-          <p:cNvPr id="2" name="Title 1"/>
+          <p:cNvPr id="6" name="Text Placeholder 5">
+            <a:extLst>
+              <a:ext uri="{FF2B5EF4-FFF2-40B4-BE49-F238E27FC236}">
+                <a16:creationId xmlns:a16="http://schemas.microsoft.com/office/drawing/2014/main" id="{AE7D9B36-B649-4C5D-AE68-ED0ADFB9E016}"/>
+              </a:ext>
+            </a:extLst>
+          </p:cNvPr>
           <p:cNvSpPr>
             <a:spLocks noGrp="1"/>
           </p:cNvSpPr>
           <p:nvPr>
-            <p:ph type="title"/>
+            <p:ph type="body" sz="quarter" idx="10"/>
           </p:nvPr>
         </p:nvSpPr>
         <p:spPr/>
@@ -7279,56 +7471,15 @@
           <a:p>
             <a:r>
               <a:rPr lang="en-US" dirty="0"/>
-              <a:t>Syslog - System Log View</a:t>
-            </a:r>
-          </a:p>
-        </p:txBody>
-      </p:sp>
-      <p:pic>
-        <p:nvPicPr>
-          <p:cNvPr id="5" name="Picture 4" descr="error.png"/>
-          <p:cNvPicPr>
-            <a:picLocks noChangeAspect="1" noChangeArrowheads="1"/>
-          </p:cNvPicPr>
-          <p:nvPr/>
-        </p:nvPicPr>
-        <p:blipFill>
-          <a:blip r:embed="rId2">
-            <a:extLst>
-              <a:ext uri="{28A0092B-C50C-407E-A947-70E740481C1C}">
-                <a14:useLocalDpi xmlns:a14="http://schemas.microsoft.com/office/drawing/2010/main" val="0"/>
-              </a:ext>
-            </a:extLst>
-          </a:blip>
-          <a:srcRect/>
-          <a:stretch>
-            <a:fillRect/>
-          </a:stretch>
-        </p:blipFill>
-        <p:spPr bwMode="auto">
-          <a:xfrm>
-            <a:off x="0" y="2333625"/>
-            <a:ext cx="12192000" cy="2190750"/>
-          </a:xfrm>
-          <a:prstGeom prst="rect">
-            <a:avLst/>
-          </a:prstGeom>
-          <a:noFill/>
-          <a:extLst>
-            <a:ext uri="{909E8E84-426E-40DD-AFC4-6F175D3DCCD1}">
-              <a14:hiddenFill xmlns:a14="http://schemas.microsoft.com/office/drawing/2010/main">
-                <a:solidFill>
-                  <a:srgbClr val="FFFFFF"/>
-                </a:solidFill>
-              </a14:hiddenFill>
-            </a:ext>
-          </a:extLst>
-        </p:spPr>
-      </p:pic>
+              <a:t>Debugging Reentrant VIs</a:t>
+            </a:r>
+          </a:p>
+        </p:txBody>
+      </p:sp>
     </p:spTree>
     <p:extLst>
       <p:ext uri="{BB962C8B-B14F-4D97-AF65-F5344CB8AC3E}">
-        <p14:creationId xmlns:p14="http://schemas.microsoft.com/office/powerpoint/2010/main" val="3135684955"/>
+        <p14:creationId xmlns:p14="http://schemas.microsoft.com/office/powerpoint/2010/main" val="3965479818"/>
       </p:ext>
     </p:extLst>
   </p:cSld>
@@ -7357,10 +7508,10 @@
       </p:grpSpPr>
       <p:sp>
         <p:nvSpPr>
-          <p:cNvPr id="2" name="Title 1">
+          <p:cNvPr id="3" name="Title 2">
             <a:extLst>
               <a:ext uri="{FF2B5EF4-FFF2-40B4-BE49-F238E27FC236}">
-                <a16:creationId xmlns:a16="http://schemas.microsoft.com/office/drawing/2014/main" id="{AABED4E5-1885-4213-AB73-5A879018F720}"/>
+                <a16:creationId xmlns:a16="http://schemas.microsoft.com/office/drawing/2014/main" id="{DF49AEC4-B33C-499A-9924-FE28288E4BC6}"/>
               </a:ext>
             </a:extLst>
           </p:cNvPr>
@@ -7378,17 +7529,17 @@
           <a:p>
             <a:r>
               <a:rPr lang="en-US" dirty="0"/>
-              <a:t>Syslog</a:t>
-            </a:r>
-          </a:p>
-        </p:txBody>
-      </p:sp>
-      <p:sp>
-        <p:nvSpPr>
-          <p:cNvPr id="6" name="Content Placeholder 5">
+              <a:t>Reentrant clones.</a:t>
+            </a:r>
+          </a:p>
+        </p:txBody>
+      </p:sp>
+      <p:sp>
+        <p:nvSpPr>
+          <p:cNvPr id="4" name="Content Placeholder 3">
             <a:extLst>
               <a:ext uri="{FF2B5EF4-FFF2-40B4-BE49-F238E27FC236}">
-                <a16:creationId xmlns:a16="http://schemas.microsoft.com/office/drawing/2014/main" id="{088F3AB2-213F-40DE-89FE-B050C108D933}"/>
+                <a16:creationId xmlns:a16="http://schemas.microsoft.com/office/drawing/2014/main" id="{835344D7-D47E-414A-97EC-07594FE8A744}"/>
               </a:ext>
             </a:extLst>
           </p:cNvPr>
@@ -7396,7 +7547,7 @@
             <a:spLocks noGrp="1"/>
           </p:cNvSpPr>
           <p:nvPr>
-            <p:ph sz="half" idx="1"/>
+            <p:ph idx="1"/>
           </p:nvPr>
         </p:nvSpPr>
         <p:spPr/>
@@ -7406,65 +7557,43 @@
           <a:p>
             <a:r>
               <a:rPr lang="en-US" dirty="0"/>
-              <a:t>NI Linux RT targets </a:t>
-            </a:r>
-            <a:r>
-              <a:rPr lang="en-US" b="1" dirty="0"/>
-              <a:t>already have </a:t>
-            </a:r>
-            <a:r>
-              <a:rPr lang="en-US" dirty="0"/>
-              <a:t>a syslog-ng daemon running</a:t>
-            </a:r>
-          </a:p>
-          <a:p>
-            <a:r>
-              <a:rPr lang="en-US" dirty="0"/>
-              <a:t>DCAF taps into the existing background process to log and report messages</a:t>
-            </a:r>
-          </a:p>
-          <a:p>
-            <a:r>
-              <a:rPr lang="en-US" dirty="0"/>
-              <a:t>You can, too!</a:t>
-            </a:r>
-          </a:p>
-        </p:txBody>
-      </p:sp>
-      <p:pic>
-        <p:nvPicPr>
-          <p:cNvPr id="7" name="Picture 6">
-            <a:extLst>
-              <a:ext uri="{FF2B5EF4-FFF2-40B4-BE49-F238E27FC236}">
-                <a16:creationId xmlns:a16="http://schemas.microsoft.com/office/drawing/2014/main" id="{34BA4BC9-2EE0-464D-913D-5FCABF71CEC1}"/>
-              </a:ext>
-            </a:extLst>
-          </p:cNvPr>
-          <p:cNvPicPr>
-            <a:picLocks noChangeAspect="1"/>
-          </p:cNvPicPr>
-          <p:nvPr/>
-        </p:nvPicPr>
-        <p:blipFill>
-          <a:blip r:embed="rId3"/>
-          <a:stretch>
-            <a:fillRect/>
-          </a:stretch>
-        </p:blipFill>
-        <p:spPr>
-          <a:xfrm>
-            <a:off x="6172200" y="1143122"/>
-            <a:ext cx="5930747" cy="4571755"/>
-          </a:xfrm>
-          <a:prstGeom prst="rect">
-            <a:avLst/>
-          </a:prstGeom>
-        </p:spPr>
-      </p:pic>
+              <a:t>Use </a:t>
+            </a:r>
+            <a:r>
+              <a:rPr lang="en-US" dirty="0" err="1"/>
+              <a:t>breakcpoints</a:t>
+            </a:r>
+            <a:endParaRPr lang="en-US" dirty="0"/>
+          </a:p>
+          <a:p>
+            <a:r>
+              <a:rPr lang="en-US" dirty="0"/>
+              <a:t>Use </a:t>
+            </a:r>
+            <a:r>
+              <a:rPr lang="en-US" dirty="0" err="1"/>
+              <a:t>nonreentrant</a:t>
+            </a:r>
+            <a:r>
+              <a:rPr lang="en-US" dirty="0"/>
+              <a:t> Vis (useful if you only have 1 instance)</a:t>
+            </a:r>
+          </a:p>
+          <a:p>
+            <a:r>
+              <a:rPr lang="en-US" dirty="0"/>
+              <a:t>Use syslog (but include clone information)</a:t>
+            </a:r>
+          </a:p>
+          <a:p>
+            <a:endParaRPr lang="en-US" dirty="0"/>
+          </a:p>
+        </p:txBody>
+      </p:sp>
     </p:spTree>
     <p:extLst>
       <p:ext uri="{BB962C8B-B14F-4D97-AF65-F5344CB8AC3E}">
-        <p14:creationId xmlns:p14="http://schemas.microsoft.com/office/powerpoint/2010/main" val="2600151340"/>
+        <p14:creationId xmlns:p14="http://schemas.microsoft.com/office/powerpoint/2010/main" val="31355040"/>
       </p:ext>
     </p:extLst>
   </p:cSld>
@@ -7514,7 +7643,7 @@
           <a:p>
             <a:r>
               <a:rPr lang="en-US" dirty="0"/>
-              <a:t>Tag View</a:t>
+              <a:t>Running Modules Outside of the Engine</a:t>
             </a:r>
           </a:p>
         </p:txBody>
@@ -7522,7 +7651,7 @@
     </p:spTree>
     <p:extLst>
       <p:ext uri="{BB962C8B-B14F-4D97-AF65-F5344CB8AC3E}">
-        <p14:creationId xmlns:p14="http://schemas.microsoft.com/office/powerpoint/2010/main" val="2125537668"/>
+        <p14:creationId xmlns:p14="http://schemas.microsoft.com/office/powerpoint/2010/main" val="1684131035"/>
       </p:ext>
     </p:extLst>
   </p:cSld>
@@ -7551,6 +7680,181 @@
       </p:grpSpPr>
       <p:sp>
         <p:nvSpPr>
+          <p:cNvPr id="3" name="Title 2">
+            <a:extLst>
+              <a:ext uri="{FF2B5EF4-FFF2-40B4-BE49-F238E27FC236}">
+                <a16:creationId xmlns:a16="http://schemas.microsoft.com/office/drawing/2014/main" id="{E2F58680-E048-4249-8517-2B6D459C7391}"/>
+              </a:ext>
+            </a:extLst>
+          </p:cNvPr>
+          <p:cNvSpPr>
+            <a:spLocks noGrp="1"/>
+          </p:cNvSpPr>
+          <p:nvPr>
+            <p:ph type="title"/>
+          </p:nvPr>
+        </p:nvSpPr>
+        <p:spPr/>
+        <p:txBody>
+          <a:bodyPr/>
+          <a:lstStyle/>
+          <a:p>
+            <a:r>
+              <a:rPr lang="en-US" dirty="0"/>
+              <a:t>Make sure parts work before testing the whole</a:t>
+            </a:r>
+          </a:p>
+        </p:txBody>
+      </p:sp>
+      <p:sp>
+        <p:nvSpPr>
+          <p:cNvPr id="4" name="Content Placeholder 3">
+            <a:extLst>
+              <a:ext uri="{FF2B5EF4-FFF2-40B4-BE49-F238E27FC236}">
+                <a16:creationId xmlns:a16="http://schemas.microsoft.com/office/drawing/2014/main" id="{5744EC8B-4C4A-4237-A990-5CC8E90D971C}"/>
+              </a:ext>
+            </a:extLst>
+          </p:cNvPr>
+          <p:cNvSpPr>
+            <a:spLocks noGrp="1"/>
+          </p:cNvSpPr>
+          <p:nvPr>
+            <p:ph idx="1"/>
+          </p:nvPr>
+        </p:nvSpPr>
+        <p:spPr/>
+        <p:txBody>
+          <a:bodyPr/>
+          <a:lstStyle/>
+          <a:p>
+            <a:r>
+              <a:rPr lang="en-US" dirty="0"/>
+              <a:t>Test the module with Unit Test of test outside of the engine</a:t>
+            </a:r>
+          </a:p>
+          <a:p>
+            <a:r>
+              <a:rPr lang="en-US" dirty="0"/>
+              <a:t>Sometimes you need to test in the engine, publish the tags.</a:t>
+            </a:r>
+          </a:p>
+          <a:p>
+            <a:endParaRPr lang="en-US" dirty="0"/>
+          </a:p>
+        </p:txBody>
+      </p:sp>
+    </p:spTree>
+    <p:extLst>
+      <p:ext uri="{BB962C8B-B14F-4D97-AF65-F5344CB8AC3E}">
+        <p14:creationId xmlns:p14="http://schemas.microsoft.com/office/powerpoint/2010/main" val="2683477547"/>
+      </p:ext>
+    </p:extLst>
+  </p:cSld>
+  <p:clrMapOvr>
+    <a:masterClrMapping/>
+  </p:clrMapOvr>
+</p:sld>
+</file>
+
+<file path=ppt/slides/slide14.xml><?xml version="1.0" encoding="utf-8"?>
+<p:sld xmlns:a="http://schemas.openxmlformats.org/drawingml/2006/main" xmlns:r="http://schemas.openxmlformats.org/officeDocument/2006/relationships" xmlns:p="http://schemas.openxmlformats.org/presentationml/2006/main">
+  <p:cSld>
+    <p:spTree>
+      <p:nvGrpSpPr>
+        <p:cNvPr id="1" name=""/>
+        <p:cNvGrpSpPr/>
+        <p:nvPr/>
+      </p:nvGrpSpPr>
+      <p:grpSpPr>
+        <a:xfrm>
+          <a:off x="0" y="0"/>
+          <a:ext cx="0" cy="0"/>
+          <a:chOff x="0" y="0"/>
+          <a:chExt cx="0" cy="0"/>
+        </a:xfrm>
+      </p:grpSpPr>
+      <p:sp>
+        <p:nvSpPr>
+          <p:cNvPr id="2" name="Title 1">
+            <a:extLst>
+              <a:ext uri="{FF2B5EF4-FFF2-40B4-BE49-F238E27FC236}">
+                <a16:creationId xmlns:a16="http://schemas.microsoft.com/office/drawing/2014/main" id="{DC3DD4B3-2936-4F19-B1C4-025DA874A6A8}"/>
+              </a:ext>
+            </a:extLst>
+          </p:cNvPr>
+          <p:cNvSpPr>
+            <a:spLocks noGrp="1"/>
+          </p:cNvSpPr>
+          <p:nvPr>
+            <p:ph type="title"/>
+          </p:nvPr>
+        </p:nvSpPr>
+        <p:spPr/>
+        <p:txBody>
+          <a:bodyPr/>
+          <a:lstStyle/>
+          <a:p>
+            <a:endParaRPr lang="en-US" dirty="0"/>
+          </a:p>
+        </p:txBody>
+      </p:sp>
+      <p:sp>
+        <p:nvSpPr>
+          <p:cNvPr id="3" name="Content Placeholder 2">
+            <a:extLst>
+              <a:ext uri="{FF2B5EF4-FFF2-40B4-BE49-F238E27FC236}">
+                <a16:creationId xmlns:a16="http://schemas.microsoft.com/office/drawing/2014/main" id="{0AC0E4A4-7114-49CD-BAC9-C779530AAE65}"/>
+              </a:ext>
+            </a:extLst>
+          </p:cNvPr>
+          <p:cNvSpPr>
+            <a:spLocks noGrp="1"/>
+          </p:cNvSpPr>
+          <p:nvPr>
+            <p:ph idx="1"/>
+          </p:nvPr>
+        </p:nvSpPr>
+        <p:spPr/>
+        <p:txBody>
+          <a:bodyPr/>
+          <a:lstStyle/>
+          <a:p>
+            <a:endParaRPr lang="en-US"/>
+          </a:p>
+        </p:txBody>
+      </p:sp>
+    </p:spTree>
+    <p:extLst>
+      <p:ext uri="{BB962C8B-B14F-4D97-AF65-F5344CB8AC3E}">
+        <p14:creationId xmlns:p14="http://schemas.microsoft.com/office/powerpoint/2010/main" val="2026569288"/>
+      </p:ext>
+    </p:extLst>
+  </p:cSld>
+  <p:clrMapOvr>
+    <a:masterClrMapping/>
+  </p:clrMapOvr>
+</p:sld>
+</file>
+
+<file path=ppt/slides/slide15.xml><?xml version="1.0" encoding="utf-8"?>
+<p:sld xmlns:a="http://schemas.openxmlformats.org/drawingml/2006/main" xmlns:r="http://schemas.openxmlformats.org/officeDocument/2006/relationships" xmlns:p="http://schemas.openxmlformats.org/presentationml/2006/main">
+  <p:cSld>
+    <p:spTree>
+      <p:nvGrpSpPr>
+        <p:cNvPr id="1" name=""/>
+        <p:cNvGrpSpPr/>
+        <p:nvPr/>
+      </p:nvGrpSpPr>
+      <p:grpSpPr>
+        <a:xfrm>
+          <a:off x="0" y="0"/>
+          <a:ext cx="0" cy="0"/>
+          <a:chOff x="0" y="0"/>
+          <a:chExt cx="0" cy="0"/>
+        </a:xfrm>
+      </p:grpSpPr>
+      <p:sp>
+        <p:nvSpPr>
           <p:cNvPr id="6" name="Text Placeholder 5">
             <a:extLst>
               <a:ext uri="{FF2B5EF4-FFF2-40B4-BE49-F238E27FC236}">
@@ -7572,7 +7876,7 @@
           <a:p>
             <a:r>
               <a:rPr lang="en-US" dirty="0"/>
-              <a:t>CVT</a:t>
+              <a:t>Syslog</a:t>
             </a:r>
           </a:p>
         </p:txBody>
@@ -7580,7 +7884,459 @@
     </p:spTree>
     <p:extLst>
       <p:ext uri="{BB962C8B-B14F-4D97-AF65-F5344CB8AC3E}">
-        <p14:creationId xmlns:p14="http://schemas.microsoft.com/office/powerpoint/2010/main" val="3224837406"/>
+        <p14:creationId xmlns:p14="http://schemas.microsoft.com/office/powerpoint/2010/main" val="1126713205"/>
+      </p:ext>
+    </p:extLst>
+  </p:cSld>
+  <p:clrMapOvr>
+    <a:masterClrMapping/>
+  </p:clrMapOvr>
+</p:sld>
+</file>
+
+<file path=ppt/slides/slide16.xml><?xml version="1.0" encoding="utf-8"?>
+<p:sld xmlns:a="http://schemas.openxmlformats.org/drawingml/2006/main" xmlns:r="http://schemas.openxmlformats.org/officeDocument/2006/relationships" xmlns:p="http://schemas.openxmlformats.org/presentationml/2006/main">
+  <p:cSld>
+    <p:spTree>
+      <p:nvGrpSpPr>
+        <p:cNvPr id="1" name=""/>
+        <p:cNvGrpSpPr/>
+        <p:nvPr/>
+      </p:nvGrpSpPr>
+      <p:grpSpPr>
+        <a:xfrm>
+          <a:off x="0" y="0"/>
+          <a:ext cx="0" cy="0"/>
+          <a:chOff x="0" y="0"/>
+          <a:chExt cx="0" cy="0"/>
+        </a:xfrm>
+      </p:grpSpPr>
+      <p:sp>
+        <p:nvSpPr>
+          <p:cNvPr id="2" name="Title 1"/>
+          <p:cNvSpPr>
+            <a:spLocks noGrp="1"/>
+          </p:cNvSpPr>
+          <p:nvPr>
+            <p:ph type="title"/>
+          </p:nvPr>
+        </p:nvSpPr>
+        <p:spPr/>
+        <p:txBody>
+          <a:bodyPr/>
+          <a:lstStyle/>
+          <a:p>
+            <a:r>
+              <a:rPr lang="en-US" dirty="0"/>
+              <a:t>Syslog</a:t>
+            </a:r>
+          </a:p>
+        </p:txBody>
+      </p:sp>
+      <p:sp>
+        <p:nvSpPr>
+          <p:cNvPr id="3" name="Content Placeholder 2"/>
+          <p:cNvSpPr>
+            <a:spLocks noGrp="1"/>
+          </p:cNvSpPr>
+          <p:nvPr>
+            <p:ph idx="1"/>
+          </p:nvPr>
+        </p:nvSpPr>
+        <p:spPr/>
+        <p:txBody>
+          <a:bodyPr/>
+          <a:lstStyle/>
+          <a:p>
+            <a:r>
+              <a:rPr lang="en-US" dirty="0"/>
+              <a:t>Available in Linux RT Targets</a:t>
+            </a:r>
+          </a:p>
+          <a:p>
+            <a:r>
+              <a:rPr lang="en-US" dirty="0"/>
+              <a:t>Event sent to Log:</a:t>
+            </a:r>
+          </a:p>
+          <a:p>
+            <a:pPr lvl="1"/>
+            <a:r>
+              <a:rPr lang="en-US" dirty="0"/>
+              <a:t>Initialization and shutdown of all software modules</a:t>
+            </a:r>
+          </a:p>
+          <a:p>
+            <a:pPr lvl="1"/>
+            <a:r>
+              <a:rPr lang="en-US" dirty="0"/>
+              <a:t>Any error reported to the engine</a:t>
+            </a:r>
+          </a:p>
+          <a:p>
+            <a:pPr lvl="1"/>
+            <a:r>
+              <a:rPr lang="en-US" dirty="0"/>
+              <a:t>Any module trace messages added via the API</a:t>
+            </a:r>
+          </a:p>
+          <a:p>
+            <a:endParaRPr lang="en-US" dirty="0"/>
+          </a:p>
+        </p:txBody>
+      </p:sp>
+      <p:pic>
+        <p:nvPicPr>
+          <p:cNvPr id="5" name="Picture 4"/>
+          <p:cNvPicPr>
+            <a:picLocks noChangeAspect="1"/>
+          </p:cNvPicPr>
+          <p:nvPr/>
+        </p:nvPicPr>
+        <p:blipFill>
+          <a:blip r:embed="rId2"/>
+          <a:stretch>
+            <a:fillRect/>
+          </a:stretch>
+        </p:blipFill>
+        <p:spPr>
+          <a:xfrm>
+            <a:off x="765507" y="4436698"/>
+            <a:ext cx="9376010" cy="1875202"/>
+          </a:xfrm>
+          <a:prstGeom prst="rect">
+            <a:avLst/>
+          </a:prstGeom>
+        </p:spPr>
+      </p:pic>
+    </p:spTree>
+    <p:extLst>
+      <p:ext uri="{BB962C8B-B14F-4D97-AF65-F5344CB8AC3E}">
+        <p14:creationId xmlns:p14="http://schemas.microsoft.com/office/powerpoint/2010/main" val="292420189"/>
+      </p:ext>
+    </p:extLst>
+  </p:cSld>
+  <p:clrMapOvr>
+    <a:masterClrMapping/>
+  </p:clrMapOvr>
+</p:sld>
+</file>
+
+<file path=ppt/slides/slide17.xml><?xml version="1.0" encoding="utf-8"?>
+<p:sld xmlns:a="http://schemas.openxmlformats.org/drawingml/2006/main" xmlns:r="http://schemas.openxmlformats.org/officeDocument/2006/relationships" xmlns:p="http://schemas.openxmlformats.org/presentationml/2006/main">
+  <p:cSld>
+    <p:spTree>
+      <p:nvGrpSpPr>
+        <p:cNvPr id="1" name=""/>
+        <p:cNvGrpSpPr/>
+        <p:nvPr/>
+      </p:nvGrpSpPr>
+      <p:grpSpPr>
+        <a:xfrm>
+          <a:off x="0" y="0"/>
+          <a:ext cx="0" cy="0"/>
+          <a:chOff x="0" y="0"/>
+          <a:chExt cx="0" cy="0"/>
+        </a:xfrm>
+      </p:grpSpPr>
+      <p:sp>
+        <p:nvSpPr>
+          <p:cNvPr id="2" name="Title 1"/>
+          <p:cNvSpPr>
+            <a:spLocks noGrp="1"/>
+          </p:cNvSpPr>
+          <p:nvPr>
+            <p:ph type="title"/>
+          </p:nvPr>
+        </p:nvSpPr>
+        <p:spPr/>
+        <p:txBody>
+          <a:bodyPr/>
+          <a:lstStyle/>
+          <a:p>
+            <a:r>
+              <a:rPr lang="en-US" dirty="0"/>
+              <a:t>Syslog - System Log View</a:t>
+            </a:r>
+          </a:p>
+        </p:txBody>
+      </p:sp>
+      <p:pic>
+        <p:nvPicPr>
+          <p:cNvPr id="1026" name="Picture 2" descr="wif.png"/>
+          <p:cNvPicPr>
+            <a:picLocks noGrp="1" noChangeAspect="1" noChangeArrowheads="1"/>
+          </p:cNvPicPr>
+          <p:nvPr>
+            <p:ph idx="1"/>
+          </p:nvPr>
+        </p:nvPicPr>
+        <p:blipFill>
+          <a:blip r:embed="rId2">
+            <a:extLst>
+              <a:ext uri="{28A0092B-C50C-407E-A947-70E740481C1C}">
+                <a14:useLocalDpi xmlns:a14="http://schemas.microsoft.com/office/drawing/2010/main" val="0"/>
+              </a:ext>
+            </a:extLst>
+          </a:blip>
+          <a:srcRect/>
+          <a:stretch>
+            <a:fillRect/>
+          </a:stretch>
+        </p:blipFill>
+        <p:spPr bwMode="auto">
+          <a:xfrm>
+            <a:off x="652462" y="1383412"/>
+            <a:ext cx="10887075" cy="4091176"/>
+          </a:xfrm>
+          <a:prstGeom prst="rect">
+            <a:avLst/>
+          </a:prstGeom>
+          <a:noFill/>
+          <a:extLst>
+            <a:ext uri="{909E8E84-426E-40DD-AFC4-6F175D3DCCD1}">
+              <a14:hiddenFill xmlns:a14="http://schemas.microsoft.com/office/drawing/2010/main">
+                <a:solidFill>
+                  <a:srgbClr val="FFFFFF"/>
+                </a:solidFill>
+              </a14:hiddenFill>
+            </a:ext>
+          </a:extLst>
+        </p:spPr>
+      </p:pic>
+    </p:spTree>
+    <p:extLst>
+      <p:ext uri="{BB962C8B-B14F-4D97-AF65-F5344CB8AC3E}">
+        <p14:creationId xmlns:p14="http://schemas.microsoft.com/office/powerpoint/2010/main" val="1056925072"/>
+      </p:ext>
+    </p:extLst>
+  </p:cSld>
+  <p:clrMapOvr>
+    <a:masterClrMapping/>
+  </p:clrMapOvr>
+</p:sld>
+</file>
+
+<file path=ppt/slides/slide18.xml><?xml version="1.0" encoding="utf-8"?>
+<p:sld xmlns:a="http://schemas.openxmlformats.org/drawingml/2006/main" xmlns:r="http://schemas.openxmlformats.org/officeDocument/2006/relationships" xmlns:p="http://schemas.openxmlformats.org/presentationml/2006/main">
+  <p:cSld>
+    <p:spTree>
+      <p:nvGrpSpPr>
+        <p:cNvPr id="1" name=""/>
+        <p:cNvGrpSpPr/>
+        <p:nvPr/>
+      </p:nvGrpSpPr>
+      <p:grpSpPr>
+        <a:xfrm>
+          <a:off x="0" y="0"/>
+          <a:ext cx="0" cy="0"/>
+          <a:chOff x="0" y="0"/>
+          <a:chExt cx="0" cy="0"/>
+        </a:xfrm>
+      </p:grpSpPr>
+      <p:sp>
+        <p:nvSpPr>
+          <p:cNvPr id="2" name="Title 1"/>
+          <p:cNvSpPr>
+            <a:spLocks noGrp="1"/>
+          </p:cNvSpPr>
+          <p:nvPr>
+            <p:ph type="title"/>
+          </p:nvPr>
+        </p:nvSpPr>
+        <p:spPr/>
+        <p:txBody>
+          <a:bodyPr/>
+          <a:lstStyle/>
+          <a:p>
+            <a:r>
+              <a:rPr lang="en-US" dirty="0"/>
+              <a:t>Syslog - System Log View</a:t>
+            </a:r>
+          </a:p>
+        </p:txBody>
+      </p:sp>
+      <p:pic>
+        <p:nvPicPr>
+          <p:cNvPr id="5" name="Picture 4" descr="error.png"/>
+          <p:cNvPicPr>
+            <a:picLocks noChangeAspect="1" noChangeArrowheads="1"/>
+          </p:cNvPicPr>
+          <p:nvPr/>
+        </p:nvPicPr>
+        <p:blipFill>
+          <a:blip r:embed="rId2">
+            <a:extLst>
+              <a:ext uri="{28A0092B-C50C-407E-A947-70E740481C1C}">
+                <a14:useLocalDpi xmlns:a14="http://schemas.microsoft.com/office/drawing/2010/main" val="0"/>
+              </a:ext>
+            </a:extLst>
+          </a:blip>
+          <a:srcRect/>
+          <a:stretch>
+            <a:fillRect/>
+          </a:stretch>
+        </p:blipFill>
+        <p:spPr bwMode="auto">
+          <a:xfrm>
+            <a:off x="0" y="2333625"/>
+            <a:ext cx="12192000" cy="2190750"/>
+          </a:xfrm>
+          <a:prstGeom prst="rect">
+            <a:avLst/>
+          </a:prstGeom>
+          <a:noFill/>
+          <a:extLst>
+            <a:ext uri="{909E8E84-426E-40DD-AFC4-6F175D3DCCD1}">
+              <a14:hiddenFill xmlns:a14="http://schemas.microsoft.com/office/drawing/2010/main">
+                <a:solidFill>
+                  <a:srgbClr val="FFFFFF"/>
+                </a:solidFill>
+              </a14:hiddenFill>
+            </a:ext>
+          </a:extLst>
+        </p:spPr>
+      </p:pic>
+    </p:spTree>
+    <p:extLst>
+      <p:ext uri="{BB962C8B-B14F-4D97-AF65-F5344CB8AC3E}">
+        <p14:creationId xmlns:p14="http://schemas.microsoft.com/office/powerpoint/2010/main" val="3135684955"/>
+      </p:ext>
+    </p:extLst>
+  </p:cSld>
+  <p:clrMapOvr>
+    <a:masterClrMapping/>
+  </p:clrMapOvr>
+</p:sld>
+</file>
+
+<file path=ppt/slides/slide19.xml><?xml version="1.0" encoding="utf-8"?>
+<p:sld xmlns:a="http://schemas.openxmlformats.org/drawingml/2006/main" xmlns:r="http://schemas.openxmlformats.org/officeDocument/2006/relationships" xmlns:p="http://schemas.openxmlformats.org/presentationml/2006/main">
+  <p:cSld>
+    <p:spTree>
+      <p:nvGrpSpPr>
+        <p:cNvPr id="1" name=""/>
+        <p:cNvGrpSpPr/>
+        <p:nvPr/>
+      </p:nvGrpSpPr>
+      <p:grpSpPr>
+        <a:xfrm>
+          <a:off x="0" y="0"/>
+          <a:ext cx="0" cy="0"/>
+          <a:chOff x="0" y="0"/>
+          <a:chExt cx="0" cy="0"/>
+        </a:xfrm>
+      </p:grpSpPr>
+      <p:sp>
+        <p:nvSpPr>
+          <p:cNvPr id="2" name="Title 1">
+            <a:extLst>
+              <a:ext uri="{FF2B5EF4-FFF2-40B4-BE49-F238E27FC236}">
+                <a16:creationId xmlns:a16="http://schemas.microsoft.com/office/drawing/2014/main" id="{AABED4E5-1885-4213-AB73-5A879018F720}"/>
+              </a:ext>
+            </a:extLst>
+          </p:cNvPr>
+          <p:cNvSpPr>
+            <a:spLocks noGrp="1"/>
+          </p:cNvSpPr>
+          <p:nvPr>
+            <p:ph type="title"/>
+          </p:nvPr>
+        </p:nvSpPr>
+        <p:spPr/>
+        <p:txBody>
+          <a:bodyPr/>
+          <a:lstStyle/>
+          <a:p>
+            <a:r>
+              <a:rPr lang="en-US" dirty="0"/>
+              <a:t>Syslog</a:t>
+            </a:r>
+          </a:p>
+        </p:txBody>
+      </p:sp>
+      <p:sp>
+        <p:nvSpPr>
+          <p:cNvPr id="6" name="Content Placeholder 5">
+            <a:extLst>
+              <a:ext uri="{FF2B5EF4-FFF2-40B4-BE49-F238E27FC236}">
+                <a16:creationId xmlns:a16="http://schemas.microsoft.com/office/drawing/2014/main" id="{088F3AB2-213F-40DE-89FE-B050C108D933}"/>
+              </a:ext>
+            </a:extLst>
+          </p:cNvPr>
+          <p:cNvSpPr>
+            <a:spLocks noGrp="1"/>
+          </p:cNvSpPr>
+          <p:nvPr>
+            <p:ph sz="half" idx="1"/>
+          </p:nvPr>
+        </p:nvSpPr>
+        <p:spPr/>
+        <p:txBody>
+          <a:bodyPr/>
+          <a:lstStyle/>
+          <a:p>
+            <a:r>
+              <a:rPr lang="en-US" dirty="0"/>
+              <a:t>NI Linux RT targets </a:t>
+            </a:r>
+            <a:r>
+              <a:rPr lang="en-US" b="1" dirty="0"/>
+              <a:t>already have </a:t>
+            </a:r>
+            <a:r>
+              <a:rPr lang="en-US" dirty="0"/>
+              <a:t>a syslog-ng daemon running</a:t>
+            </a:r>
+          </a:p>
+          <a:p>
+            <a:r>
+              <a:rPr lang="en-US" dirty="0"/>
+              <a:t>DCAF taps into the existing background process to log and report messages</a:t>
+            </a:r>
+          </a:p>
+          <a:p>
+            <a:r>
+              <a:rPr lang="en-US" dirty="0"/>
+              <a:t>You can, too!</a:t>
+            </a:r>
+          </a:p>
+        </p:txBody>
+      </p:sp>
+      <p:pic>
+        <p:nvPicPr>
+          <p:cNvPr id="7" name="Picture 6">
+            <a:extLst>
+              <a:ext uri="{FF2B5EF4-FFF2-40B4-BE49-F238E27FC236}">
+                <a16:creationId xmlns:a16="http://schemas.microsoft.com/office/drawing/2014/main" id="{34BA4BC9-2EE0-464D-913D-5FCABF71CEC1}"/>
+              </a:ext>
+            </a:extLst>
+          </p:cNvPr>
+          <p:cNvPicPr>
+            <a:picLocks noChangeAspect="1"/>
+          </p:cNvPicPr>
+          <p:nvPr/>
+        </p:nvPicPr>
+        <p:blipFill>
+          <a:blip r:embed="rId3"/>
+          <a:stretch>
+            <a:fillRect/>
+          </a:stretch>
+        </p:blipFill>
+        <p:spPr>
+          <a:xfrm>
+            <a:off x="6172200" y="1143122"/>
+            <a:ext cx="5930747" cy="4571755"/>
+          </a:xfrm>
+          <a:prstGeom prst="rect">
+            <a:avLst/>
+          </a:prstGeom>
+        </p:spPr>
+      </p:pic>
+    </p:spTree>
+    <p:extLst>
+      <p:ext uri="{BB962C8B-B14F-4D97-AF65-F5344CB8AC3E}">
+        <p14:creationId xmlns:p14="http://schemas.microsoft.com/office/powerpoint/2010/main" val="2600151340"/>
       </p:ext>
     </p:extLst>
   </p:cSld>
@@ -7658,37 +8414,59 @@
           <a:p>
             <a:r>
               <a:rPr lang="en-US" dirty="0"/>
+              <a:t>RT debugging Challenges</a:t>
+            </a:r>
+          </a:p>
+          <a:p>
+            <a:r>
+              <a:rPr lang="en-US" dirty="0"/>
               <a:t>Basics RT Debugging</a:t>
             </a:r>
           </a:p>
           <a:p>
             <a:r>
               <a:rPr lang="en-US" dirty="0"/>
+              <a:t>Running modules outside of the Engine</a:t>
+            </a:r>
+          </a:p>
+          <a:p>
+            <a:r>
+              <a:rPr lang="en-US" dirty="0"/>
               <a:t>Debugging Reentrant Vis.</a:t>
             </a:r>
           </a:p>
           <a:p>
             <a:r>
               <a:rPr lang="en-US" dirty="0"/>
-              <a:t>Running modules outside of the Engine.</a:t>
-            </a:r>
-          </a:p>
-          <a:p>
+              <a:t>Debugging tools</a:t>
+            </a:r>
+          </a:p>
+          <a:p>
+            <a:pPr lvl="1"/>
             <a:r>
               <a:rPr lang="en-US" dirty="0"/>
               <a:t>Syslog</a:t>
             </a:r>
           </a:p>
           <a:p>
+            <a:pPr lvl="1"/>
             <a:r>
               <a:rPr lang="en-US" dirty="0"/>
               <a:t>Tag View</a:t>
             </a:r>
           </a:p>
           <a:p>
+            <a:pPr lvl="1"/>
             <a:r>
               <a:rPr lang="en-US" dirty="0"/>
               <a:t>CVT</a:t>
+            </a:r>
+          </a:p>
+          <a:p>
+            <a:pPr lvl="1"/>
+            <a:r>
+              <a:rPr lang="en-US" dirty="0"/>
+              <a:t>Shared Variables.</a:t>
             </a:r>
           </a:p>
           <a:p>
@@ -7700,6 +8478,264 @@
     <p:extLst>
       <p:ext uri="{BB962C8B-B14F-4D97-AF65-F5344CB8AC3E}">
         <p14:creationId xmlns:p14="http://schemas.microsoft.com/office/powerpoint/2010/main" val="1429575513"/>
+      </p:ext>
+    </p:extLst>
+  </p:cSld>
+  <p:clrMapOvr>
+    <a:masterClrMapping/>
+  </p:clrMapOvr>
+</p:sld>
+</file>
+
+<file path=ppt/slides/slide20.xml><?xml version="1.0" encoding="utf-8"?>
+<p:sld xmlns:a="http://schemas.openxmlformats.org/drawingml/2006/main" xmlns:r="http://schemas.openxmlformats.org/officeDocument/2006/relationships" xmlns:p="http://schemas.openxmlformats.org/presentationml/2006/main">
+  <p:cSld>
+    <p:spTree>
+      <p:nvGrpSpPr>
+        <p:cNvPr id="1" name=""/>
+        <p:cNvGrpSpPr/>
+        <p:nvPr/>
+      </p:nvGrpSpPr>
+      <p:grpSpPr>
+        <a:xfrm>
+          <a:off x="0" y="0"/>
+          <a:ext cx="0" cy="0"/>
+          <a:chOff x="0" y="0"/>
+          <a:chExt cx="0" cy="0"/>
+        </a:xfrm>
+      </p:grpSpPr>
+      <p:sp>
+        <p:nvSpPr>
+          <p:cNvPr id="6" name="Text Placeholder 5">
+            <a:extLst>
+              <a:ext uri="{FF2B5EF4-FFF2-40B4-BE49-F238E27FC236}">
+                <a16:creationId xmlns:a16="http://schemas.microsoft.com/office/drawing/2014/main" id="{AE7D9B36-B649-4C5D-AE68-ED0ADFB9E016}"/>
+              </a:ext>
+            </a:extLst>
+          </p:cNvPr>
+          <p:cNvSpPr>
+            <a:spLocks noGrp="1"/>
+          </p:cNvSpPr>
+          <p:nvPr>
+            <p:ph type="body" sz="quarter" idx="10"/>
+          </p:nvPr>
+        </p:nvSpPr>
+        <p:spPr/>
+        <p:txBody>
+          <a:bodyPr/>
+          <a:lstStyle/>
+          <a:p>
+            <a:r>
+              <a:rPr lang="en-US" dirty="0"/>
+              <a:t>CVT</a:t>
+            </a:r>
+          </a:p>
+        </p:txBody>
+      </p:sp>
+    </p:spTree>
+    <p:extLst>
+      <p:ext uri="{BB962C8B-B14F-4D97-AF65-F5344CB8AC3E}">
+        <p14:creationId xmlns:p14="http://schemas.microsoft.com/office/powerpoint/2010/main" val="3224837406"/>
+      </p:ext>
+    </p:extLst>
+  </p:cSld>
+  <p:clrMapOvr>
+    <a:masterClrMapping/>
+  </p:clrMapOvr>
+</p:sld>
+</file>
+
+<file path=ppt/slides/slide21.xml><?xml version="1.0" encoding="utf-8"?>
+<p:sld xmlns:a="http://schemas.openxmlformats.org/drawingml/2006/main" xmlns:r="http://schemas.openxmlformats.org/officeDocument/2006/relationships" xmlns:p="http://schemas.openxmlformats.org/presentationml/2006/main">
+  <p:cSld>
+    <p:spTree>
+      <p:nvGrpSpPr>
+        <p:cNvPr id="1" name=""/>
+        <p:cNvGrpSpPr/>
+        <p:nvPr/>
+      </p:nvGrpSpPr>
+      <p:grpSpPr>
+        <a:xfrm>
+          <a:off x="0" y="0"/>
+          <a:ext cx="0" cy="0"/>
+          <a:chOff x="0" y="0"/>
+          <a:chExt cx="0" cy="0"/>
+        </a:xfrm>
+      </p:grpSpPr>
+      <p:sp>
+        <p:nvSpPr>
+          <p:cNvPr id="3" name="Title 2">
+            <a:extLst>
+              <a:ext uri="{FF2B5EF4-FFF2-40B4-BE49-F238E27FC236}">
+                <a16:creationId xmlns:a16="http://schemas.microsoft.com/office/drawing/2014/main" id="{B2039BAC-96DA-4E31-BD10-DFBC32F234C0}"/>
+              </a:ext>
+            </a:extLst>
+          </p:cNvPr>
+          <p:cNvSpPr>
+            <a:spLocks noGrp="1"/>
+          </p:cNvSpPr>
+          <p:nvPr>
+            <p:ph type="title"/>
+          </p:nvPr>
+        </p:nvSpPr>
+        <p:spPr/>
+        <p:txBody>
+          <a:bodyPr/>
+          <a:lstStyle/>
+          <a:p>
+            <a:r>
+              <a:rPr lang="en-US" dirty="0"/>
+              <a:t>What is CVT</a:t>
+            </a:r>
+            <a:br>
+              <a:rPr lang="en-US" dirty="0"/>
+            </a:br>
+            <a:endParaRPr lang="en-US" dirty="0"/>
+          </a:p>
+        </p:txBody>
+      </p:sp>
+      <p:sp>
+        <p:nvSpPr>
+          <p:cNvPr id="4" name="Content Placeholder 3">
+            <a:extLst>
+              <a:ext uri="{FF2B5EF4-FFF2-40B4-BE49-F238E27FC236}">
+                <a16:creationId xmlns:a16="http://schemas.microsoft.com/office/drawing/2014/main" id="{D868F674-D2E1-4342-8B23-4C1A7D786F88}"/>
+              </a:ext>
+            </a:extLst>
+          </p:cNvPr>
+          <p:cNvSpPr>
+            <a:spLocks noGrp="1"/>
+          </p:cNvSpPr>
+          <p:nvPr>
+            <p:ph idx="1"/>
+          </p:nvPr>
+        </p:nvSpPr>
+        <p:spPr/>
+        <p:txBody>
+          <a:bodyPr/>
+          <a:lstStyle/>
+          <a:p>
+            <a:r>
+              <a:rPr lang="en-US" dirty="0"/>
+              <a:t>Use DCAF CVT Module</a:t>
+            </a:r>
+          </a:p>
+          <a:p>
+            <a:r>
+              <a:rPr lang="en-US" dirty="0"/>
+              <a:t>ADD CVT tags to the main VI</a:t>
+            </a:r>
+          </a:p>
+          <a:p>
+            <a:r>
+              <a:rPr lang="en-US" dirty="0"/>
+              <a:t>Make sure the name is correct (handle errors for the tags)</a:t>
+            </a:r>
+          </a:p>
+          <a:p>
+            <a:endParaRPr lang="en-US" dirty="0"/>
+          </a:p>
+        </p:txBody>
+      </p:sp>
+    </p:spTree>
+    <p:extLst>
+      <p:ext uri="{BB962C8B-B14F-4D97-AF65-F5344CB8AC3E}">
+        <p14:creationId xmlns:p14="http://schemas.microsoft.com/office/powerpoint/2010/main" val="1616841979"/>
+      </p:ext>
+    </p:extLst>
+  </p:cSld>
+  <p:clrMapOvr>
+    <a:masterClrMapping/>
+  </p:clrMapOvr>
+</p:sld>
+</file>
+
+<file path=ppt/slides/slide22.xml><?xml version="1.0" encoding="utf-8"?>
+<p:sld xmlns:a="http://schemas.openxmlformats.org/drawingml/2006/main" xmlns:r="http://schemas.openxmlformats.org/officeDocument/2006/relationships" xmlns:p="http://schemas.openxmlformats.org/presentationml/2006/main">
+  <p:cSld>
+    <p:spTree>
+      <p:nvGrpSpPr>
+        <p:cNvPr id="1" name=""/>
+        <p:cNvGrpSpPr/>
+        <p:nvPr/>
+      </p:nvGrpSpPr>
+      <p:grpSpPr>
+        <a:xfrm>
+          <a:off x="0" y="0"/>
+          <a:ext cx="0" cy="0"/>
+          <a:chOff x="0" y="0"/>
+          <a:chExt cx="0" cy="0"/>
+        </a:xfrm>
+      </p:grpSpPr>
+      <p:sp>
+        <p:nvSpPr>
+          <p:cNvPr id="2" name="Title 1">
+            <a:extLst>
+              <a:ext uri="{FF2B5EF4-FFF2-40B4-BE49-F238E27FC236}">
+                <a16:creationId xmlns:a16="http://schemas.microsoft.com/office/drawing/2014/main" id="{2C4B7262-05BC-4167-86D0-BE25C80A6E44}"/>
+              </a:ext>
+            </a:extLst>
+          </p:cNvPr>
+          <p:cNvSpPr>
+            <a:spLocks noGrp="1"/>
+          </p:cNvSpPr>
+          <p:nvPr>
+            <p:ph type="title"/>
+          </p:nvPr>
+        </p:nvSpPr>
+        <p:spPr/>
+        <p:txBody>
+          <a:bodyPr/>
+          <a:lstStyle/>
+          <a:p>
+            <a:r>
+              <a:rPr lang="en-US" dirty="0"/>
+              <a:t>Shared Variables</a:t>
+            </a:r>
+          </a:p>
+        </p:txBody>
+      </p:sp>
+      <p:sp>
+        <p:nvSpPr>
+          <p:cNvPr id="3" name="Content Placeholder 2">
+            <a:extLst>
+              <a:ext uri="{FF2B5EF4-FFF2-40B4-BE49-F238E27FC236}">
+                <a16:creationId xmlns:a16="http://schemas.microsoft.com/office/drawing/2014/main" id="{E9C316E0-2A3B-40EA-B732-13AA90DE3FED}"/>
+              </a:ext>
+            </a:extLst>
+          </p:cNvPr>
+          <p:cNvSpPr>
+            <a:spLocks noGrp="1"/>
+          </p:cNvSpPr>
+          <p:nvPr>
+            <p:ph idx="1"/>
+          </p:nvPr>
+        </p:nvSpPr>
+        <p:spPr/>
+        <p:txBody>
+          <a:bodyPr/>
+          <a:lstStyle/>
+          <a:p>
+            <a:r>
+              <a:rPr lang="en-US" dirty="0"/>
+              <a:t>Shared Variables have the limits but sometimes they can help debug RT applications</a:t>
+            </a:r>
+          </a:p>
+          <a:p>
+            <a:r>
+              <a:rPr lang="en-US" dirty="0"/>
+              <a:t>Use with care with Clones</a:t>
+            </a:r>
+          </a:p>
+          <a:p>
+            <a:endParaRPr lang="en-US" dirty="0"/>
+          </a:p>
+        </p:txBody>
+      </p:sp>
+    </p:spTree>
+    <p:extLst>
+      <p:ext uri="{BB962C8B-B14F-4D97-AF65-F5344CB8AC3E}">
+        <p14:creationId xmlns:p14="http://schemas.microsoft.com/office/powerpoint/2010/main" val="599492445"/>
       </p:ext>
     </p:extLst>
   </p:cSld>
@@ -7728,10 +8764,10 @@
       </p:grpSpPr>
       <p:sp>
         <p:nvSpPr>
-          <p:cNvPr id="6" name="Text Placeholder 5">
+          <p:cNvPr id="2" name="Title 1">
             <a:extLst>
               <a:ext uri="{FF2B5EF4-FFF2-40B4-BE49-F238E27FC236}">
-                <a16:creationId xmlns:a16="http://schemas.microsoft.com/office/drawing/2014/main" id="{AE7D9B36-B649-4C5D-AE68-ED0ADFB9E016}"/>
+                <a16:creationId xmlns:a16="http://schemas.microsoft.com/office/drawing/2014/main" id="{D2CEEE37-F647-4E1B-97CC-66E1342FAFE2}"/>
               </a:ext>
             </a:extLst>
           </p:cNvPr>
@@ -7739,7 +8775,7 @@
             <a:spLocks noGrp="1"/>
           </p:cNvSpPr>
           <p:nvPr>
-            <p:ph type="body" sz="quarter" idx="10"/>
+            <p:ph type="title"/>
           </p:nvPr>
         </p:nvSpPr>
         <p:spPr/>
@@ -7749,15 +8785,1002 @@
           <a:p>
             <a:r>
               <a:rPr lang="en-US" dirty="0"/>
-              <a:t>Basics RT Debugging</a:t>
-            </a:r>
+              <a:t>DCAF Temperature Chamber</a:t>
+            </a:r>
+          </a:p>
+        </p:txBody>
+      </p:sp>
+      <p:sp>
+        <p:nvSpPr>
+          <p:cNvPr id="4" name="Rectangle: Rounded Corners 3">
+            <a:extLst>
+              <a:ext uri="{FF2B5EF4-FFF2-40B4-BE49-F238E27FC236}">
+                <a16:creationId xmlns:a16="http://schemas.microsoft.com/office/drawing/2014/main" id="{59014E5B-15AD-46D7-9002-F28FEE0FB234}"/>
+              </a:ext>
+            </a:extLst>
+          </p:cNvPr>
+          <p:cNvSpPr/>
+          <p:nvPr/>
+        </p:nvSpPr>
+        <p:spPr>
+          <a:xfrm>
+            <a:off x="8165911" y="5822235"/>
+            <a:ext cx="1469409" cy="555009"/>
+          </a:xfrm>
+          <a:prstGeom prst="roundRect">
+            <a:avLst/>
+          </a:prstGeom>
+          <a:noFill/>
+          <a:ln w="12700">
+            <a:solidFill>
+              <a:schemeClr val="bg2">
+                <a:lumMod val="25000"/>
+              </a:schemeClr>
+            </a:solidFill>
+          </a:ln>
+          <a:effectLst/>
+        </p:spPr>
+        <p:style>
+          <a:lnRef idx="1">
+            <a:schemeClr val="accent1"/>
+          </a:lnRef>
+          <a:fillRef idx="3">
+            <a:schemeClr val="accent1"/>
+          </a:fillRef>
+          <a:effectRef idx="2">
+            <a:schemeClr val="accent1"/>
+          </a:effectRef>
+          <a:fontRef idx="minor">
+            <a:schemeClr val="lt1"/>
+          </a:fontRef>
+        </p:style>
+        <p:txBody>
+          <a:bodyPr rot="0" spcFirstLastPara="0" vertOverflow="overflow" horzOverflow="overflow" vert="horz" wrap="square" lIns="0" tIns="45720" rIns="0" bIns="45720" numCol="1" spcCol="0" rtlCol="0" fromWordArt="0" anchor="ctr" anchorCtr="0" forceAA="0" compatLnSpc="1">
+            <a:prstTxWarp prst="textNoShape">
+              <a:avLst/>
+            </a:prstTxWarp>
+            <a:noAutofit/>
+          </a:bodyPr>
+          <a:lstStyle/>
+          <a:p>
+            <a:pPr algn="ctr"/>
+            <a:r>
+              <a:rPr lang="en-US" sz="1600" dirty="0">
+                <a:solidFill>
+                  <a:schemeClr val="bg2">
+                    <a:lumMod val="25000"/>
+                  </a:schemeClr>
+                </a:solidFill>
+              </a:rPr>
+              <a:t>UI VI</a:t>
+            </a:r>
+          </a:p>
+        </p:txBody>
+      </p:sp>
+      <p:sp>
+        <p:nvSpPr>
+          <p:cNvPr id="5" name="Rectangle: Rounded Corners 4">
+            <a:extLst>
+              <a:ext uri="{FF2B5EF4-FFF2-40B4-BE49-F238E27FC236}">
+                <a16:creationId xmlns:a16="http://schemas.microsoft.com/office/drawing/2014/main" id="{8E805C10-171E-480D-BB41-F31C1A8CF706}"/>
+              </a:ext>
+            </a:extLst>
+          </p:cNvPr>
+          <p:cNvSpPr/>
+          <p:nvPr/>
+        </p:nvSpPr>
+        <p:spPr>
+          <a:xfrm>
+            <a:off x="5884459" y="5822236"/>
+            <a:ext cx="1469409" cy="555009"/>
+          </a:xfrm>
+          <a:prstGeom prst="roundRect">
+            <a:avLst/>
+          </a:prstGeom>
+          <a:noFill/>
+          <a:ln w="12700">
+            <a:solidFill>
+              <a:schemeClr val="bg2">
+                <a:lumMod val="25000"/>
+              </a:schemeClr>
+            </a:solidFill>
+          </a:ln>
+          <a:effectLst/>
+        </p:spPr>
+        <p:style>
+          <a:lnRef idx="1">
+            <a:schemeClr val="accent1"/>
+          </a:lnRef>
+          <a:fillRef idx="3">
+            <a:schemeClr val="accent1"/>
+          </a:fillRef>
+          <a:effectRef idx="2">
+            <a:schemeClr val="accent1"/>
+          </a:effectRef>
+          <a:fontRef idx="minor">
+            <a:schemeClr val="lt1"/>
+          </a:fontRef>
+        </p:style>
+        <p:txBody>
+          <a:bodyPr rot="0" spcFirstLastPara="0" vertOverflow="overflow" horzOverflow="overflow" vert="horz" wrap="square" lIns="0" tIns="45720" rIns="0" bIns="45720" numCol="1" spcCol="0" rtlCol="0" fromWordArt="0" anchor="ctr" anchorCtr="0" forceAA="0" compatLnSpc="1">
+            <a:prstTxWarp prst="textNoShape">
+              <a:avLst/>
+            </a:prstTxWarp>
+            <a:noAutofit/>
+          </a:bodyPr>
+          <a:lstStyle/>
+          <a:p>
+            <a:pPr algn="ctr"/>
+            <a:r>
+              <a:rPr lang="en-US" sz="1600" dirty="0">
+                <a:solidFill>
+                  <a:schemeClr val="bg2">
+                    <a:lumMod val="25000"/>
+                  </a:schemeClr>
+                </a:solidFill>
+              </a:rPr>
+              <a:t>DCAF UI Module</a:t>
+            </a:r>
+          </a:p>
+        </p:txBody>
+      </p:sp>
+      <p:sp>
+        <p:nvSpPr>
+          <p:cNvPr id="6" name="Rectangle: Rounded Corners 5">
+            <a:extLst>
+              <a:ext uri="{FF2B5EF4-FFF2-40B4-BE49-F238E27FC236}">
+                <a16:creationId xmlns:a16="http://schemas.microsoft.com/office/drawing/2014/main" id="{CF9BFA01-F2AD-4E30-A3E9-6AAAFD60AD25}"/>
+              </a:ext>
+            </a:extLst>
+          </p:cNvPr>
+          <p:cNvSpPr/>
+          <p:nvPr/>
+        </p:nvSpPr>
+        <p:spPr>
+          <a:xfrm>
+            <a:off x="2663585" y="3615177"/>
+            <a:ext cx="1469409" cy="555009"/>
+          </a:xfrm>
+          <a:prstGeom prst="roundRect">
+            <a:avLst/>
+          </a:prstGeom>
+          <a:noFill/>
+          <a:ln w="12700">
+            <a:solidFill>
+              <a:schemeClr val="bg2">
+                <a:lumMod val="25000"/>
+              </a:schemeClr>
+            </a:solidFill>
+          </a:ln>
+          <a:effectLst/>
+        </p:spPr>
+        <p:style>
+          <a:lnRef idx="1">
+            <a:schemeClr val="accent1"/>
+          </a:lnRef>
+          <a:fillRef idx="3">
+            <a:schemeClr val="accent1"/>
+          </a:fillRef>
+          <a:effectRef idx="2">
+            <a:schemeClr val="accent1"/>
+          </a:effectRef>
+          <a:fontRef idx="minor">
+            <a:schemeClr val="lt1"/>
+          </a:fontRef>
+        </p:style>
+        <p:txBody>
+          <a:bodyPr rot="0" spcFirstLastPara="0" vertOverflow="overflow" horzOverflow="overflow" vert="horz" wrap="square" lIns="0" tIns="45720" rIns="0" bIns="45720" numCol="1" spcCol="0" rtlCol="0" fromWordArt="0" anchor="ctr" anchorCtr="0" forceAA="0" compatLnSpc="1">
+            <a:prstTxWarp prst="textNoShape">
+              <a:avLst/>
+            </a:prstTxWarp>
+            <a:noAutofit/>
+          </a:bodyPr>
+          <a:lstStyle/>
+          <a:p>
+            <a:pPr algn="ctr"/>
+            <a:r>
+              <a:rPr lang="en-US" sz="1600" dirty="0">
+                <a:solidFill>
+                  <a:schemeClr val="bg2">
+                    <a:lumMod val="25000"/>
+                  </a:schemeClr>
+                </a:solidFill>
+              </a:rPr>
+              <a:t>DCAF UDP Module</a:t>
+            </a:r>
+          </a:p>
+        </p:txBody>
+      </p:sp>
+      <p:sp>
+        <p:nvSpPr>
+          <p:cNvPr id="7" name="Rectangle: Rounded Corners 6">
+            <a:extLst>
+              <a:ext uri="{FF2B5EF4-FFF2-40B4-BE49-F238E27FC236}">
+                <a16:creationId xmlns:a16="http://schemas.microsoft.com/office/drawing/2014/main" id="{627B3680-9440-47BE-BDC8-EFD462A61B35}"/>
+              </a:ext>
+            </a:extLst>
+          </p:cNvPr>
+          <p:cNvSpPr/>
+          <p:nvPr/>
+        </p:nvSpPr>
+        <p:spPr>
+          <a:xfrm>
+            <a:off x="2663587" y="2502318"/>
+            <a:ext cx="1469409" cy="555009"/>
+          </a:xfrm>
+          <a:prstGeom prst="roundRect">
+            <a:avLst/>
+          </a:prstGeom>
+          <a:noFill/>
+          <a:ln w="12700">
+            <a:solidFill>
+              <a:schemeClr val="bg2">
+                <a:lumMod val="25000"/>
+              </a:schemeClr>
+            </a:solidFill>
+          </a:ln>
+          <a:effectLst/>
+        </p:spPr>
+        <p:style>
+          <a:lnRef idx="1">
+            <a:schemeClr val="accent1"/>
+          </a:lnRef>
+          <a:fillRef idx="3">
+            <a:schemeClr val="accent1"/>
+          </a:fillRef>
+          <a:effectRef idx="2">
+            <a:schemeClr val="accent1"/>
+          </a:effectRef>
+          <a:fontRef idx="minor">
+            <a:schemeClr val="lt1"/>
+          </a:fontRef>
+        </p:style>
+        <p:txBody>
+          <a:bodyPr rot="0" spcFirstLastPara="0" vertOverflow="overflow" horzOverflow="overflow" vert="horz" wrap="square" lIns="0" tIns="45720" rIns="0" bIns="45720" numCol="1" spcCol="0" rtlCol="0" fromWordArt="0" anchor="ctr" anchorCtr="0" forceAA="0" compatLnSpc="1">
+            <a:prstTxWarp prst="textNoShape">
+              <a:avLst/>
+            </a:prstTxWarp>
+            <a:noAutofit/>
+          </a:bodyPr>
+          <a:lstStyle/>
+          <a:p>
+            <a:pPr algn="ctr"/>
+            <a:r>
+              <a:rPr lang="en-US" sz="1600" dirty="0">
+                <a:solidFill>
+                  <a:schemeClr val="bg2">
+                    <a:lumMod val="25000"/>
+                  </a:schemeClr>
+                </a:solidFill>
+              </a:rPr>
+              <a:t>DCAF Engine</a:t>
+            </a:r>
+          </a:p>
+        </p:txBody>
+      </p:sp>
+      <p:sp>
+        <p:nvSpPr>
+          <p:cNvPr id="8" name="Rectangle: Rounded Corners 7">
+            <a:extLst>
+              <a:ext uri="{FF2B5EF4-FFF2-40B4-BE49-F238E27FC236}">
+                <a16:creationId xmlns:a16="http://schemas.microsoft.com/office/drawing/2014/main" id="{E7552EEF-766B-45E3-A98B-771B3401783A}"/>
+              </a:ext>
+            </a:extLst>
+          </p:cNvPr>
+          <p:cNvSpPr/>
+          <p:nvPr/>
+        </p:nvSpPr>
+        <p:spPr>
+          <a:xfrm>
+            <a:off x="5884460" y="4643531"/>
+            <a:ext cx="1469409" cy="555009"/>
+          </a:xfrm>
+          <a:prstGeom prst="roundRect">
+            <a:avLst/>
+          </a:prstGeom>
+          <a:noFill/>
+          <a:ln w="12700">
+            <a:solidFill>
+              <a:schemeClr val="bg2">
+                <a:lumMod val="25000"/>
+              </a:schemeClr>
+            </a:solidFill>
+          </a:ln>
+          <a:effectLst/>
+        </p:spPr>
+        <p:style>
+          <a:lnRef idx="1">
+            <a:schemeClr val="accent1"/>
+          </a:lnRef>
+          <a:fillRef idx="3">
+            <a:schemeClr val="accent1"/>
+          </a:fillRef>
+          <a:effectRef idx="2">
+            <a:schemeClr val="accent1"/>
+          </a:effectRef>
+          <a:fontRef idx="minor">
+            <a:schemeClr val="lt1"/>
+          </a:fontRef>
+        </p:style>
+        <p:txBody>
+          <a:bodyPr rot="0" spcFirstLastPara="0" vertOverflow="overflow" horzOverflow="overflow" vert="horz" wrap="square" lIns="0" tIns="45720" rIns="0" bIns="45720" numCol="1" spcCol="0" rtlCol="0" fromWordArt="0" anchor="ctr" anchorCtr="0" forceAA="0" compatLnSpc="1">
+            <a:prstTxWarp prst="textNoShape">
+              <a:avLst/>
+            </a:prstTxWarp>
+            <a:noAutofit/>
+          </a:bodyPr>
+          <a:lstStyle/>
+          <a:p>
+            <a:pPr algn="ctr"/>
+            <a:r>
+              <a:rPr lang="en-US" sz="1600" dirty="0">
+                <a:solidFill>
+                  <a:schemeClr val="bg2">
+                    <a:lumMod val="25000"/>
+                  </a:schemeClr>
+                </a:solidFill>
+              </a:rPr>
+              <a:t>DCAF Engine</a:t>
+            </a:r>
+          </a:p>
+        </p:txBody>
+      </p:sp>
+      <p:sp>
+        <p:nvSpPr>
+          <p:cNvPr id="9" name="Rectangle: Rounded Corners 8">
+            <a:extLst>
+              <a:ext uri="{FF2B5EF4-FFF2-40B4-BE49-F238E27FC236}">
+                <a16:creationId xmlns:a16="http://schemas.microsoft.com/office/drawing/2014/main" id="{DF29F3B9-D723-4D16-8F95-5AAA26CE6E0B}"/>
+              </a:ext>
+            </a:extLst>
+          </p:cNvPr>
+          <p:cNvSpPr/>
+          <p:nvPr/>
+        </p:nvSpPr>
+        <p:spPr>
+          <a:xfrm>
+            <a:off x="5919715" y="3615176"/>
+            <a:ext cx="1469409" cy="555009"/>
+          </a:xfrm>
+          <a:prstGeom prst="roundRect">
+            <a:avLst/>
+          </a:prstGeom>
+          <a:noFill/>
+          <a:ln w="12700">
+            <a:solidFill>
+              <a:schemeClr val="bg2">
+                <a:lumMod val="25000"/>
+              </a:schemeClr>
+            </a:solidFill>
+          </a:ln>
+          <a:effectLst/>
+        </p:spPr>
+        <p:style>
+          <a:lnRef idx="1">
+            <a:schemeClr val="accent1"/>
+          </a:lnRef>
+          <a:fillRef idx="3">
+            <a:schemeClr val="accent1"/>
+          </a:fillRef>
+          <a:effectRef idx="2">
+            <a:schemeClr val="accent1"/>
+          </a:effectRef>
+          <a:fontRef idx="minor">
+            <a:schemeClr val="lt1"/>
+          </a:fontRef>
+        </p:style>
+        <p:txBody>
+          <a:bodyPr rot="0" spcFirstLastPara="0" vertOverflow="overflow" horzOverflow="overflow" vert="horz" wrap="square" lIns="0" tIns="45720" rIns="0" bIns="45720" numCol="1" spcCol="0" rtlCol="0" fromWordArt="0" anchor="ctr" anchorCtr="0" forceAA="0" compatLnSpc="1">
+            <a:prstTxWarp prst="textNoShape">
+              <a:avLst/>
+            </a:prstTxWarp>
+            <a:noAutofit/>
+          </a:bodyPr>
+          <a:lstStyle/>
+          <a:p>
+            <a:pPr algn="ctr"/>
+            <a:r>
+              <a:rPr lang="en-US" sz="1600" dirty="0">
+                <a:solidFill>
+                  <a:schemeClr val="bg2">
+                    <a:lumMod val="25000"/>
+                  </a:schemeClr>
+                </a:solidFill>
+              </a:rPr>
+              <a:t>DCAF UDP Module</a:t>
+            </a:r>
+          </a:p>
+        </p:txBody>
+      </p:sp>
+      <p:sp>
+        <p:nvSpPr>
+          <p:cNvPr id="10" name="Rectangle: Rounded Corners 9">
+            <a:extLst>
+              <a:ext uri="{FF2B5EF4-FFF2-40B4-BE49-F238E27FC236}">
+                <a16:creationId xmlns:a16="http://schemas.microsoft.com/office/drawing/2014/main" id="{921C2EF6-6ADD-4C54-BE56-1DD543C77ED2}"/>
+              </a:ext>
+            </a:extLst>
+          </p:cNvPr>
+          <p:cNvSpPr/>
+          <p:nvPr/>
+        </p:nvSpPr>
+        <p:spPr>
+          <a:xfrm>
+            <a:off x="2663586" y="1514901"/>
+            <a:ext cx="1469409" cy="555009"/>
+          </a:xfrm>
+          <a:prstGeom prst="roundRect">
+            <a:avLst/>
+          </a:prstGeom>
+          <a:noFill/>
+          <a:ln w="12700">
+            <a:solidFill>
+              <a:schemeClr val="bg2">
+                <a:lumMod val="25000"/>
+              </a:schemeClr>
+            </a:solidFill>
+          </a:ln>
+          <a:effectLst/>
+        </p:spPr>
+        <p:style>
+          <a:lnRef idx="1">
+            <a:schemeClr val="accent1"/>
+          </a:lnRef>
+          <a:fillRef idx="3">
+            <a:schemeClr val="accent1"/>
+          </a:fillRef>
+          <a:effectRef idx="2">
+            <a:schemeClr val="accent1"/>
+          </a:effectRef>
+          <a:fontRef idx="minor">
+            <a:schemeClr val="lt1"/>
+          </a:fontRef>
+        </p:style>
+        <p:txBody>
+          <a:bodyPr rot="0" spcFirstLastPara="0" vertOverflow="overflow" horzOverflow="overflow" vert="horz" wrap="square" lIns="0" tIns="45720" rIns="0" bIns="45720" numCol="1" spcCol="0" rtlCol="0" fromWordArt="0" anchor="ctr" anchorCtr="0" forceAA="0" compatLnSpc="1">
+            <a:prstTxWarp prst="textNoShape">
+              <a:avLst/>
+            </a:prstTxWarp>
+            <a:noAutofit/>
+          </a:bodyPr>
+          <a:lstStyle/>
+          <a:p>
+            <a:pPr algn="ctr"/>
+            <a:r>
+              <a:rPr lang="en-US" sz="1600" dirty="0">
+                <a:solidFill>
+                  <a:schemeClr val="bg2">
+                    <a:lumMod val="25000"/>
+                  </a:schemeClr>
+                </a:solidFill>
+              </a:rPr>
+              <a:t>DCAF Scan Engine Module</a:t>
+            </a:r>
+          </a:p>
+        </p:txBody>
+      </p:sp>
+      <p:sp>
+        <p:nvSpPr>
+          <p:cNvPr id="11" name="Rectangle: Rounded Corners 10">
+            <a:extLst>
+              <a:ext uri="{FF2B5EF4-FFF2-40B4-BE49-F238E27FC236}">
+                <a16:creationId xmlns:a16="http://schemas.microsoft.com/office/drawing/2014/main" id="{FD55671D-046A-4E3B-9D6A-61F3F53D39F1}"/>
+              </a:ext>
+            </a:extLst>
+          </p:cNvPr>
+          <p:cNvSpPr/>
+          <p:nvPr/>
+        </p:nvSpPr>
+        <p:spPr>
+          <a:xfrm>
+            <a:off x="605367" y="1488514"/>
+            <a:ext cx="1469409" cy="555009"/>
+          </a:xfrm>
+          <a:prstGeom prst="roundRect">
+            <a:avLst/>
+          </a:prstGeom>
+          <a:noFill/>
+          <a:ln w="12700">
+            <a:solidFill>
+              <a:schemeClr val="bg2">
+                <a:lumMod val="25000"/>
+              </a:schemeClr>
+            </a:solidFill>
+          </a:ln>
+          <a:effectLst/>
+        </p:spPr>
+        <p:style>
+          <a:lnRef idx="1">
+            <a:schemeClr val="accent1"/>
+          </a:lnRef>
+          <a:fillRef idx="3">
+            <a:schemeClr val="accent1"/>
+          </a:fillRef>
+          <a:effectRef idx="2">
+            <a:schemeClr val="accent1"/>
+          </a:effectRef>
+          <a:fontRef idx="minor">
+            <a:schemeClr val="lt1"/>
+          </a:fontRef>
+        </p:style>
+        <p:txBody>
+          <a:bodyPr rot="0" spcFirstLastPara="0" vertOverflow="overflow" horzOverflow="overflow" vert="horz" wrap="square" lIns="0" tIns="45720" rIns="0" bIns="45720" numCol="1" spcCol="0" rtlCol="0" fromWordArt="0" anchor="ctr" anchorCtr="0" forceAA="0" compatLnSpc="1">
+            <a:prstTxWarp prst="textNoShape">
+              <a:avLst/>
+            </a:prstTxWarp>
+            <a:noAutofit/>
+          </a:bodyPr>
+          <a:lstStyle/>
+          <a:p>
+            <a:pPr algn="ctr"/>
+            <a:r>
+              <a:rPr lang="en-US" sz="1600" dirty="0">
+                <a:solidFill>
+                  <a:schemeClr val="bg2">
+                    <a:lumMod val="25000"/>
+                  </a:schemeClr>
+                </a:solidFill>
+              </a:rPr>
+              <a:t>CRIO Hardware</a:t>
+            </a:r>
+          </a:p>
+        </p:txBody>
+      </p:sp>
+      <p:sp>
+        <p:nvSpPr>
+          <p:cNvPr id="12" name="Arrow: Right 11">
+            <a:extLst>
+              <a:ext uri="{FF2B5EF4-FFF2-40B4-BE49-F238E27FC236}">
+                <a16:creationId xmlns:a16="http://schemas.microsoft.com/office/drawing/2014/main" id="{FB7908DF-D6EF-4269-8D84-F7E22154530A}"/>
+              </a:ext>
+            </a:extLst>
+          </p:cNvPr>
+          <p:cNvSpPr/>
+          <p:nvPr/>
+        </p:nvSpPr>
+        <p:spPr>
+          <a:xfrm>
+            <a:off x="2188191" y="1674125"/>
+            <a:ext cx="318448" cy="236562"/>
+          </a:xfrm>
+          <a:prstGeom prst="rightArrow">
+            <a:avLst/>
+          </a:prstGeom>
+          <a:noFill/>
+          <a:ln w="12700">
+            <a:solidFill>
+              <a:schemeClr val="bg2">
+                <a:lumMod val="25000"/>
+              </a:schemeClr>
+            </a:solidFill>
+          </a:ln>
+          <a:effectLst/>
+        </p:spPr>
+        <p:style>
+          <a:lnRef idx="1">
+            <a:schemeClr val="accent1"/>
+          </a:lnRef>
+          <a:fillRef idx="3">
+            <a:schemeClr val="accent1"/>
+          </a:fillRef>
+          <a:effectRef idx="2">
+            <a:schemeClr val="accent1"/>
+          </a:effectRef>
+          <a:fontRef idx="minor">
+            <a:schemeClr val="lt1"/>
+          </a:fontRef>
+        </p:style>
+        <p:txBody>
+          <a:bodyPr rot="0" spcFirstLastPara="0" vertOverflow="overflow" horzOverflow="overflow" vert="horz" wrap="square" lIns="0" tIns="45720" rIns="0" bIns="45720" numCol="1" spcCol="0" rtlCol="0" fromWordArt="0" anchor="ctr" anchorCtr="0" forceAA="0" compatLnSpc="1">
+            <a:prstTxWarp prst="textNoShape">
+              <a:avLst/>
+            </a:prstTxWarp>
+            <a:noAutofit/>
+          </a:bodyPr>
+          <a:lstStyle/>
+          <a:p>
+            <a:pPr algn="ctr"/>
+            <a:endParaRPr lang="en-US" sz="1600" dirty="0" err="1">
+              <a:solidFill>
+                <a:schemeClr val="bg2">
+                  <a:lumMod val="25000"/>
+                </a:schemeClr>
+              </a:solidFill>
+            </a:endParaRPr>
+          </a:p>
+        </p:txBody>
+      </p:sp>
+      <p:sp>
+        <p:nvSpPr>
+          <p:cNvPr id="13" name="Arrow: Down 12">
+            <a:extLst>
+              <a:ext uri="{FF2B5EF4-FFF2-40B4-BE49-F238E27FC236}">
+                <a16:creationId xmlns:a16="http://schemas.microsoft.com/office/drawing/2014/main" id="{591FD7E9-31FC-4411-91B9-833258859A84}"/>
+              </a:ext>
+            </a:extLst>
+          </p:cNvPr>
+          <p:cNvSpPr/>
+          <p:nvPr/>
+        </p:nvSpPr>
+        <p:spPr>
+          <a:xfrm>
+            <a:off x="3257264" y="3106004"/>
+            <a:ext cx="282054" cy="322996"/>
+          </a:xfrm>
+          <a:prstGeom prst="downArrow">
+            <a:avLst/>
+          </a:prstGeom>
+          <a:noFill/>
+          <a:ln w="12700">
+            <a:solidFill>
+              <a:schemeClr val="bg2">
+                <a:lumMod val="25000"/>
+              </a:schemeClr>
+            </a:solidFill>
+          </a:ln>
+          <a:effectLst/>
+        </p:spPr>
+        <p:style>
+          <a:lnRef idx="1">
+            <a:schemeClr val="accent1"/>
+          </a:lnRef>
+          <a:fillRef idx="3">
+            <a:schemeClr val="accent1"/>
+          </a:fillRef>
+          <a:effectRef idx="2">
+            <a:schemeClr val="accent1"/>
+          </a:effectRef>
+          <a:fontRef idx="minor">
+            <a:schemeClr val="lt1"/>
+          </a:fontRef>
+        </p:style>
+        <p:txBody>
+          <a:bodyPr rot="0" spcFirstLastPara="0" vertOverflow="overflow" horzOverflow="overflow" vert="horz" wrap="square" lIns="0" tIns="45720" rIns="0" bIns="45720" numCol="1" spcCol="0" rtlCol="0" fromWordArt="0" anchor="ctr" anchorCtr="0" forceAA="0" compatLnSpc="1">
+            <a:prstTxWarp prst="textNoShape">
+              <a:avLst/>
+            </a:prstTxWarp>
+            <a:noAutofit/>
+          </a:bodyPr>
+          <a:lstStyle/>
+          <a:p>
+            <a:pPr algn="ctr"/>
+            <a:endParaRPr lang="en-US" sz="1600" dirty="0" err="1">
+              <a:solidFill>
+                <a:schemeClr val="bg2">
+                  <a:lumMod val="25000"/>
+                </a:schemeClr>
+              </a:solidFill>
+            </a:endParaRPr>
+          </a:p>
+        </p:txBody>
+      </p:sp>
+      <p:sp>
+        <p:nvSpPr>
+          <p:cNvPr id="14" name="Arrow: Right 13">
+            <a:extLst>
+              <a:ext uri="{FF2B5EF4-FFF2-40B4-BE49-F238E27FC236}">
+                <a16:creationId xmlns:a16="http://schemas.microsoft.com/office/drawing/2014/main" id="{0238D53F-955B-4221-A63C-CFD966EE0C44}"/>
+              </a:ext>
+            </a:extLst>
+          </p:cNvPr>
+          <p:cNvSpPr/>
+          <p:nvPr/>
+        </p:nvSpPr>
+        <p:spPr>
+          <a:xfrm>
+            <a:off x="4531625" y="3481541"/>
+            <a:ext cx="989462" cy="822280"/>
+          </a:xfrm>
+          <a:prstGeom prst="rightArrow">
+            <a:avLst/>
+          </a:prstGeom>
+          <a:noFill/>
+          <a:ln w="12700">
+            <a:solidFill>
+              <a:schemeClr val="bg2">
+                <a:lumMod val="25000"/>
+              </a:schemeClr>
+            </a:solidFill>
+          </a:ln>
+          <a:effectLst/>
+        </p:spPr>
+        <p:style>
+          <a:lnRef idx="1">
+            <a:schemeClr val="accent1"/>
+          </a:lnRef>
+          <a:fillRef idx="3">
+            <a:schemeClr val="accent1"/>
+          </a:fillRef>
+          <a:effectRef idx="2">
+            <a:schemeClr val="accent1"/>
+          </a:effectRef>
+          <a:fontRef idx="minor">
+            <a:schemeClr val="lt1"/>
+          </a:fontRef>
+        </p:style>
+        <p:txBody>
+          <a:bodyPr rot="0" spcFirstLastPara="0" vertOverflow="overflow" horzOverflow="overflow" vert="horz" wrap="square" lIns="0" tIns="45720" rIns="0" bIns="45720" numCol="1" spcCol="0" rtlCol="0" fromWordArt="0" anchor="ctr" anchorCtr="0" forceAA="0" compatLnSpc="1">
+            <a:prstTxWarp prst="textNoShape">
+              <a:avLst/>
+            </a:prstTxWarp>
+            <a:noAutofit/>
+          </a:bodyPr>
+          <a:lstStyle/>
+          <a:p>
+            <a:pPr algn="ctr"/>
+            <a:r>
+              <a:rPr lang="en-US" sz="1600" dirty="0">
+                <a:solidFill>
+                  <a:schemeClr val="bg2">
+                    <a:lumMod val="25000"/>
+                  </a:schemeClr>
+                </a:solidFill>
+              </a:rPr>
+              <a:t>UDP</a:t>
+            </a:r>
+          </a:p>
+        </p:txBody>
+      </p:sp>
+      <p:sp>
+        <p:nvSpPr>
+          <p:cNvPr id="15" name="Arrow: Down 14">
+            <a:extLst>
+              <a:ext uri="{FF2B5EF4-FFF2-40B4-BE49-F238E27FC236}">
+                <a16:creationId xmlns:a16="http://schemas.microsoft.com/office/drawing/2014/main" id="{E72EEF1F-7C17-49CE-AE33-9E3E8E22302E}"/>
+              </a:ext>
+            </a:extLst>
+          </p:cNvPr>
+          <p:cNvSpPr/>
+          <p:nvPr/>
+        </p:nvSpPr>
+        <p:spPr>
+          <a:xfrm>
+            <a:off x="6478138" y="4245360"/>
+            <a:ext cx="282054" cy="322996"/>
+          </a:xfrm>
+          <a:prstGeom prst="downArrow">
+            <a:avLst/>
+          </a:prstGeom>
+          <a:noFill/>
+          <a:ln w="12700">
+            <a:solidFill>
+              <a:schemeClr val="bg2">
+                <a:lumMod val="25000"/>
+              </a:schemeClr>
+            </a:solidFill>
+          </a:ln>
+          <a:effectLst/>
+        </p:spPr>
+        <p:style>
+          <a:lnRef idx="1">
+            <a:schemeClr val="accent1"/>
+          </a:lnRef>
+          <a:fillRef idx="3">
+            <a:schemeClr val="accent1"/>
+          </a:fillRef>
+          <a:effectRef idx="2">
+            <a:schemeClr val="accent1"/>
+          </a:effectRef>
+          <a:fontRef idx="minor">
+            <a:schemeClr val="lt1"/>
+          </a:fontRef>
+        </p:style>
+        <p:txBody>
+          <a:bodyPr rot="0" spcFirstLastPara="0" vertOverflow="overflow" horzOverflow="overflow" vert="horz" wrap="square" lIns="0" tIns="45720" rIns="0" bIns="45720" numCol="1" spcCol="0" rtlCol="0" fromWordArt="0" anchor="ctr" anchorCtr="0" forceAA="0" compatLnSpc="1">
+            <a:prstTxWarp prst="textNoShape">
+              <a:avLst/>
+            </a:prstTxWarp>
+            <a:noAutofit/>
+          </a:bodyPr>
+          <a:lstStyle/>
+          <a:p>
+            <a:pPr algn="ctr"/>
+            <a:endParaRPr lang="en-US" sz="1600" dirty="0" err="1">
+              <a:solidFill>
+                <a:schemeClr val="bg2">
+                  <a:lumMod val="25000"/>
+                </a:schemeClr>
+              </a:solidFill>
+            </a:endParaRPr>
+          </a:p>
+        </p:txBody>
+      </p:sp>
+      <p:sp>
+        <p:nvSpPr>
+          <p:cNvPr id="16" name="Arrow: Down 15">
+            <a:extLst>
+              <a:ext uri="{FF2B5EF4-FFF2-40B4-BE49-F238E27FC236}">
+                <a16:creationId xmlns:a16="http://schemas.microsoft.com/office/drawing/2014/main" id="{44407513-651D-4483-B184-259378B68946}"/>
+              </a:ext>
+            </a:extLst>
+          </p:cNvPr>
+          <p:cNvSpPr/>
+          <p:nvPr/>
+        </p:nvSpPr>
+        <p:spPr>
+          <a:xfrm>
+            <a:off x="3257263" y="2130645"/>
+            <a:ext cx="282054" cy="322996"/>
+          </a:xfrm>
+          <a:prstGeom prst="downArrow">
+            <a:avLst/>
+          </a:prstGeom>
+          <a:noFill/>
+          <a:ln w="12700">
+            <a:solidFill>
+              <a:schemeClr val="bg2">
+                <a:lumMod val="25000"/>
+              </a:schemeClr>
+            </a:solidFill>
+          </a:ln>
+          <a:effectLst/>
+        </p:spPr>
+        <p:style>
+          <a:lnRef idx="1">
+            <a:schemeClr val="accent1"/>
+          </a:lnRef>
+          <a:fillRef idx="3">
+            <a:schemeClr val="accent1"/>
+          </a:fillRef>
+          <a:effectRef idx="2">
+            <a:schemeClr val="accent1"/>
+          </a:effectRef>
+          <a:fontRef idx="minor">
+            <a:schemeClr val="lt1"/>
+          </a:fontRef>
+        </p:style>
+        <p:txBody>
+          <a:bodyPr rot="0" spcFirstLastPara="0" vertOverflow="overflow" horzOverflow="overflow" vert="horz" wrap="square" lIns="0" tIns="45720" rIns="0" bIns="45720" numCol="1" spcCol="0" rtlCol="0" fromWordArt="0" anchor="ctr" anchorCtr="0" forceAA="0" compatLnSpc="1">
+            <a:prstTxWarp prst="textNoShape">
+              <a:avLst/>
+            </a:prstTxWarp>
+            <a:noAutofit/>
+          </a:bodyPr>
+          <a:lstStyle/>
+          <a:p>
+            <a:pPr algn="ctr"/>
+            <a:endParaRPr lang="en-US" sz="1600" dirty="0" err="1">
+              <a:solidFill>
+                <a:schemeClr val="bg2">
+                  <a:lumMod val="25000"/>
+                </a:schemeClr>
+              </a:solidFill>
+            </a:endParaRPr>
+          </a:p>
+        </p:txBody>
+      </p:sp>
+      <p:sp>
+        <p:nvSpPr>
+          <p:cNvPr id="17" name="Arrow: Down 16">
+            <a:extLst>
+              <a:ext uri="{FF2B5EF4-FFF2-40B4-BE49-F238E27FC236}">
+                <a16:creationId xmlns:a16="http://schemas.microsoft.com/office/drawing/2014/main" id="{7C91DB09-F809-4436-AEA1-9E8078B0D9BF}"/>
+              </a:ext>
+            </a:extLst>
+          </p:cNvPr>
+          <p:cNvSpPr/>
+          <p:nvPr/>
+        </p:nvSpPr>
+        <p:spPr>
+          <a:xfrm>
+            <a:off x="6478137" y="5348890"/>
+            <a:ext cx="282054" cy="322996"/>
+          </a:xfrm>
+          <a:prstGeom prst="downArrow">
+            <a:avLst/>
+          </a:prstGeom>
+          <a:noFill/>
+          <a:ln w="12700">
+            <a:solidFill>
+              <a:schemeClr val="bg2">
+                <a:lumMod val="25000"/>
+              </a:schemeClr>
+            </a:solidFill>
+          </a:ln>
+          <a:effectLst/>
+        </p:spPr>
+        <p:style>
+          <a:lnRef idx="1">
+            <a:schemeClr val="accent1"/>
+          </a:lnRef>
+          <a:fillRef idx="3">
+            <a:schemeClr val="accent1"/>
+          </a:fillRef>
+          <a:effectRef idx="2">
+            <a:schemeClr val="accent1"/>
+          </a:effectRef>
+          <a:fontRef idx="minor">
+            <a:schemeClr val="lt1"/>
+          </a:fontRef>
+        </p:style>
+        <p:txBody>
+          <a:bodyPr rot="0" spcFirstLastPara="0" vertOverflow="overflow" horzOverflow="overflow" vert="horz" wrap="square" lIns="0" tIns="45720" rIns="0" bIns="45720" numCol="1" spcCol="0" rtlCol="0" fromWordArt="0" anchor="ctr" anchorCtr="0" forceAA="0" compatLnSpc="1">
+            <a:prstTxWarp prst="textNoShape">
+              <a:avLst/>
+            </a:prstTxWarp>
+            <a:noAutofit/>
+          </a:bodyPr>
+          <a:lstStyle/>
+          <a:p>
+            <a:pPr algn="ctr"/>
+            <a:endParaRPr lang="en-US" sz="1600" dirty="0" err="1">
+              <a:solidFill>
+                <a:schemeClr val="bg2">
+                  <a:lumMod val="25000"/>
+                </a:schemeClr>
+              </a:solidFill>
+            </a:endParaRPr>
+          </a:p>
+        </p:txBody>
+      </p:sp>
+      <p:sp>
+        <p:nvSpPr>
+          <p:cNvPr id="18" name="Arrow: Right 17">
+            <a:extLst>
+              <a:ext uri="{FF2B5EF4-FFF2-40B4-BE49-F238E27FC236}">
+                <a16:creationId xmlns:a16="http://schemas.microsoft.com/office/drawing/2014/main" id="{8E08CF5A-30DC-486B-A12C-12339366D649}"/>
+              </a:ext>
+            </a:extLst>
+          </p:cNvPr>
+          <p:cNvSpPr/>
+          <p:nvPr/>
+        </p:nvSpPr>
+        <p:spPr>
+          <a:xfrm>
+            <a:off x="7600665" y="5981458"/>
+            <a:ext cx="318448" cy="236562"/>
+          </a:xfrm>
+          <a:prstGeom prst="rightArrow">
+            <a:avLst/>
+          </a:prstGeom>
+          <a:noFill/>
+          <a:ln w="12700">
+            <a:solidFill>
+              <a:schemeClr val="bg2">
+                <a:lumMod val="25000"/>
+              </a:schemeClr>
+            </a:solidFill>
+          </a:ln>
+          <a:effectLst/>
+        </p:spPr>
+        <p:style>
+          <a:lnRef idx="1">
+            <a:schemeClr val="accent1"/>
+          </a:lnRef>
+          <a:fillRef idx="3">
+            <a:schemeClr val="accent1"/>
+          </a:fillRef>
+          <a:effectRef idx="2">
+            <a:schemeClr val="accent1"/>
+          </a:effectRef>
+          <a:fontRef idx="minor">
+            <a:schemeClr val="lt1"/>
+          </a:fontRef>
+        </p:style>
+        <p:txBody>
+          <a:bodyPr rot="0" spcFirstLastPara="0" vertOverflow="overflow" horzOverflow="overflow" vert="horz" wrap="square" lIns="0" tIns="45720" rIns="0" bIns="45720" numCol="1" spcCol="0" rtlCol="0" fromWordArt="0" anchor="ctr" anchorCtr="0" forceAA="0" compatLnSpc="1">
+            <a:prstTxWarp prst="textNoShape">
+              <a:avLst/>
+            </a:prstTxWarp>
+            <a:noAutofit/>
+          </a:bodyPr>
+          <a:lstStyle/>
+          <a:p>
+            <a:pPr algn="ctr"/>
+            <a:endParaRPr lang="en-US" sz="1600" dirty="0" err="1">
+              <a:solidFill>
+                <a:schemeClr val="bg2">
+                  <a:lumMod val="25000"/>
+                </a:schemeClr>
+              </a:solidFill>
+            </a:endParaRPr>
           </a:p>
         </p:txBody>
       </p:sp>
     </p:spTree>
     <p:extLst>
       <p:ext uri="{BB962C8B-B14F-4D97-AF65-F5344CB8AC3E}">
-        <p14:creationId xmlns:p14="http://schemas.microsoft.com/office/powerpoint/2010/main" val="3010751691"/>
+        <p14:creationId xmlns:p14="http://schemas.microsoft.com/office/powerpoint/2010/main" val="2569856924"/>
       </p:ext>
     </p:extLst>
   </p:cSld>
@@ -7786,7 +9809,13 @@
       </p:grpSpPr>
       <p:sp>
         <p:nvSpPr>
-          <p:cNvPr id="2" name="Title 1"/>
+          <p:cNvPr id="2" name="Title 1">
+            <a:extLst>
+              <a:ext uri="{FF2B5EF4-FFF2-40B4-BE49-F238E27FC236}">
+                <a16:creationId xmlns:a16="http://schemas.microsoft.com/office/drawing/2014/main" id="{7C6D6A00-CEA3-42F8-A9AB-6F0F8465DBE2}"/>
+              </a:ext>
+            </a:extLst>
+          </p:cNvPr>
           <p:cNvSpPr>
             <a:spLocks noGrp="1"/>
           </p:cNvSpPr>
@@ -7801,89 +9830,88 @@
           <a:p>
             <a:r>
               <a:rPr lang="en-US" dirty="0"/>
-              <a:t>Error Management</a:t>
-            </a:r>
-          </a:p>
-        </p:txBody>
-      </p:sp>
-      <p:pic>
-        <p:nvPicPr>
-          <p:cNvPr id="4" name="Content Placeholder 3"/>
-          <p:cNvPicPr>
-            <a:picLocks noGrp="1" noChangeAspect="1"/>
-          </p:cNvPicPr>
+              <a:t>RT Debugging Challenges</a:t>
+            </a:r>
+          </a:p>
+        </p:txBody>
+      </p:sp>
+      <p:sp>
+        <p:nvSpPr>
+          <p:cNvPr id="3" name="Content Placeholder 2">
+            <a:extLst>
+              <a:ext uri="{FF2B5EF4-FFF2-40B4-BE49-F238E27FC236}">
+                <a16:creationId xmlns:a16="http://schemas.microsoft.com/office/drawing/2014/main" id="{27EFDB02-6285-4A62-B803-CFE0CBA84BEA}"/>
+              </a:ext>
+            </a:extLst>
+          </p:cNvPr>
+          <p:cNvSpPr>
+            <a:spLocks noGrp="1"/>
+          </p:cNvSpPr>
           <p:nvPr>
             <p:ph idx="1"/>
           </p:nvPr>
-        </p:nvPicPr>
-        <p:blipFill>
-          <a:blip r:embed="rId2"/>
-          <a:stretch>
-            <a:fillRect/>
-          </a:stretch>
-        </p:blipFill>
-        <p:spPr>
-          <a:xfrm>
-            <a:off x="7435371" y="1888576"/>
-            <a:ext cx="3133725" cy="3514725"/>
-          </a:xfrm>
-          <a:prstGeom prst="rect">
-            <a:avLst/>
-          </a:prstGeom>
-        </p:spPr>
-      </p:pic>
-      <p:pic>
-        <p:nvPicPr>
-          <p:cNvPr id="5" name="Picture 4"/>
-          <p:cNvPicPr>
-            <a:picLocks noChangeAspect="1"/>
-          </p:cNvPicPr>
-          <p:nvPr/>
-        </p:nvPicPr>
-        <p:blipFill>
-          <a:blip r:embed="rId3"/>
-          <a:stretch>
-            <a:fillRect/>
-          </a:stretch>
-        </p:blipFill>
-        <p:spPr>
-          <a:xfrm>
-            <a:off x="2584069" y="1690688"/>
-            <a:ext cx="2762250" cy="2447925"/>
-          </a:xfrm>
-          <a:prstGeom prst="rect">
-            <a:avLst/>
-          </a:prstGeom>
-        </p:spPr>
-      </p:pic>
-      <p:pic>
-        <p:nvPicPr>
-          <p:cNvPr id="6" name="Picture 5"/>
-          <p:cNvPicPr>
-            <a:picLocks noChangeAspect="1"/>
-          </p:cNvPicPr>
-          <p:nvPr/>
-        </p:nvPicPr>
-        <p:blipFill>
-          <a:blip r:embed="rId4"/>
-          <a:stretch>
-            <a:fillRect/>
-          </a:stretch>
-        </p:blipFill>
-        <p:spPr>
-          <a:xfrm>
-            <a:off x="845757" y="4388137"/>
-            <a:ext cx="6238875" cy="1809750"/>
-          </a:xfrm>
-          <a:prstGeom prst="rect">
-            <a:avLst/>
-          </a:prstGeom>
-        </p:spPr>
-      </p:pic>
+        </p:nvSpPr>
+        <p:spPr/>
+        <p:txBody>
+          <a:bodyPr/>
+          <a:lstStyle/>
+          <a:p>
+            <a:r>
+              <a:rPr lang="en-US" dirty="0"/>
+              <a:t>Complex Systems</a:t>
+            </a:r>
+          </a:p>
+          <a:p>
+            <a:r>
+              <a:rPr lang="en-US" dirty="0"/>
+              <a:t>Multiple devices</a:t>
+            </a:r>
+          </a:p>
+          <a:p>
+            <a:r>
+              <a:rPr lang="en-US" dirty="0"/>
+              <a:t>Cant Debug Re-entrant VI in RT</a:t>
+            </a:r>
+          </a:p>
+          <a:p>
+            <a:r>
+              <a:rPr lang="en-US" dirty="0"/>
+              <a:t>RT system might be running headless</a:t>
+            </a:r>
+          </a:p>
+          <a:p>
+            <a:r>
+              <a:rPr lang="en-US" dirty="0"/>
+              <a:t>Network Issues</a:t>
+            </a:r>
+          </a:p>
+          <a:p>
+            <a:r>
+              <a:rPr lang="en-US" dirty="0"/>
+              <a:t>Process Starvation</a:t>
+            </a:r>
+          </a:p>
+          <a:p>
+            <a:r>
+              <a:rPr lang="en-US" dirty="0"/>
+              <a:t>Timing Issues</a:t>
+            </a:r>
+          </a:p>
+          <a:p>
+            <a:r>
+              <a:rPr lang="en-US" dirty="0"/>
+              <a:t>Race Conditions</a:t>
+            </a:r>
+          </a:p>
+          <a:p>
+            <a:endParaRPr lang="en-US" dirty="0"/>
+          </a:p>
+        </p:txBody>
+      </p:sp>
     </p:spTree>
     <p:extLst>
       <p:ext uri="{BB962C8B-B14F-4D97-AF65-F5344CB8AC3E}">
-        <p14:creationId xmlns:p14="http://schemas.microsoft.com/office/powerpoint/2010/main" val="124256229"/>
+        <p14:creationId xmlns:p14="http://schemas.microsoft.com/office/powerpoint/2010/main" val="2096331323"/>
       </p:ext>
     </p:extLst>
   </p:cSld>
@@ -7933,7 +9961,7 @@
           <a:p>
             <a:r>
               <a:rPr lang="en-US" dirty="0"/>
-              <a:t>Debugging Reentrant VIs</a:t>
+              <a:t>Basics RT Debugging</a:t>
             </a:r>
           </a:p>
         </p:txBody>
@@ -7941,7 +9969,7 @@
     </p:spTree>
     <p:extLst>
       <p:ext uri="{BB962C8B-B14F-4D97-AF65-F5344CB8AC3E}">
-        <p14:creationId xmlns:p14="http://schemas.microsoft.com/office/powerpoint/2010/main" val="3965479818"/>
+        <p14:creationId xmlns:p14="http://schemas.microsoft.com/office/powerpoint/2010/main" val="3010751691"/>
       </p:ext>
     </p:extLst>
   </p:cSld>
@@ -7970,10 +9998,10 @@
       </p:grpSpPr>
       <p:sp>
         <p:nvSpPr>
-          <p:cNvPr id="6" name="Text Placeholder 5">
+          <p:cNvPr id="3" name="Title 2">
             <a:extLst>
               <a:ext uri="{FF2B5EF4-FFF2-40B4-BE49-F238E27FC236}">
-                <a16:creationId xmlns:a16="http://schemas.microsoft.com/office/drawing/2014/main" id="{AE7D9B36-B649-4C5D-AE68-ED0ADFB9E016}"/>
+                <a16:creationId xmlns:a16="http://schemas.microsoft.com/office/drawing/2014/main" id="{0FAA9ABA-0C0C-4580-8518-430D66C20AEB}"/>
               </a:ext>
             </a:extLst>
           </p:cNvPr>
@@ -7981,7 +10009,7 @@
             <a:spLocks noGrp="1"/>
           </p:cNvSpPr>
           <p:nvPr>
-            <p:ph type="body" sz="quarter" idx="10"/>
+            <p:ph type="title"/>
           </p:nvPr>
         </p:nvSpPr>
         <p:spPr/>
@@ -7991,15 +10019,96 @@
           <a:p>
             <a:r>
               <a:rPr lang="en-US" dirty="0"/>
-              <a:t>Running Modules Outside of the Engine</a:t>
-            </a:r>
+              <a:t>Follow Programing Best Practices</a:t>
+            </a:r>
+          </a:p>
+        </p:txBody>
+      </p:sp>
+      <p:sp>
+        <p:nvSpPr>
+          <p:cNvPr id="4" name="Content Placeholder 3">
+            <a:extLst>
+              <a:ext uri="{FF2B5EF4-FFF2-40B4-BE49-F238E27FC236}">
+                <a16:creationId xmlns:a16="http://schemas.microsoft.com/office/drawing/2014/main" id="{A1C08068-6C8D-48EC-A91B-ED3DE422E7F2}"/>
+              </a:ext>
+            </a:extLst>
+          </p:cNvPr>
+          <p:cNvSpPr>
+            <a:spLocks noGrp="1"/>
+          </p:cNvSpPr>
+          <p:nvPr>
+            <p:ph idx="1"/>
+          </p:nvPr>
+        </p:nvSpPr>
+        <p:spPr/>
+        <p:txBody>
+          <a:bodyPr/>
+          <a:lstStyle/>
+          <a:p>
+            <a:r>
+              <a:rPr lang="en-US" dirty="0"/>
+              <a:t>The best way to not have a bug is to prevent it in the first place.</a:t>
+            </a:r>
+          </a:p>
+          <a:p>
+            <a:endParaRPr lang="en-US" dirty="0"/>
+          </a:p>
+          <a:p>
+            <a:r>
+              <a:rPr lang="en-US" dirty="0"/>
+              <a:t>Best practices reduce the possibility of bugs to happen and makes it easier to find them once they happen. </a:t>
+            </a:r>
+          </a:p>
+          <a:p>
+            <a:endParaRPr lang="en-US" dirty="0"/>
+          </a:p>
+          <a:p>
+            <a:r>
+              <a:rPr lang="en-US" dirty="0"/>
+              <a:t>Best Practices Include:</a:t>
+            </a:r>
+          </a:p>
+          <a:p>
+            <a:pPr lvl="1"/>
+            <a:r>
+              <a:rPr lang="en-US" dirty="0"/>
+              <a:t>Modular code</a:t>
+            </a:r>
+          </a:p>
+          <a:p>
+            <a:pPr lvl="1"/>
+            <a:r>
+              <a:rPr lang="en-US" dirty="0"/>
+              <a:t>Unit Testing</a:t>
+            </a:r>
+          </a:p>
+          <a:p>
+            <a:pPr lvl="1"/>
+            <a:r>
+              <a:rPr lang="en-US" dirty="0"/>
+              <a:t>Single Writers</a:t>
+            </a:r>
+          </a:p>
+          <a:p>
+            <a:pPr lvl="1"/>
+            <a:r>
+              <a:rPr lang="en-US" dirty="0"/>
+              <a:t>Reduce number of global resources. </a:t>
+            </a:r>
+          </a:p>
+          <a:p>
+            <a:pPr lvl="1"/>
+            <a:endParaRPr lang="en-US" dirty="0"/>
+          </a:p>
+          <a:p>
+            <a:endParaRPr lang="en-US" dirty="0"/>
           </a:p>
         </p:txBody>
       </p:sp>
     </p:spTree>
     <p:extLst>
       <p:ext uri="{BB962C8B-B14F-4D97-AF65-F5344CB8AC3E}">
-        <p14:creationId xmlns:p14="http://schemas.microsoft.com/office/powerpoint/2010/main" val="1684131035"/>
+        <p14:creationId xmlns:p14="http://schemas.microsoft.com/office/powerpoint/2010/main" val="1009372121"/>
       </p:ext>
     </p:extLst>
   </p:cSld>
@@ -8028,10 +10137,10 @@
       </p:grpSpPr>
       <p:sp>
         <p:nvSpPr>
-          <p:cNvPr id="6" name="Text Placeholder 5">
+          <p:cNvPr id="3" name="Title 2">
             <a:extLst>
               <a:ext uri="{FF2B5EF4-FFF2-40B4-BE49-F238E27FC236}">
-                <a16:creationId xmlns:a16="http://schemas.microsoft.com/office/drawing/2014/main" id="{AE7D9B36-B649-4C5D-AE68-ED0ADFB9E016}"/>
+                <a16:creationId xmlns:a16="http://schemas.microsoft.com/office/drawing/2014/main" id="{5BF0A7A1-54AB-4AC1-9EBC-D6F9385782EC}"/>
               </a:ext>
             </a:extLst>
           </p:cNvPr>
@@ -8039,7 +10148,7 @@
             <a:spLocks noGrp="1"/>
           </p:cNvSpPr>
           <p:nvPr>
-            <p:ph type="body" sz="quarter" idx="10"/>
+            <p:ph type="title"/>
           </p:nvPr>
         </p:nvSpPr>
         <p:spPr/>
@@ -8049,15 +10158,141 @@
           <a:p>
             <a:r>
               <a:rPr lang="en-US" dirty="0"/>
-              <a:t>Syslog</a:t>
-            </a:r>
-          </a:p>
-        </p:txBody>
-      </p:sp>
+              <a:t>Where is the Bug?</a:t>
+            </a:r>
+          </a:p>
+        </p:txBody>
+      </p:sp>
+      <p:sp>
+        <p:nvSpPr>
+          <p:cNvPr id="4" name="Content Placeholder 3">
+            <a:extLst>
+              <a:ext uri="{FF2B5EF4-FFF2-40B4-BE49-F238E27FC236}">
+                <a16:creationId xmlns:a16="http://schemas.microsoft.com/office/drawing/2014/main" id="{714FFCFE-2D37-4950-95AF-26A2EB38AB9B}"/>
+              </a:ext>
+            </a:extLst>
+          </p:cNvPr>
+          <p:cNvSpPr>
+            <a:spLocks noGrp="1"/>
+          </p:cNvSpPr>
+          <p:nvPr>
+            <p:ph idx="1"/>
+          </p:nvPr>
+        </p:nvSpPr>
+        <p:spPr/>
+        <p:txBody>
+          <a:bodyPr/>
+          <a:lstStyle/>
+          <a:p>
+            <a:r>
+              <a:rPr lang="en-US" dirty="0"/>
+              <a:t>Modular Code and Unit Testing</a:t>
+            </a:r>
+          </a:p>
+          <a:p>
+            <a:pPr lvl="1"/>
+            <a:r>
+              <a:rPr lang="en-US" dirty="0"/>
+              <a:t>If we don’t know if individual components work </a:t>
+            </a:r>
+          </a:p>
+          <a:p>
+            <a:pPr marL="365751" lvl="1" indent="0">
+              <a:buNone/>
+            </a:pPr>
+            <a:r>
+              <a:rPr lang="en-US" dirty="0"/>
+              <a:t>we don’t know if the whole system works</a:t>
+            </a:r>
+          </a:p>
+          <a:p>
+            <a:r>
+              <a:rPr lang="en-US" dirty="0"/>
+              <a:t>Error Handling</a:t>
+            </a:r>
+          </a:p>
+          <a:p>
+            <a:pPr lvl="1"/>
+            <a:r>
+              <a:rPr lang="en-US" dirty="0"/>
+              <a:t>Hard to find ignored errors and errors that are</a:t>
+            </a:r>
+          </a:p>
+          <a:p>
+            <a:pPr marL="365751" lvl="1" indent="0">
+              <a:buNone/>
+            </a:pPr>
+            <a:r>
+              <a:rPr lang="en-US" dirty="0"/>
+              <a:t> overwritten</a:t>
+            </a:r>
+          </a:p>
+          <a:p>
+            <a:r>
+              <a:rPr lang="en-US" dirty="0"/>
+              <a:t>Use External Tools like Max </a:t>
+            </a:r>
+          </a:p>
+          <a:p>
+            <a:pPr marL="365751" lvl="1" indent="0">
+              <a:buNone/>
+            </a:pPr>
+            <a:r>
+              <a:rPr lang="en-US" dirty="0"/>
+              <a:t>and Distributed System Manager</a:t>
+            </a:r>
+          </a:p>
+          <a:p>
+            <a:endParaRPr lang="en-US" dirty="0"/>
+          </a:p>
+          <a:p>
+            <a:endParaRPr lang="en-US" dirty="0"/>
+          </a:p>
+          <a:p>
+            <a:endParaRPr lang="en-US" dirty="0"/>
+          </a:p>
+          <a:p>
+            <a:r>
+              <a:rPr lang="en-US" dirty="0"/>
+              <a:t> </a:t>
+            </a:r>
+          </a:p>
+        </p:txBody>
+      </p:sp>
+      <p:pic>
+        <p:nvPicPr>
+          <p:cNvPr id="5" name="Picture 4">
+            <a:extLst>
+              <a:ext uri="{FF2B5EF4-FFF2-40B4-BE49-F238E27FC236}">
+                <a16:creationId xmlns:a16="http://schemas.microsoft.com/office/drawing/2014/main" id="{DF6DF86E-1A35-4A49-88C7-F5BBA2D1F462}"/>
+              </a:ext>
+            </a:extLst>
+          </p:cNvPr>
+          <p:cNvPicPr>
+            <a:picLocks noChangeAspect="1"/>
+          </p:cNvPicPr>
+          <p:nvPr/>
+        </p:nvPicPr>
+        <p:blipFill>
+          <a:blip r:embed="rId3"/>
+          <a:stretch>
+            <a:fillRect/>
+          </a:stretch>
+        </p:blipFill>
+        <p:spPr>
+          <a:xfrm>
+            <a:off x="6873514" y="1490690"/>
+            <a:ext cx="4523624" cy="2505673"/>
+          </a:xfrm>
+          <a:prstGeom prst="rect">
+            <a:avLst/>
+          </a:prstGeom>
+        </p:spPr>
+      </p:pic>
     </p:spTree>
     <p:extLst>
       <p:ext uri="{BB962C8B-B14F-4D97-AF65-F5344CB8AC3E}">
-        <p14:creationId xmlns:p14="http://schemas.microsoft.com/office/powerpoint/2010/main" val="1126713205"/>
+        <p14:creationId xmlns:p14="http://schemas.microsoft.com/office/powerpoint/2010/main" val="2041235494"/>
       </p:ext>
     </p:extLst>
   </p:cSld>
@@ -8086,7 +10321,13 @@
       </p:grpSpPr>
       <p:sp>
         <p:nvSpPr>
-          <p:cNvPr id="2" name="Title 1"/>
+          <p:cNvPr id="2" name="Title 1">
+            <a:extLst>
+              <a:ext uri="{FF2B5EF4-FFF2-40B4-BE49-F238E27FC236}">
+                <a16:creationId xmlns:a16="http://schemas.microsoft.com/office/drawing/2014/main" id="{771861D1-5092-4F43-BC8A-A7DA6572734C}"/>
+              </a:ext>
+            </a:extLst>
+          </p:cNvPr>
           <p:cNvSpPr>
             <a:spLocks noGrp="1"/>
           </p:cNvSpPr>
@@ -8101,14 +10342,20 @@
           <a:p>
             <a:r>
               <a:rPr lang="en-US" dirty="0"/>
-              <a:t>Syslog</a:t>
-            </a:r>
-          </a:p>
-        </p:txBody>
-      </p:sp>
-      <p:sp>
-        <p:nvSpPr>
-          <p:cNvPr id="3" name="Content Placeholder 2"/>
+              <a:t>Error Wiring</a:t>
+            </a:r>
+          </a:p>
+        </p:txBody>
+      </p:sp>
+      <p:sp>
+        <p:nvSpPr>
+          <p:cNvPr id="3" name="Content Placeholder 2">
+            <a:extLst>
+              <a:ext uri="{FF2B5EF4-FFF2-40B4-BE49-F238E27FC236}">
+                <a16:creationId xmlns:a16="http://schemas.microsoft.com/office/drawing/2014/main" id="{CE38B2A8-99B3-4F99-95F5-DD8852EC782C}"/>
+              </a:ext>
+            </a:extLst>
+          </p:cNvPr>
           <p:cNvSpPr>
             <a:spLocks noGrp="1"/>
           </p:cNvSpPr>
@@ -8123,34 +10370,19 @@
           <a:p>
             <a:r>
               <a:rPr lang="en-US" dirty="0"/>
-              <a:t>Available in Linux RT Targets</a:t>
-            </a:r>
-          </a:p>
-          <a:p>
-            <a:r>
-              <a:rPr lang="en-US" dirty="0"/>
-              <a:t>Event sent to Log:</a:t>
-            </a:r>
-          </a:p>
-          <a:p>
-            <a:pPr lvl="1"/>
-            <a:r>
-              <a:rPr lang="en-US" dirty="0"/>
-              <a:t>Initialization and shutdown of all software modules</a:t>
-            </a:r>
-          </a:p>
-          <a:p>
-            <a:pPr lvl="1"/>
-            <a:r>
-              <a:rPr lang="en-US" dirty="0"/>
-              <a:t>Any error reported to the engine</a:t>
-            </a:r>
-          </a:p>
-          <a:p>
-            <a:pPr lvl="1"/>
-            <a:r>
-              <a:rPr lang="en-US" dirty="0"/>
-              <a:t>Any module trace messages added via the API</a:t>
+              <a:t>Error Propagation</a:t>
+            </a:r>
+          </a:p>
+          <a:p>
+            <a:r>
+              <a:rPr lang="en-US" dirty="0"/>
+              <a:t>Unwired errors</a:t>
+            </a:r>
+          </a:p>
+          <a:p>
+            <a:r>
+              <a:rPr lang="en-US" dirty="0"/>
+              <a:t>Unreported errors</a:t>
             </a:r>
           </a:p>
           <a:p>
@@ -8158,34 +10390,10 @@
           </a:p>
         </p:txBody>
       </p:sp>
-      <p:pic>
-        <p:nvPicPr>
-          <p:cNvPr id="5" name="Picture 4"/>
-          <p:cNvPicPr>
-            <a:picLocks noChangeAspect="1"/>
-          </p:cNvPicPr>
-          <p:nvPr/>
-        </p:nvPicPr>
-        <p:blipFill>
-          <a:blip r:embed="rId2"/>
-          <a:stretch>
-            <a:fillRect/>
-          </a:stretch>
-        </p:blipFill>
-        <p:spPr>
-          <a:xfrm>
-            <a:off x="765507" y="4436698"/>
-            <a:ext cx="9376010" cy="1875202"/>
-          </a:xfrm>
-          <a:prstGeom prst="rect">
-            <a:avLst/>
-          </a:prstGeom>
-        </p:spPr>
-      </p:pic>
     </p:spTree>
     <p:extLst>
       <p:ext uri="{BB962C8B-B14F-4D97-AF65-F5344CB8AC3E}">
-        <p14:creationId xmlns:p14="http://schemas.microsoft.com/office/powerpoint/2010/main" val="292420189"/>
+        <p14:creationId xmlns:p14="http://schemas.microsoft.com/office/powerpoint/2010/main" val="455344387"/>
       </p:ext>
     </p:extLst>
   </p:cSld>
@@ -8229,58 +10437,89 @@
           <a:p>
             <a:r>
               <a:rPr lang="en-US" dirty="0"/>
-              <a:t>Syslog - System Log View</a:t>
+              <a:t>DCAF Error Management</a:t>
             </a:r>
           </a:p>
         </p:txBody>
       </p:sp>
       <p:pic>
         <p:nvPicPr>
-          <p:cNvPr id="1026" name="Picture 2" descr="wif.png"/>
+          <p:cNvPr id="4" name="Content Placeholder 3"/>
           <p:cNvPicPr>
-            <a:picLocks noGrp="1" noChangeAspect="1" noChangeArrowheads="1"/>
+            <a:picLocks noGrp="1" noChangeAspect="1"/>
           </p:cNvPicPr>
           <p:nvPr>
             <p:ph idx="1"/>
           </p:nvPr>
         </p:nvPicPr>
         <p:blipFill>
-          <a:blip r:embed="rId2">
-            <a:extLst>
-              <a:ext uri="{28A0092B-C50C-407E-A947-70E740481C1C}">
-                <a14:useLocalDpi xmlns:a14="http://schemas.microsoft.com/office/drawing/2010/main" val="0"/>
-              </a:ext>
-            </a:extLst>
-          </a:blip>
-          <a:srcRect/>
+          <a:blip r:embed="rId3"/>
           <a:stretch>
             <a:fillRect/>
           </a:stretch>
         </p:blipFill>
-        <p:spPr bwMode="auto">
-          <a:xfrm>
-            <a:off x="652462" y="1383412"/>
-            <a:ext cx="10887075" cy="4091176"/>
+        <p:spPr>
+          <a:xfrm>
+            <a:off x="7435371" y="1888576"/>
+            <a:ext cx="3133725" cy="3514725"/>
           </a:xfrm>
           <a:prstGeom prst="rect">
             <a:avLst/>
           </a:prstGeom>
-          <a:noFill/>
-          <a:extLst>
-            <a:ext uri="{909E8E84-426E-40DD-AFC4-6F175D3DCCD1}">
-              <a14:hiddenFill xmlns:a14="http://schemas.microsoft.com/office/drawing/2010/main">
-                <a:solidFill>
-                  <a:srgbClr val="FFFFFF"/>
-                </a:solidFill>
-              </a14:hiddenFill>
-            </a:ext>
-          </a:extLst>
+        </p:spPr>
+      </p:pic>
+      <p:pic>
+        <p:nvPicPr>
+          <p:cNvPr id="5" name="Picture 4"/>
+          <p:cNvPicPr>
+            <a:picLocks noChangeAspect="1"/>
+          </p:cNvPicPr>
+          <p:nvPr/>
+        </p:nvPicPr>
+        <p:blipFill>
+          <a:blip r:embed="rId4"/>
+          <a:stretch>
+            <a:fillRect/>
+          </a:stretch>
+        </p:blipFill>
+        <p:spPr>
+          <a:xfrm>
+            <a:off x="2584069" y="1690688"/>
+            <a:ext cx="2762250" cy="2447925"/>
+          </a:xfrm>
+          <a:prstGeom prst="rect">
+            <a:avLst/>
+          </a:prstGeom>
+        </p:spPr>
+      </p:pic>
+      <p:pic>
+        <p:nvPicPr>
+          <p:cNvPr id="6" name="Picture 5"/>
+          <p:cNvPicPr>
+            <a:picLocks noChangeAspect="1"/>
+          </p:cNvPicPr>
+          <p:nvPr/>
+        </p:nvPicPr>
+        <p:blipFill>
+          <a:blip r:embed="rId5"/>
+          <a:stretch>
+            <a:fillRect/>
+          </a:stretch>
+        </p:blipFill>
+        <p:spPr>
+          <a:xfrm>
+            <a:off x="845757" y="4388137"/>
+            <a:ext cx="6238875" cy="1809750"/>
+          </a:xfrm>
+          <a:prstGeom prst="rect">
+            <a:avLst/>
+          </a:prstGeom>
         </p:spPr>
       </p:pic>
     </p:spTree>
     <p:extLst>
       <p:ext uri="{BB962C8B-B14F-4D97-AF65-F5344CB8AC3E}">
-        <p14:creationId xmlns:p14="http://schemas.microsoft.com/office/powerpoint/2010/main" val="1056925072"/>
+        <p14:creationId xmlns:p14="http://schemas.microsoft.com/office/powerpoint/2010/main" val="124256229"/>
       </p:ext>
     </p:extLst>
   </p:cSld>

</xml_diff>

<commit_message>
Done wtih First Pas
</commit_message>
<xml_diff>
--- a/Trunk/Getting Started Material/DCAF Training/8 Debugging DCAF.pptx
+++ b/Trunk/Getting Started Material/DCAF Training/8 Debugging DCAF.pptx
@@ -5,7 +5,7 @@
     <p:sldMasterId id="2147483660" r:id="rId1"/>
   </p:sldMasterIdLst>
   <p:notesMasterIdLst>
-    <p:notesMasterId r:id="rId24"/>
+    <p:notesMasterId r:id="rId33"/>
   </p:notesMasterIdLst>
   <p:sldIdLst>
     <p:sldId id="256" r:id="rId2"/>
@@ -14,22 +14,31 @@
     <p:sldId id="366" r:id="rId5"/>
     <p:sldId id="360" r:id="rId6"/>
     <p:sldId id="369" r:id="rId7"/>
-    <p:sldId id="368" r:id="rId8"/>
+    <p:sldId id="389" r:id="rId8"/>
     <p:sldId id="370" r:id="rId9"/>
     <p:sldId id="280" r:id="rId10"/>
-    <p:sldId id="361" r:id="rId11"/>
-    <p:sldId id="371" r:id="rId12"/>
-    <p:sldId id="362" r:id="rId13"/>
-    <p:sldId id="372" r:id="rId14"/>
-    <p:sldId id="373" r:id="rId15"/>
-    <p:sldId id="363" r:id="rId16"/>
-    <p:sldId id="279" r:id="rId17"/>
-    <p:sldId id="284" r:id="rId18"/>
-    <p:sldId id="285" r:id="rId19"/>
-    <p:sldId id="359" r:id="rId20"/>
-    <p:sldId id="365" r:id="rId21"/>
-    <p:sldId id="374" r:id="rId22"/>
-    <p:sldId id="375" r:id="rId23"/>
+    <p:sldId id="368" r:id="rId11"/>
+    <p:sldId id="379" r:id="rId12"/>
+    <p:sldId id="380" r:id="rId13"/>
+    <p:sldId id="383" r:id="rId14"/>
+    <p:sldId id="378" r:id="rId15"/>
+    <p:sldId id="385" r:id="rId16"/>
+    <p:sldId id="386" r:id="rId17"/>
+    <p:sldId id="387" r:id="rId18"/>
+    <p:sldId id="382" r:id="rId19"/>
+    <p:sldId id="373" r:id="rId20"/>
+    <p:sldId id="372" r:id="rId21"/>
+    <p:sldId id="279" r:id="rId22"/>
+    <p:sldId id="284" r:id="rId23"/>
+    <p:sldId id="285" r:id="rId24"/>
+    <p:sldId id="359" r:id="rId25"/>
+    <p:sldId id="381" r:id="rId26"/>
+    <p:sldId id="374" r:id="rId27"/>
+    <p:sldId id="375" r:id="rId28"/>
+    <p:sldId id="376" r:id="rId29"/>
+    <p:sldId id="377" r:id="rId30"/>
+    <p:sldId id="388" r:id="rId31"/>
+    <p:sldId id="384" r:id="rId32"/>
   </p:sldIdLst>
   <p:sldSz cx="12192000" cy="6858000"/>
   <p:notesSz cx="6858000" cy="9144000"/>
@@ -218,7 +227,7 @@
           <a:p>
             <a:fld id="{E3E5E4E2-2D1E-49FF-9D26-9043035DAE61}" type="datetimeFigureOut">
               <a:rPr lang="en-US" smtClean="0"/>
-              <a:t>7/10/2018</a:t>
+              <a:t>7/16/2018</a:t>
             </a:fld>
             <a:endParaRPr lang="en-US"/>
           </a:p>
@@ -531,7 +540,13 @@
           <a:p>
             <a:r>
               <a:rPr lang="en-US" dirty="0"/>
-              <a:t>Blaming the engine.</a:t>
+              <a:t>Search for the root cause</a:t>
+            </a:r>
+          </a:p>
+          <a:p>
+            <a:r>
+              <a:rPr lang="en-US" dirty="0"/>
+              <a:t>One bug might hide other bugs</a:t>
             </a:r>
           </a:p>
           <a:p>
@@ -565,7 +580,7 @@
     </p:spTree>
     <p:extLst>
       <p:ext uri="{BB962C8B-B14F-4D97-AF65-F5344CB8AC3E}">
-        <p14:creationId xmlns:p14="http://schemas.microsoft.com/office/powerpoint/2010/main" val="3626685704"/>
+        <p14:creationId xmlns:p14="http://schemas.microsoft.com/office/powerpoint/2010/main" val="1232173095"/>
       </p:ext>
     </p:extLst>
   </p:cSld>
@@ -705,8 +720,23 @@
           <a:p>
             <a:r>
               <a:rPr lang="en-US" dirty="0"/>
-              <a:t>Add WIF</a:t>
-            </a:r>
+              <a:t>Blaming the engine.</a:t>
+            </a:r>
+          </a:p>
+          <a:p>
+            <a:r>
+              <a:rPr lang="en-US" dirty="0"/>
+              <a:t>Checking for timing</a:t>
+            </a:r>
+          </a:p>
+          <a:p>
+            <a:r>
+              <a:rPr lang="en-US" dirty="0"/>
+              <a:t>Binary Search</a:t>
+            </a:r>
+          </a:p>
+          <a:p>
+            <a:endParaRPr lang="en-US" dirty="0"/>
           </a:p>
         </p:txBody>
       </p:sp>
@@ -725,9 +755,96 @@
           <a:bodyPr/>
           <a:lstStyle/>
           <a:p>
+            <a:fld id="{6BFF3EFC-B7E2-4F0E-9300-F6EC17A9DE76}" type="slidenum">
+              <a:rPr lang="en-US" smtClean="0"/>
+              <a:t>10</a:t>
+            </a:fld>
+            <a:endParaRPr lang="en-US"/>
+          </a:p>
+        </p:txBody>
+      </p:sp>
+    </p:spTree>
+    <p:extLst>
+      <p:ext uri="{BB962C8B-B14F-4D97-AF65-F5344CB8AC3E}">
+        <p14:creationId xmlns:p14="http://schemas.microsoft.com/office/powerpoint/2010/main" val="3626685704"/>
+      </p:ext>
+    </p:extLst>
+  </p:cSld>
+  <p:clrMapOvr>
+    <a:masterClrMapping/>
+  </p:clrMapOvr>
+</p:notes>
+</file>
+
+<file path=ppt/notesSlides/notesSlide4.xml><?xml version="1.0" encoding="utf-8"?>
+<p:notes xmlns:a="http://schemas.openxmlformats.org/drawingml/2006/main" xmlns:r="http://schemas.openxmlformats.org/officeDocument/2006/relationships" xmlns:p="http://schemas.openxmlformats.org/presentationml/2006/main">
+  <p:cSld>
+    <p:spTree>
+      <p:nvGrpSpPr>
+        <p:cNvPr id="1" name=""/>
+        <p:cNvGrpSpPr/>
+        <p:nvPr/>
+      </p:nvGrpSpPr>
+      <p:grpSpPr>
+        <a:xfrm>
+          <a:off x="0" y="0"/>
+          <a:ext cx="0" cy="0"/>
+          <a:chOff x="0" y="0"/>
+          <a:chExt cx="0" cy="0"/>
+        </a:xfrm>
+      </p:grpSpPr>
+      <p:sp>
+        <p:nvSpPr>
+          <p:cNvPr id="2" name="Slide Image Placeholder 1"/>
+          <p:cNvSpPr>
+            <a:spLocks noGrp="1" noRot="1" noChangeAspect="1"/>
+          </p:cNvSpPr>
+          <p:nvPr>
+            <p:ph type="sldImg"/>
+          </p:nvPr>
+        </p:nvSpPr>
+        <p:spPr/>
+      </p:sp>
+      <p:sp>
+        <p:nvSpPr>
+          <p:cNvPr id="3" name="Notes Placeholder 2"/>
+          <p:cNvSpPr>
+            <a:spLocks noGrp="1"/>
+          </p:cNvSpPr>
+          <p:nvPr>
+            <p:ph type="body" idx="1"/>
+          </p:nvPr>
+        </p:nvSpPr>
+        <p:spPr/>
+        <p:txBody>
+          <a:bodyPr/>
+          <a:lstStyle/>
+          <a:p>
+            <a:r>
+              <a:rPr lang="en-US" dirty="0"/>
+              <a:t>Add WIF</a:t>
+            </a:r>
+          </a:p>
+        </p:txBody>
+      </p:sp>
+      <p:sp>
+        <p:nvSpPr>
+          <p:cNvPr id="4" name="Slide Number Placeholder 3"/>
+          <p:cNvSpPr>
+            <a:spLocks noGrp="1"/>
+          </p:cNvSpPr>
+          <p:nvPr>
+            <p:ph type="sldNum" sz="quarter" idx="10"/>
+          </p:nvPr>
+        </p:nvSpPr>
+        <p:spPr/>
+        <p:txBody>
+          <a:bodyPr/>
+          <a:lstStyle/>
+          <a:p>
             <a:fld id="{851B3976-BA5C-4172-B420-FFE6D6004C76}" type="slidenum">
               <a:rPr lang="en-US" smtClean="0"/>
-              <a:t>19</a:t>
+              <a:t>24</a:t>
             </a:fld>
             <a:endParaRPr lang="en-US" dirty="0"/>
           </a:p>
@@ -3921,7 +4038,7 @@
           <a:p>
             <a:fld id="{86E674FB-04A2-4C43-8E96-48380D248600}" type="datetimeFigureOut">
               <a:rPr lang="en-US" smtClean="0"/>
-              <a:t>7/10/2018</a:t>
+              <a:t>7/16/2018</a:t>
             </a:fld>
             <a:endParaRPr lang="en-US"/>
           </a:p>
@@ -4618,7 +4735,7 @@
           <a:p>
             <a:fld id="{86E674FB-04A2-4C43-8E96-48380D248600}" type="datetimeFigureOut">
               <a:rPr lang="en-US" smtClean="0"/>
-              <a:t>7/10/2018</a:t>
+              <a:t>7/16/2018</a:t>
             </a:fld>
             <a:endParaRPr lang="en-US"/>
           </a:p>
@@ -7414,7 +7531,7 @@
           <a:bodyPr/>
           <a:lstStyle/>
           <a:p>
-            <a:endParaRPr lang="en-US"/>
+            <a:endParaRPr lang="en-US" dirty="0"/>
           </a:p>
         </p:txBody>
       </p:sp>
@@ -7450,10 +7567,10 @@
       </p:grpSpPr>
       <p:sp>
         <p:nvSpPr>
-          <p:cNvPr id="6" name="Text Placeholder 5">
+          <p:cNvPr id="3" name="Title 2">
             <a:extLst>
               <a:ext uri="{FF2B5EF4-FFF2-40B4-BE49-F238E27FC236}">
-                <a16:creationId xmlns:a16="http://schemas.microsoft.com/office/drawing/2014/main" id="{AE7D9B36-B649-4C5D-AE68-ED0ADFB9E016}"/>
+                <a16:creationId xmlns:a16="http://schemas.microsoft.com/office/drawing/2014/main" id="{5BF0A7A1-54AB-4AC1-9EBC-D6F9385782EC}"/>
               </a:ext>
             </a:extLst>
           </p:cNvPr>
@@ -7461,7 +7578,7 @@
             <a:spLocks noGrp="1"/>
           </p:cNvSpPr>
           <p:nvPr>
-            <p:ph type="body" sz="quarter" idx="10"/>
+            <p:ph type="title"/>
           </p:nvPr>
         </p:nvSpPr>
         <p:spPr/>
@@ -7471,15 +7588,1039 @@
           <a:p>
             <a:r>
               <a:rPr lang="en-US" dirty="0"/>
-              <a:t>Debugging Reentrant VIs</a:t>
-            </a:r>
+              <a:t>Where is the Bug?</a:t>
+            </a:r>
+          </a:p>
+        </p:txBody>
+      </p:sp>
+      <p:sp>
+        <p:nvSpPr>
+          <p:cNvPr id="4" name="Content Placeholder 3">
+            <a:extLst>
+              <a:ext uri="{FF2B5EF4-FFF2-40B4-BE49-F238E27FC236}">
+                <a16:creationId xmlns:a16="http://schemas.microsoft.com/office/drawing/2014/main" id="{714FFCFE-2D37-4950-95AF-26A2EB38AB9B}"/>
+              </a:ext>
+            </a:extLst>
+          </p:cNvPr>
+          <p:cNvSpPr>
+            <a:spLocks noGrp="1"/>
+          </p:cNvSpPr>
+          <p:nvPr>
+            <p:ph idx="1"/>
+          </p:nvPr>
+        </p:nvSpPr>
+        <p:spPr/>
+        <p:txBody>
+          <a:bodyPr/>
+          <a:lstStyle/>
+          <a:p>
+            <a:endParaRPr lang="en-US" dirty="0"/>
+          </a:p>
+          <a:p>
+            <a:endParaRPr lang="en-US" dirty="0"/>
+          </a:p>
+          <a:p>
+            <a:endParaRPr lang="en-US" dirty="0"/>
+          </a:p>
+          <a:p>
+            <a:r>
+              <a:rPr lang="en-US" dirty="0"/>
+              <a:t> </a:t>
+            </a:r>
+          </a:p>
+        </p:txBody>
+      </p:sp>
+      <p:sp>
+        <p:nvSpPr>
+          <p:cNvPr id="6" name="Rectangle: Rounded Corners 5">
+            <a:extLst>
+              <a:ext uri="{FF2B5EF4-FFF2-40B4-BE49-F238E27FC236}">
+                <a16:creationId xmlns:a16="http://schemas.microsoft.com/office/drawing/2014/main" id="{0FE5106C-B61D-4A87-BE8F-F179689C2AF6}"/>
+              </a:ext>
+            </a:extLst>
+          </p:cNvPr>
+          <p:cNvSpPr/>
+          <p:nvPr/>
+        </p:nvSpPr>
+        <p:spPr>
+          <a:xfrm>
+            <a:off x="8673266" y="1488513"/>
+            <a:ext cx="1469409" cy="555009"/>
+          </a:xfrm>
+          <a:prstGeom prst="roundRect">
+            <a:avLst/>
+          </a:prstGeom>
+          <a:noFill/>
+          <a:ln w="12700">
+            <a:solidFill>
+              <a:schemeClr val="bg2">
+                <a:lumMod val="25000"/>
+              </a:schemeClr>
+            </a:solidFill>
+          </a:ln>
+          <a:effectLst/>
+        </p:spPr>
+        <p:style>
+          <a:lnRef idx="1">
+            <a:schemeClr val="accent1"/>
+          </a:lnRef>
+          <a:fillRef idx="3">
+            <a:schemeClr val="accent1"/>
+          </a:fillRef>
+          <a:effectRef idx="2">
+            <a:schemeClr val="accent1"/>
+          </a:effectRef>
+          <a:fontRef idx="minor">
+            <a:schemeClr val="lt1"/>
+          </a:fontRef>
+        </p:style>
+        <p:txBody>
+          <a:bodyPr rot="0" spcFirstLastPara="0" vertOverflow="overflow" horzOverflow="overflow" vert="horz" wrap="square" lIns="0" tIns="45720" rIns="0" bIns="45720" numCol="1" spcCol="0" rtlCol="0" fromWordArt="0" anchor="ctr" anchorCtr="0" forceAA="0" compatLnSpc="1">
+            <a:prstTxWarp prst="textNoShape">
+              <a:avLst/>
+            </a:prstTxWarp>
+            <a:noAutofit/>
+          </a:bodyPr>
+          <a:lstStyle/>
+          <a:p>
+            <a:pPr algn="ctr"/>
+            <a:r>
+              <a:rPr lang="en-US" sz="1600" dirty="0">
+                <a:solidFill>
+                  <a:schemeClr val="bg2">
+                    <a:lumMod val="25000"/>
+                  </a:schemeClr>
+                </a:solidFill>
+              </a:rPr>
+              <a:t>UI VI</a:t>
+            </a:r>
+          </a:p>
+        </p:txBody>
+      </p:sp>
+      <p:sp>
+        <p:nvSpPr>
+          <p:cNvPr id="7" name="Rectangle: Rounded Corners 6">
+            <a:extLst>
+              <a:ext uri="{FF2B5EF4-FFF2-40B4-BE49-F238E27FC236}">
+                <a16:creationId xmlns:a16="http://schemas.microsoft.com/office/drawing/2014/main" id="{A6495EB2-EB32-4FCE-B891-EA608ECFF336}"/>
+              </a:ext>
+            </a:extLst>
+          </p:cNvPr>
+          <p:cNvSpPr/>
+          <p:nvPr/>
+        </p:nvSpPr>
+        <p:spPr>
+          <a:xfrm>
+            <a:off x="6615047" y="1488514"/>
+            <a:ext cx="1469409" cy="555009"/>
+          </a:xfrm>
+          <a:prstGeom prst="roundRect">
+            <a:avLst/>
+          </a:prstGeom>
+          <a:noFill/>
+          <a:ln w="12700">
+            <a:solidFill>
+              <a:schemeClr val="bg2">
+                <a:lumMod val="25000"/>
+              </a:schemeClr>
+            </a:solidFill>
+          </a:ln>
+          <a:effectLst/>
+        </p:spPr>
+        <p:style>
+          <a:lnRef idx="1">
+            <a:schemeClr val="accent1"/>
+          </a:lnRef>
+          <a:fillRef idx="3">
+            <a:schemeClr val="accent1"/>
+          </a:fillRef>
+          <a:effectRef idx="2">
+            <a:schemeClr val="accent1"/>
+          </a:effectRef>
+          <a:fontRef idx="minor">
+            <a:schemeClr val="lt1"/>
+          </a:fontRef>
+        </p:style>
+        <p:txBody>
+          <a:bodyPr rot="0" spcFirstLastPara="0" vertOverflow="overflow" horzOverflow="overflow" vert="horz" wrap="square" lIns="0" tIns="45720" rIns="0" bIns="45720" numCol="1" spcCol="0" rtlCol="0" fromWordArt="0" anchor="ctr" anchorCtr="0" forceAA="0" compatLnSpc="1">
+            <a:prstTxWarp prst="textNoShape">
+              <a:avLst/>
+            </a:prstTxWarp>
+            <a:noAutofit/>
+          </a:bodyPr>
+          <a:lstStyle/>
+          <a:p>
+            <a:pPr algn="ctr"/>
+            <a:r>
+              <a:rPr lang="en-US" sz="1600" dirty="0">
+                <a:solidFill>
+                  <a:schemeClr val="bg2">
+                    <a:lumMod val="25000"/>
+                  </a:schemeClr>
+                </a:solidFill>
+              </a:rPr>
+              <a:t>DCAF UI Module</a:t>
+            </a:r>
+          </a:p>
+        </p:txBody>
+      </p:sp>
+      <p:sp>
+        <p:nvSpPr>
+          <p:cNvPr id="8" name="Rectangle: Rounded Corners 7">
+            <a:extLst>
+              <a:ext uri="{FF2B5EF4-FFF2-40B4-BE49-F238E27FC236}">
+                <a16:creationId xmlns:a16="http://schemas.microsoft.com/office/drawing/2014/main" id="{CFFE59CF-F6EC-4A7D-B8A1-042BEA368159}"/>
+              </a:ext>
+            </a:extLst>
+          </p:cNvPr>
+          <p:cNvSpPr/>
+          <p:nvPr/>
+        </p:nvSpPr>
+        <p:spPr>
+          <a:xfrm>
+            <a:off x="3358918" y="3885599"/>
+            <a:ext cx="1469409" cy="555009"/>
+          </a:xfrm>
+          <a:prstGeom prst="roundRect">
+            <a:avLst/>
+          </a:prstGeom>
+          <a:noFill/>
+          <a:ln w="12700">
+            <a:solidFill>
+              <a:schemeClr val="bg2">
+                <a:lumMod val="25000"/>
+              </a:schemeClr>
+            </a:solidFill>
+          </a:ln>
+          <a:effectLst/>
+        </p:spPr>
+        <p:style>
+          <a:lnRef idx="1">
+            <a:schemeClr val="accent1"/>
+          </a:lnRef>
+          <a:fillRef idx="3">
+            <a:schemeClr val="accent1"/>
+          </a:fillRef>
+          <a:effectRef idx="2">
+            <a:schemeClr val="accent1"/>
+          </a:effectRef>
+          <a:fontRef idx="minor">
+            <a:schemeClr val="lt1"/>
+          </a:fontRef>
+        </p:style>
+        <p:txBody>
+          <a:bodyPr rot="0" spcFirstLastPara="0" vertOverflow="overflow" horzOverflow="overflow" vert="horz" wrap="square" lIns="0" tIns="45720" rIns="0" bIns="45720" numCol="1" spcCol="0" rtlCol="0" fromWordArt="0" anchor="ctr" anchorCtr="0" forceAA="0" compatLnSpc="1">
+            <a:prstTxWarp prst="textNoShape">
+              <a:avLst/>
+            </a:prstTxWarp>
+            <a:noAutofit/>
+          </a:bodyPr>
+          <a:lstStyle/>
+          <a:p>
+            <a:pPr algn="ctr"/>
+            <a:r>
+              <a:rPr lang="en-US" sz="1600" dirty="0">
+                <a:solidFill>
+                  <a:schemeClr val="bg2">
+                    <a:lumMod val="25000"/>
+                  </a:schemeClr>
+                </a:solidFill>
+              </a:rPr>
+              <a:t>DCAF UDP Module</a:t>
+            </a:r>
+          </a:p>
+        </p:txBody>
+      </p:sp>
+      <p:sp>
+        <p:nvSpPr>
+          <p:cNvPr id="9" name="Rectangle: Rounded Corners 8">
+            <a:extLst>
+              <a:ext uri="{FF2B5EF4-FFF2-40B4-BE49-F238E27FC236}">
+                <a16:creationId xmlns:a16="http://schemas.microsoft.com/office/drawing/2014/main" id="{742FA073-1818-4231-96C4-E056A8170CE9}"/>
+              </a:ext>
+            </a:extLst>
+          </p:cNvPr>
+          <p:cNvSpPr/>
+          <p:nvPr/>
+        </p:nvSpPr>
+        <p:spPr>
+          <a:xfrm>
+            <a:off x="3358918" y="2688495"/>
+            <a:ext cx="1469409" cy="555009"/>
+          </a:xfrm>
+          <a:prstGeom prst="roundRect">
+            <a:avLst/>
+          </a:prstGeom>
+          <a:noFill/>
+          <a:ln w="12700">
+            <a:solidFill>
+              <a:schemeClr val="bg2">
+                <a:lumMod val="25000"/>
+              </a:schemeClr>
+            </a:solidFill>
+          </a:ln>
+          <a:effectLst/>
+        </p:spPr>
+        <p:style>
+          <a:lnRef idx="1">
+            <a:schemeClr val="accent1"/>
+          </a:lnRef>
+          <a:fillRef idx="3">
+            <a:schemeClr val="accent1"/>
+          </a:fillRef>
+          <a:effectRef idx="2">
+            <a:schemeClr val="accent1"/>
+          </a:effectRef>
+          <a:fontRef idx="minor">
+            <a:schemeClr val="lt1"/>
+          </a:fontRef>
+        </p:style>
+        <p:txBody>
+          <a:bodyPr rot="0" spcFirstLastPara="0" vertOverflow="overflow" horzOverflow="overflow" vert="horz" wrap="square" lIns="0" tIns="45720" rIns="0" bIns="45720" numCol="1" spcCol="0" rtlCol="0" fromWordArt="0" anchor="ctr" anchorCtr="0" forceAA="0" compatLnSpc="1">
+            <a:prstTxWarp prst="textNoShape">
+              <a:avLst/>
+            </a:prstTxWarp>
+            <a:noAutofit/>
+          </a:bodyPr>
+          <a:lstStyle/>
+          <a:p>
+            <a:pPr algn="ctr"/>
+            <a:r>
+              <a:rPr lang="en-US" sz="1600" dirty="0">
+                <a:solidFill>
+                  <a:schemeClr val="bg2">
+                    <a:lumMod val="25000"/>
+                  </a:schemeClr>
+                </a:solidFill>
+              </a:rPr>
+              <a:t>DCAF Engine</a:t>
+            </a:r>
+          </a:p>
+        </p:txBody>
+      </p:sp>
+      <p:sp>
+        <p:nvSpPr>
+          <p:cNvPr id="10" name="Rectangle: Rounded Corners 9">
+            <a:extLst>
+              <a:ext uri="{FF2B5EF4-FFF2-40B4-BE49-F238E27FC236}">
+                <a16:creationId xmlns:a16="http://schemas.microsoft.com/office/drawing/2014/main" id="{9C94929E-C091-4F7D-9419-25733070C79F}"/>
+              </a:ext>
+            </a:extLst>
+          </p:cNvPr>
+          <p:cNvSpPr/>
+          <p:nvPr/>
+        </p:nvSpPr>
+        <p:spPr>
+          <a:xfrm>
+            <a:off x="6615046" y="2688495"/>
+            <a:ext cx="1469409" cy="555009"/>
+          </a:xfrm>
+          <a:prstGeom prst="roundRect">
+            <a:avLst/>
+          </a:prstGeom>
+          <a:noFill/>
+          <a:ln w="12700">
+            <a:solidFill>
+              <a:schemeClr val="bg2">
+                <a:lumMod val="25000"/>
+              </a:schemeClr>
+            </a:solidFill>
+          </a:ln>
+          <a:effectLst/>
+        </p:spPr>
+        <p:style>
+          <a:lnRef idx="1">
+            <a:schemeClr val="accent1"/>
+          </a:lnRef>
+          <a:fillRef idx="3">
+            <a:schemeClr val="accent1"/>
+          </a:fillRef>
+          <a:effectRef idx="2">
+            <a:schemeClr val="accent1"/>
+          </a:effectRef>
+          <a:fontRef idx="minor">
+            <a:schemeClr val="lt1"/>
+          </a:fontRef>
+        </p:style>
+        <p:txBody>
+          <a:bodyPr rot="0" spcFirstLastPara="0" vertOverflow="overflow" horzOverflow="overflow" vert="horz" wrap="square" lIns="0" tIns="45720" rIns="0" bIns="45720" numCol="1" spcCol="0" rtlCol="0" fromWordArt="0" anchor="ctr" anchorCtr="0" forceAA="0" compatLnSpc="1">
+            <a:prstTxWarp prst="textNoShape">
+              <a:avLst/>
+            </a:prstTxWarp>
+            <a:noAutofit/>
+          </a:bodyPr>
+          <a:lstStyle/>
+          <a:p>
+            <a:pPr algn="ctr"/>
+            <a:r>
+              <a:rPr lang="en-US" sz="1600" dirty="0">
+                <a:solidFill>
+                  <a:schemeClr val="bg2">
+                    <a:lumMod val="25000"/>
+                  </a:schemeClr>
+                </a:solidFill>
+              </a:rPr>
+              <a:t>DCAF Engine</a:t>
+            </a:r>
+          </a:p>
+        </p:txBody>
+      </p:sp>
+      <p:sp>
+        <p:nvSpPr>
+          <p:cNvPr id="11" name="Rectangle: Rounded Corners 10">
+            <a:extLst>
+              <a:ext uri="{FF2B5EF4-FFF2-40B4-BE49-F238E27FC236}">
+                <a16:creationId xmlns:a16="http://schemas.microsoft.com/office/drawing/2014/main" id="{FA92686C-A713-4934-A4FD-A309A6E73F82}"/>
+              </a:ext>
+            </a:extLst>
+          </p:cNvPr>
+          <p:cNvSpPr/>
+          <p:nvPr/>
+        </p:nvSpPr>
+        <p:spPr>
+          <a:xfrm>
+            <a:off x="6615048" y="3885598"/>
+            <a:ext cx="1469409" cy="555009"/>
+          </a:xfrm>
+          <a:prstGeom prst="roundRect">
+            <a:avLst/>
+          </a:prstGeom>
+          <a:noFill/>
+          <a:ln w="12700">
+            <a:solidFill>
+              <a:schemeClr val="bg2">
+                <a:lumMod val="25000"/>
+              </a:schemeClr>
+            </a:solidFill>
+          </a:ln>
+          <a:effectLst/>
+        </p:spPr>
+        <p:style>
+          <a:lnRef idx="1">
+            <a:schemeClr val="accent1"/>
+          </a:lnRef>
+          <a:fillRef idx="3">
+            <a:schemeClr val="accent1"/>
+          </a:fillRef>
+          <a:effectRef idx="2">
+            <a:schemeClr val="accent1"/>
+          </a:effectRef>
+          <a:fontRef idx="minor">
+            <a:schemeClr val="lt1"/>
+          </a:fontRef>
+        </p:style>
+        <p:txBody>
+          <a:bodyPr rot="0" spcFirstLastPara="0" vertOverflow="overflow" horzOverflow="overflow" vert="horz" wrap="square" lIns="0" tIns="45720" rIns="0" bIns="45720" numCol="1" spcCol="0" rtlCol="0" fromWordArt="0" anchor="ctr" anchorCtr="0" forceAA="0" compatLnSpc="1">
+            <a:prstTxWarp prst="textNoShape">
+              <a:avLst/>
+            </a:prstTxWarp>
+            <a:noAutofit/>
+          </a:bodyPr>
+          <a:lstStyle/>
+          <a:p>
+            <a:pPr algn="ctr"/>
+            <a:r>
+              <a:rPr lang="en-US" sz="1600" dirty="0">
+                <a:solidFill>
+                  <a:schemeClr val="bg2">
+                    <a:lumMod val="25000"/>
+                  </a:schemeClr>
+                </a:solidFill>
+              </a:rPr>
+              <a:t>DCAF UDP Module</a:t>
+            </a:r>
+          </a:p>
+        </p:txBody>
+      </p:sp>
+      <p:sp>
+        <p:nvSpPr>
+          <p:cNvPr id="12" name="Rectangle: Rounded Corners 11">
+            <a:extLst>
+              <a:ext uri="{FF2B5EF4-FFF2-40B4-BE49-F238E27FC236}">
+                <a16:creationId xmlns:a16="http://schemas.microsoft.com/office/drawing/2014/main" id="{43C3C571-3D1A-4187-9FDB-EDCBD1D38BF8}"/>
+              </a:ext>
+            </a:extLst>
+          </p:cNvPr>
+          <p:cNvSpPr/>
+          <p:nvPr/>
+        </p:nvSpPr>
+        <p:spPr>
+          <a:xfrm>
+            <a:off x="3358919" y="1514901"/>
+            <a:ext cx="1469409" cy="555009"/>
+          </a:xfrm>
+          <a:prstGeom prst="roundRect">
+            <a:avLst/>
+          </a:prstGeom>
+          <a:noFill/>
+          <a:ln w="12700">
+            <a:solidFill>
+              <a:schemeClr val="bg2">
+                <a:lumMod val="25000"/>
+              </a:schemeClr>
+            </a:solidFill>
+          </a:ln>
+          <a:effectLst/>
+        </p:spPr>
+        <p:style>
+          <a:lnRef idx="1">
+            <a:schemeClr val="accent1"/>
+          </a:lnRef>
+          <a:fillRef idx="3">
+            <a:schemeClr val="accent1"/>
+          </a:fillRef>
+          <a:effectRef idx="2">
+            <a:schemeClr val="accent1"/>
+          </a:effectRef>
+          <a:fontRef idx="minor">
+            <a:schemeClr val="lt1"/>
+          </a:fontRef>
+        </p:style>
+        <p:txBody>
+          <a:bodyPr rot="0" spcFirstLastPara="0" vertOverflow="overflow" horzOverflow="overflow" vert="horz" wrap="square" lIns="0" tIns="45720" rIns="0" bIns="45720" numCol="1" spcCol="0" rtlCol="0" fromWordArt="0" anchor="ctr" anchorCtr="0" forceAA="0" compatLnSpc="1">
+            <a:prstTxWarp prst="textNoShape">
+              <a:avLst/>
+            </a:prstTxWarp>
+            <a:noAutofit/>
+          </a:bodyPr>
+          <a:lstStyle/>
+          <a:p>
+            <a:pPr algn="ctr"/>
+            <a:r>
+              <a:rPr lang="en-US" sz="1600" dirty="0">
+                <a:solidFill>
+                  <a:schemeClr val="bg2">
+                    <a:lumMod val="25000"/>
+                  </a:schemeClr>
+                </a:solidFill>
+              </a:rPr>
+              <a:t>DCAF Scan Engine Module</a:t>
+            </a:r>
+          </a:p>
+        </p:txBody>
+      </p:sp>
+      <p:sp>
+        <p:nvSpPr>
+          <p:cNvPr id="13" name="Rectangle: Rounded Corners 12">
+            <a:extLst>
+              <a:ext uri="{FF2B5EF4-FFF2-40B4-BE49-F238E27FC236}">
+                <a16:creationId xmlns:a16="http://schemas.microsoft.com/office/drawing/2014/main" id="{EDC8A6DC-3883-41BB-B0DE-C9F64B96ED55}"/>
+              </a:ext>
+            </a:extLst>
+          </p:cNvPr>
+          <p:cNvSpPr/>
+          <p:nvPr/>
+        </p:nvSpPr>
+        <p:spPr>
+          <a:xfrm>
+            <a:off x="1300700" y="1488514"/>
+            <a:ext cx="1469409" cy="555009"/>
+          </a:xfrm>
+          <a:prstGeom prst="roundRect">
+            <a:avLst/>
+          </a:prstGeom>
+          <a:noFill/>
+          <a:ln w="12700">
+            <a:solidFill>
+              <a:schemeClr val="bg2">
+                <a:lumMod val="25000"/>
+              </a:schemeClr>
+            </a:solidFill>
+          </a:ln>
+          <a:effectLst/>
+        </p:spPr>
+        <p:style>
+          <a:lnRef idx="1">
+            <a:schemeClr val="accent1"/>
+          </a:lnRef>
+          <a:fillRef idx="3">
+            <a:schemeClr val="accent1"/>
+          </a:fillRef>
+          <a:effectRef idx="2">
+            <a:schemeClr val="accent1"/>
+          </a:effectRef>
+          <a:fontRef idx="minor">
+            <a:schemeClr val="lt1"/>
+          </a:fontRef>
+        </p:style>
+        <p:txBody>
+          <a:bodyPr rot="0" spcFirstLastPara="0" vertOverflow="overflow" horzOverflow="overflow" vert="horz" wrap="square" lIns="0" tIns="45720" rIns="0" bIns="45720" numCol="1" spcCol="0" rtlCol="0" fromWordArt="0" anchor="ctr" anchorCtr="0" forceAA="0" compatLnSpc="1">
+            <a:prstTxWarp prst="textNoShape">
+              <a:avLst/>
+            </a:prstTxWarp>
+            <a:noAutofit/>
+          </a:bodyPr>
+          <a:lstStyle/>
+          <a:p>
+            <a:pPr algn="ctr"/>
+            <a:r>
+              <a:rPr lang="en-US" sz="1600" dirty="0">
+                <a:solidFill>
+                  <a:schemeClr val="bg2">
+                    <a:lumMod val="25000"/>
+                  </a:schemeClr>
+                </a:solidFill>
+              </a:rPr>
+              <a:t>CRIO Hardware</a:t>
+            </a:r>
+          </a:p>
+        </p:txBody>
+      </p:sp>
+      <p:sp>
+        <p:nvSpPr>
+          <p:cNvPr id="2" name="Arrow: Left-Right 1">
+            <a:extLst>
+              <a:ext uri="{FF2B5EF4-FFF2-40B4-BE49-F238E27FC236}">
+                <a16:creationId xmlns:a16="http://schemas.microsoft.com/office/drawing/2014/main" id="{72DA8C92-EB56-48FC-B325-90118A993E15}"/>
+              </a:ext>
+            </a:extLst>
+          </p:cNvPr>
+          <p:cNvSpPr/>
+          <p:nvPr/>
+        </p:nvSpPr>
+        <p:spPr>
+          <a:xfrm>
+            <a:off x="2857508" y="1652588"/>
+            <a:ext cx="442913" cy="185737"/>
+          </a:xfrm>
+          <a:prstGeom prst="leftRightArrow">
+            <a:avLst/>
+          </a:prstGeom>
+          <a:noFill/>
+          <a:ln w="12700">
+            <a:solidFill>
+              <a:schemeClr val="bg2">
+                <a:lumMod val="25000"/>
+              </a:schemeClr>
+            </a:solidFill>
+          </a:ln>
+          <a:effectLst/>
+        </p:spPr>
+        <p:style>
+          <a:lnRef idx="1">
+            <a:schemeClr val="accent1"/>
+          </a:lnRef>
+          <a:fillRef idx="3">
+            <a:schemeClr val="accent1"/>
+          </a:fillRef>
+          <a:effectRef idx="2">
+            <a:schemeClr val="accent1"/>
+          </a:effectRef>
+          <a:fontRef idx="minor">
+            <a:schemeClr val="lt1"/>
+          </a:fontRef>
+        </p:style>
+        <p:txBody>
+          <a:bodyPr rot="0" spcFirstLastPara="0" vertOverflow="overflow" horzOverflow="overflow" vert="horz" wrap="square" lIns="0" tIns="45720" rIns="0" bIns="45720" numCol="1" spcCol="0" rtlCol="0" fromWordArt="0" anchor="ctr" anchorCtr="0" forceAA="0" compatLnSpc="1">
+            <a:prstTxWarp prst="textNoShape">
+              <a:avLst/>
+            </a:prstTxWarp>
+            <a:noAutofit/>
+          </a:bodyPr>
+          <a:lstStyle/>
+          <a:p>
+            <a:pPr algn="ctr"/>
+            <a:endParaRPr lang="en-US" sz="1600" dirty="0" err="1">
+              <a:solidFill>
+                <a:schemeClr val="bg2">
+                  <a:lumMod val="25000"/>
+                </a:schemeClr>
+              </a:solidFill>
+            </a:endParaRPr>
+          </a:p>
+        </p:txBody>
+      </p:sp>
+      <p:sp>
+        <p:nvSpPr>
+          <p:cNvPr id="21" name="Arrow: Left-Right 20">
+            <a:extLst>
+              <a:ext uri="{FF2B5EF4-FFF2-40B4-BE49-F238E27FC236}">
+                <a16:creationId xmlns:a16="http://schemas.microsoft.com/office/drawing/2014/main" id="{7861A00B-AA63-489D-8BDE-460A9DCF71E3}"/>
+              </a:ext>
+            </a:extLst>
+          </p:cNvPr>
+          <p:cNvSpPr/>
+          <p:nvPr/>
+        </p:nvSpPr>
+        <p:spPr>
+          <a:xfrm>
+            <a:off x="8157404" y="1654969"/>
+            <a:ext cx="442913" cy="185737"/>
+          </a:xfrm>
+          <a:prstGeom prst="leftRightArrow">
+            <a:avLst/>
+          </a:prstGeom>
+          <a:noFill/>
+          <a:ln w="12700">
+            <a:solidFill>
+              <a:schemeClr val="bg2">
+                <a:lumMod val="25000"/>
+              </a:schemeClr>
+            </a:solidFill>
+          </a:ln>
+          <a:effectLst/>
+        </p:spPr>
+        <p:style>
+          <a:lnRef idx="1">
+            <a:schemeClr val="accent1"/>
+          </a:lnRef>
+          <a:fillRef idx="3">
+            <a:schemeClr val="accent1"/>
+          </a:fillRef>
+          <a:effectRef idx="2">
+            <a:schemeClr val="accent1"/>
+          </a:effectRef>
+          <a:fontRef idx="minor">
+            <a:schemeClr val="lt1"/>
+          </a:fontRef>
+        </p:style>
+        <p:txBody>
+          <a:bodyPr rot="0" spcFirstLastPara="0" vertOverflow="overflow" horzOverflow="overflow" vert="horz" wrap="square" lIns="0" tIns="45720" rIns="0" bIns="45720" numCol="1" spcCol="0" rtlCol="0" fromWordArt="0" anchor="ctr" anchorCtr="0" forceAA="0" compatLnSpc="1">
+            <a:prstTxWarp prst="textNoShape">
+              <a:avLst/>
+            </a:prstTxWarp>
+            <a:noAutofit/>
+          </a:bodyPr>
+          <a:lstStyle/>
+          <a:p>
+            <a:pPr algn="ctr"/>
+            <a:endParaRPr lang="en-US" sz="1600" dirty="0" err="1">
+              <a:solidFill>
+                <a:schemeClr val="bg2">
+                  <a:lumMod val="25000"/>
+                </a:schemeClr>
+              </a:solidFill>
+            </a:endParaRPr>
+          </a:p>
+        </p:txBody>
+      </p:sp>
+      <p:sp>
+        <p:nvSpPr>
+          <p:cNvPr id="22" name="Arrow: Left-Right 21">
+            <a:extLst>
+              <a:ext uri="{FF2B5EF4-FFF2-40B4-BE49-F238E27FC236}">
+                <a16:creationId xmlns:a16="http://schemas.microsoft.com/office/drawing/2014/main" id="{3C00C589-3E54-426A-AF37-4F9C6C11F75A}"/>
+              </a:ext>
+            </a:extLst>
+          </p:cNvPr>
+          <p:cNvSpPr/>
+          <p:nvPr/>
+        </p:nvSpPr>
+        <p:spPr>
+          <a:xfrm>
+            <a:off x="5195896" y="3885598"/>
+            <a:ext cx="1171575" cy="555009"/>
+          </a:xfrm>
+          <a:prstGeom prst="leftRightArrow">
+            <a:avLst/>
+          </a:prstGeom>
+          <a:noFill/>
+          <a:ln w="12700">
+            <a:solidFill>
+              <a:schemeClr val="bg2">
+                <a:lumMod val="25000"/>
+              </a:schemeClr>
+            </a:solidFill>
+          </a:ln>
+          <a:effectLst/>
+        </p:spPr>
+        <p:style>
+          <a:lnRef idx="1">
+            <a:schemeClr val="accent1"/>
+          </a:lnRef>
+          <a:fillRef idx="3">
+            <a:schemeClr val="accent1"/>
+          </a:fillRef>
+          <a:effectRef idx="2">
+            <a:schemeClr val="accent1"/>
+          </a:effectRef>
+          <a:fontRef idx="minor">
+            <a:schemeClr val="lt1"/>
+          </a:fontRef>
+        </p:style>
+        <p:txBody>
+          <a:bodyPr rot="0" spcFirstLastPara="0" vertOverflow="overflow" horzOverflow="overflow" vert="horz" wrap="square" lIns="0" tIns="45720" rIns="0" bIns="45720" numCol="1" spcCol="0" rtlCol="0" fromWordArt="0" anchor="ctr" anchorCtr="0" forceAA="0" compatLnSpc="1">
+            <a:prstTxWarp prst="textNoShape">
+              <a:avLst/>
+            </a:prstTxWarp>
+            <a:noAutofit/>
+          </a:bodyPr>
+          <a:lstStyle/>
+          <a:p>
+            <a:pPr algn="ctr"/>
+            <a:r>
+              <a:rPr lang="en-US" sz="1600" dirty="0">
+                <a:solidFill>
+                  <a:schemeClr val="bg2">
+                    <a:lumMod val="25000"/>
+                  </a:schemeClr>
+                </a:solidFill>
+              </a:rPr>
+              <a:t>UDP</a:t>
+            </a:r>
+          </a:p>
+        </p:txBody>
+      </p:sp>
+      <p:sp>
+        <p:nvSpPr>
+          <p:cNvPr id="23" name="Arrow: Up-Down 22">
+            <a:extLst>
+              <a:ext uri="{FF2B5EF4-FFF2-40B4-BE49-F238E27FC236}">
+                <a16:creationId xmlns:a16="http://schemas.microsoft.com/office/drawing/2014/main" id="{8A6F644E-289E-4D9D-89F5-6CDE10F95B42}"/>
+              </a:ext>
+            </a:extLst>
+          </p:cNvPr>
+          <p:cNvSpPr/>
+          <p:nvPr/>
+        </p:nvSpPr>
+        <p:spPr>
+          <a:xfrm>
+            <a:off x="3952597" y="2119313"/>
+            <a:ext cx="247936" cy="447675"/>
+          </a:xfrm>
+          <a:prstGeom prst="upDownArrow">
+            <a:avLst/>
+          </a:prstGeom>
+          <a:noFill/>
+          <a:ln w="12700">
+            <a:solidFill>
+              <a:schemeClr val="bg2">
+                <a:lumMod val="25000"/>
+              </a:schemeClr>
+            </a:solidFill>
+          </a:ln>
+          <a:effectLst/>
+        </p:spPr>
+        <p:style>
+          <a:lnRef idx="1">
+            <a:schemeClr val="accent1"/>
+          </a:lnRef>
+          <a:fillRef idx="3">
+            <a:schemeClr val="accent1"/>
+          </a:fillRef>
+          <a:effectRef idx="2">
+            <a:schemeClr val="accent1"/>
+          </a:effectRef>
+          <a:fontRef idx="minor">
+            <a:schemeClr val="lt1"/>
+          </a:fontRef>
+        </p:style>
+        <p:txBody>
+          <a:bodyPr rot="0" spcFirstLastPara="0" vertOverflow="overflow" horzOverflow="overflow" vert="horz" wrap="square" lIns="0" tIns="45720" rIns="0" bIns="45720" numCol="1" spcCol="0" rtlCol="0" fromWordArt="0" anchor="ctr" anchorCtr="0" forceAA="0" compatLnSpc="1">
+            <a:prstTxWarp prst="textNoShape">
+              <a:avLst/>
+            </a:prstTxWarp>
+            <a:noAutofit/>
+          </a:bodyPr>
+          <a:lstStyle/>
+          <a:p>
+            <a:pPr algn="ctr"/>
+            <a:endParaRPr lang="en-US" sz="1600" dirty="0" err="1">
+              <a:solidFill>
+                <a:schemeClr val="bg2">
+                  <a:lumMod val="25000"/>
+                </a:schemeClr>
+              </a:solidFill>
+            </a:endParaRPr>
+          </a:p>
+        </p:txBody>
+      </p:sp>
+      <p:sp>
+        <p:nvSpPr>
+          <p:cNvPr id="24" name="Arrow: Up-Down 23">
+            <a:extLst>
+              <a:ext uri="{FF2B5EF4-FFF2-40B4-BE49-F238E27FC236}">
+                <a16:creationId xmlns:a16="http://schemas.microsoft.com/office/drawing/2014/main" id="{149342E1-C2B9-42B6-87F7-C04E4D5A6629}"/>
+              </a:ext>
+            </a:extLst>
+          </p:cNvPr>
+          <p:cNvSpPr/>
+          <p:nvPr/>
+        </p:nvSpPr>
+        <p:spPr>
+          <a:xfrm>
+            <a:off x="7225782" y="2119313"/>
+            <a:ext cx="247936" cy="447675"/>
+          </a:xfrm>
+          <a:prstGeom prst="upDownArrow">
+            <a:avLst/>
+          </a:prstGeom>
+          <a:noFill/>
+          <a:ln w="12700">
+            <a:solidFill>
+              <a:schemeClr val="bg2">
+                <a:lumMod val="25000"/>
+              </a:schemeClr>
+            </a:solidFill>
+          </a:ln>
+          <a:effectLst/>
+        </p:spPr>
+        <p:style>
+          <a:lnRef idx="1">
+            <a:schemeClr val="accent1"/>
+          </a:lnRef>
+          <a:fillRef idx="3">
+            <a:schemeClr val="accent1"/>
+          </a:fillRef>
+          <a:effectRef idx="2">
+            <a:schemeClr val="accent1"/>
+          </a:effectRef>
+          <a:fontRef idx="minor">
+            <a:schemeClr val="lt1"/>
+          </a:fontRef>
+        </p:style>
+        <p:txBody>
+          <a:bodyPr rot="0" spcFirstLastPara="0" vertOverflow="overflow" horzOverflow="overflow" vert="horz" wrap="square" lIns="0" tIns="45720" rIns="0" bIns="45720" numCol="1" spcCol="0" rtlCol="0" fromWordArt="0" anchor="ctr" anchorCtr="0" forceAA="0" compatLnSpc="1">
+            <a:prstTxWarp prst="textNoShape">
+              <a:avLst/>
+            </a:prstTxWarp>
+            <a:noAutofit/>
+          </a:bodyPr>
+          <a:lstStyle/>
+          <a:p>
+            <a:pPr algn="ctr"/>
+            <a:endParaRPr lang="en-US" sz="1600" dirty="0" err="1">
+              <a:solidFill>
+                <a:schemeClr val="bg2">
+                  <a:lumMod val="25000"/>
+                </a:schemeClr>
+              </a:solidFill>
+            </a:endParaRPr>
+          </a:p>
+        </p:txBody>
+      </p:sp>
+      <p:sp>
+        <p:nvSpPr>
+          <p:cNvPr id="25" name="Arrow: Up-Down 24">
+            <a:extLst>
+              <a:ext uri="{FF2B5EF4-FFF2-40B4-BE49-F238E27FC236}">
+                <a16:creationId xmlns:a16="http://schemas.microsoft.com/office/drawing/2014/main" id="{4B02C992-5812-4FC5-BE01-615245C88EAA}"/>
+              </a:ext>
+            </a:extLst>
+          </p:cNvPr>
+          <p:cNvSpPr/>
+          <p:nvPr/>
+        </p:nvSpPr>
+        <p:spPr>
+          <a:xfrm>
+            <a:off x="3952597" y="3362748"/>
+            <a:ext cx="247936" cy="447675"/>
+          </a:xfrm>
+          <a:prstGeom prst="upDownArrow">
+            <a:avLst/>
+          </a:prstGeom>
+          <a:noFill/>
+          <a:ln w="12700">
+            <a:solidFill>
+              <a:schemeClr val="bg2">
+                <a:lumMod val="25000"/>
+              </a:schemeClr>
+            </a:solidFill>
+          </a:ln>
+          <a:effectLst/>
+        </p:spPr>
+        <p:style>
+          <a:lnRef idx="1">
+            <a:schemeClr val="accent1"/>
+          </a:lnRef>
+          <a:fillRef idx="3">
+            <a:schemeClr val="accent1"/>
+          </a:fillRef>
+          <a:effectRef idx="2">
+            <a:schemeClr val="accent1"/>
+          </a:effectRef>
+          <a:fontRef idx="minor">
+            <a:schemeClr val="lt1"/>
+          </a:fontRef>
+        </p:style>
+        <p:txBody>
+          <a:bodyPr rot="0" spcFirstLastPara="0" vertOverflow="overflow" horzOverflow="overflow" vert="horz" wrap="square" lIns="0" tIns="45720" rIns="0" bIns="45720" numCol="1" spcCol="0" rtlCol="0" fromWordArt="0" anchor="ctr" anchorCtr="0" forceAA="0" compatLnSpc="1">
+            <a:prstTxWarp prst="textNoShape">
+              <a:avLst/>
+            </a:prstTxWarp>
+            <a:noAutofit/>
+          </a:bodyPr>
+          <a:lstStyle/>
+          <a:p>
+            <a:pPr algn="ctr"/>
+            <a:endParaRPr lang="en-US" sz="1600" dirty="0" err="1">
+              <a:solidFill>
+                <a:schemeClr val="bg2">
+                  <a:lumMod val="25000"/>
+                </a:schemeClr>
+              </a:solidFill>
+            </a:endParaRPr>
+          </a:p>
+        </p:txBody>
+      </p:sp>
+      <p:sp>
+        <p:nvSpPr>
+          <p:cNvPr id="26" name="Arrow: Up-Down 25">
+            <a:extLst>
+              <a:ext uri="{FF2B5EF4-FFF2-40B4-BE49-F238E27FC236}">
+                <a16:creationId xmlns:a16="http://schemas.microsoft.com/office/drawing/2014/main" id="{2F902E6D-7923-4983-AE0C-C70561F3CBD6}"/>
+              </a:ext>
+            </a:extLst>
+          </p:cNvPr>
+          <p:cNvSpPr/>
+          <p:nvPr/>
+        </p:nvSpPr>
+        <p:spPr>
+          <a:xfrm>
+            <a:off x="7251367" y="3318679"/>
+            <a:ext cx="247936" cy="447675"/>
+          </a:xfrm>
+          <a:prstGeom prst="upDownArrow">
+            <a:avLst/>
+          </a:prstGeom>
+          <a:noFill/>
+          <a:ln w="12700">
+            <a:solidFill>
+              <a:schemeClr val="bg2">
+                <a:lumMod val="25000"/>
+              </a:schemeClr>
+            </a:solidFill>
+          </a:ln>
+          <a:effectLst/>
+        </p:spPr>
+        <p:style>
+          <a:lnRef idx="1">
+            <a:schemeClr val="accent1"/>
+          </a:lnRef>
+          <a:fillRef idx="3">
+            <a:schemeClr val="accent1"/>
+          </a:fillRef>
+          <a:effectRef idx="2">
+            <a:schemeClr val="accent1"/>
+          </a:effectRef>
+          <a:fontRef idx="minor">
+            <a:schemeClr val="lt1"/>
+          </a:fontRef>
+        </p:style>
+        <p:txBody>
+          <a:bodyPr rot="0" spcFirstLastPara="0" vertOverflow="overflow" horzOverflow="overflow" vert="horz" wrap="square" lIns="0" tIns="45720" rIns="0" bIns="45720" numCol="1" spcCol="0" rtlCol="0" fromWordArt="0" anchor="ctr" anchorCtr="0" forceAA="0" compatLnSpc="1">
+            <a:prstTxWarp prst="textNoShape">
+              <a:avLst/>
+            </a:prstTxWarp>
+            <a:noAutofit/>
+          </a:bodyPr>
+          <a:lstStyle/>
+          <a:p>
+            <a:pPr algn="ctr"/>
+            <a:endParaRPr lang="en-US" sz="1600" dirty="0" err="1">
+              <a:solidFill>
+                <a:schemeClr val="bg2">
+                  <a:lumMod val="25000"/>
+                </a:schemeClr>
+              </a:solidFill>
+            </a:endParaRPr>
           </a:p>
         </p:txBody>
       </p:sp>
     </p:spTree>
     <p:extLst>
       <p:ext uri="{BB962C8B-B14F-4D97-AF65-F5344CB8AC3E}">
-        <p14:creationId xmlns:p14="http://schemas.microsoft.com/office/powerpoint/2010/main" val="3965479818"/>
+        <p14:creationId xmlns:p14="http://schemas.microsoft.com/office/powerpoint/2010/main" val="2041235494"/>
       </p:ext>
     </p:extLst>
   </p:cSld>
@@ -7508,10 +8649,10 @@
       </p:grpSpPr>
       <p:sp>
         <p:nvSpPr>
-          <p:cNvPr id="3" name="Title 2">
+          <p:cNvPr id="6" name="Text Placeholder 5">
             <a:extLst>
               <a:ext uri="{FF2B5EF4-FFF2-40B4-BE49-F238E27FC236}">
-                <a16:creationId xmlns:a16="http://schemas.microsoft.com/office/drawing/2014/main" id="{DF49AEC4-B33C-499A-9924-FE28288E4BC6}"/>
+                <a16:creationId xmlns:a16="http://schemas.microsoft.com/office/drawing/2014/main" id="{AE7D9B36-B649-4C5D-AE68-ED0ADFB9E016}"/>
               </a:ext>
             </a:extLst>
           </p:cNvPr>
@@ -7519,7 +8660,7 @@
             <a:spLocks noGrp="1"/>
           </p:cNvSpPr>
           <p:nvPr>
-            <p:ph type="title"/>
+            <p:ph type="body" sz="quarter" idx="10"/>
           </p:nvPr>
         </p:nvSpPr>
         <p:spPr/>
@@ -7529,71 +8670,15 @@
           <a:p>
             <a:r>
               <a:rPr lang="en-US" dirty="0"/>
-              <a:t>Reentrant clones.</a:t>
-            </a:r>
-          </a:p>
-        </p:txBody>
-      </p:sp>
-      <p:sp>
-        <p:nvSpPr>
-          <p:cNvPr id="4" name="Content Placeholder 3">
-            <a:extLst>
-              <a:ext uri="{FF2B5EF4-FFF2-40B4-BE49-F238E27FC236}">
-                <a16:creationId xmlns:a16="http://schemas.microsoft.com/office/drawing/2014/main" id="{835344D7-D47E-414A-97EC-07594FE8A744}"/>
-              </a:ext>
-            </a:extLst>
-          </p:cNvPr>
-          <p:cNvSpPr>
-            <a:spLocks noGrp="1"/>
-          </p:cNvSpPr>
-          <p:nvPr>
-            <p:ph idx="1"/>
-          </p:nvPr>
-        </p:nvSpPr>
-        <p:spPr/>
-        <p:txBody>
-          <a:bodyPr/>
-          <a:lstStyle/>
-          <a:p>
-            <a:r>
-              <a:rPr lang="en-US" dirty="0"/>
-              <a:t>Use </a:t>
-            </a:r>
-            <a:r>
-              <a:rPr lang="en-US" dirty="0" err="1"/>
-              <a:t>breakcpoints</a:t>
-            </a:r>
-            <a:endParaRPr lang="en-US" dirty="0"/>
-          </a:p>
-          <a:p>
-            <a:r>
-              <a:rPr lang="en-US" dirty="0"/>
-              <a:t>Use </a:t>
-            </a:r>
-            <a:r>
-              <a:rPr lang="en-US" dirty="0" err="1"/>
-              <a:t>nonreentrant</a:t>
-            </a:r>
-            <a:r>
-              <a:rPr lang="en-US" dirty="0"/>
-              <a:t> Vis (useful if you only have 1 instance)</a:t>
-            </a:r>
-          </a:p>
-          <a:p>
-            <a:r>
-              <a:rPr lang="en-US" dirty="0"/>
-              <a:t>Use syslog (but include clone information)</a:t>
-            </a:r>
-          </a:p>
-          <a:p>
-            <a:endParaRPr lang="en-US" dirty="0"/>
+              <a:t>Hardware Debug Tools</a:t>
+            </a:r>
           </a:p>
         </p:txBody>
       </p:sp>
     </p:spTree>
     <p:extLst>
       <p:ext uri="{BB962C8B-B14F-4D97-AF65-F5344CB8AC3E}">
-        <p14:creationId xmlns:p14="http://schemas.microsoft.com/office/powerpoint/2010/main" val="31355040"/>
+        <p14:creationId xmlns:p14="http://schemas.microsoft.com/office/powerpoint/2010/main" val="82053723"/>
       </p:ext>
     </p:extLst>
   </p:cSld>
@@ -7622,10 +8707,10 @@
       </p:grpSpPr>
       <p:sp>
         <p:nvSpPr>
-          <p:cNvPr id="6" name="Text Placeholder 5">
+          <p:cNvPr id="2" name="Title 1">
             <a:extLst>
               <a:ext uri="{FF2B5EF4-FFF2-40B4-BE49-F238E27FC236}">
-                <a16:creationId xmlns:a16="http://schemas.microsoft.com/office/drawing/2014/main" id="{AE7D9B36-B649-4C5D-AE68-ED0ADFB9E016}"/>
+                <a16:creationId xmlns:a16="http://schemas.microsoft.com/office/drawing/2014/main" id="{3934B0DC-B6B7-4DC2-A64B-A3BA96B1F444}"/>
               </a:ext>
             </a:extLst>
           </p:cNvPr>
@@ -7633,7 +8718,7 @@
             <a:spLocks noGrp="1"/>
           </p:cNvSpPr>
           <p:nvPr>
-            <p:ph type="body" sz="quarter" idx="10"/>
+            <p:ph type="title"/>
           </p:nvPr>
         </p:nvSpPr>
         <p:spPr/>
@@ -7643,15 +8728,77 @@
           <a:p>
             <a:r>
               <a:rPr lang="en-US" dirty="0"/>
-              <a:t>Running Modules Outside of the Engine</a:t>
-            </a:r>
-          </a:p>
-        </p:txBody>
-      </p:sp>
+              <a:t>Distributed System Manager</a:t>
+            </a:r>
+          </a:p>
+        </p:txBody>
+      </p:sp>
+      <p:pic>
+        <p:nvPicPr>
+          <p:cNvPr id="4" name="Content Placeholder 3">
+            <a:extLst>
+              <a:ext uri="{FF2B5EF4-FFF2-40B4-BE49-F238E27FC236}">
+                <a16:creationId xmlns:a16="http://schemas.microsoft.com/office/drawing/2014/main" id="{794E2100-7E24-4D18-A847-971323F78273}"/>
+              </a:ext>
+            </a:extLst>
+          </p:cNvPr>
+          <p:cNvPicPr>
+            <a:picLocks noGrp="1" noChangeAspect="1"/>
+          </p:cNvPicPr>
+          <p:nvPr>
+            <p:ph idx="1"/>
+          </p:nvPr>
+        </p:nvPicPr>
+        <p:blipFill>
+          <a:blip r:embed="rId2"/>
+          <a:stretch>
+            <a:fillRect/>
+          </a:stretch>
+        </p:blipFill>
+        <p:spPr>
+          <a:xfrm>
+            <a:off x="3130310" y="974725"/>
+            <a:ext cx="5921856" cy="4897438"/>
+          </a:xfrm>
+          <a:prstGeom prst="rect">
+            <a:avLst/>
+          </a:prstGeom>
+        </p:spPr>
+      </p:pic>
+      <p:pic>
+        <p:nvPicPr>
+          <p:cNvPr id="5" name="Picture 4">
+            <a:extLst>
+              <a:ext uri="{FF2B5EF4-FFF2-40B4-BE49-F238E27FC236}">
+                <a16:creationId xmlns:a16="http://schemas.microsoft.com/office/drawing/2014/main" id="{9AF9E6D4-9130-49DE-AD9B-4AC5A7990C20}"/>
+              </a:ext>
+            </a:extLst>
+          </p:cNvPr>
+          <p:cNvPicPr>
+            <a:picLocks noChangeAspect="1"/>
+          </p:cNvPicPr>
+          <p:nvPr/>
+        </p:nvPicPr>
+        <p:blipFill>
+          <a:blip r:embed="rId3"/>
+          <a:stretch>
+            <a:fillRect/>
+          </a:stretch>
+        </p:blipFill>
+        <p:spPr>
+          <a:xfrm>
+            <a:off x="10577513" y="6180527"/>
+            <a:ext cx="1233490" cy="427859"/>
+          </a:xfrm>
+          <a:prstGeom prst="rect">
+            <a:avLst/>
+          </a:prstGeom>
+        </p:spPr>
+      </p:pic>
     </p:spTree>
     <p:extLst>
       <p:ext uri="{BB962C8B-B14F-4D97-AF65-F5344CB8AC3E}">
-        <p14:creationId xmlns:p14="http://schemas.microsoft.com/office/powerpoint/2010/main" val="1684131035"/>
+        <p14:creationId xmlns:p14="http://schemas.microsoft.com/office/powerpoint/2010/main" val="4056163920"/>
       </p:ext>
     </p:extLst>
   </p:cSld>
@@ -7680,10 +8827,10 @@
       </p:grpSpPr>
       <p:sp>
         <p:nvSpPr>
-          <p:cNvPr id="3" name="Title 2">
+          <p:cNvPr id="2" name="Title 1">
             <a:extLst>
               <a:ext uri="{FF2B5EF4-FFF2-40B4-BE49-F238E27FC236}">
-                <a16:creationId xmlns:a16="http://schemas.microsoft.com/office/drawing/2014/main" id="{E2F58680-E048-4249-8517-2B6D459C7391}"/>
+                <a16:creationId xmlns:a16="http://schemas.microsoft.com/office/drawing/2014/main" id="{4DC75D02-E695-4CF2-8260-D3CF32503A74}"/>
               </a:ext>
             </a:extLst>
           </p:cNvPr>
@@ -7701,52 +8848,77 @@
           <a:p>
             <a:r>
               <a:rPr lang="en-US" dirty="0"/>
-              <a:t>Make sure parts work before testing the whole</a:t>
-            </a:r>
-          </a:p>
-        </p:txBody>
-      </p:sp>
-      <p:sp>
-        <p:nvSpPr>
-          <p:cNvPr id="4" name="Content Placeholder 3">
+              <a:t>Distributed System Manager</a:t>
+            </a:r>
+          </a:p>
+        </p:txBody>
+      </p:sp>
+      <p:pic>
+        <p:nvPicPr>
+          <p:cNvPr id="5" name="Content Placeholder 4">
             <a:extLst>
               <a:ext uri="{FF2B5EF4-FFF2-40B4-BE49-F238E27FC236}">
-                <a16:creationId xmlns:a16="http://schemas.microsoft.com/office/drawing/2014/main" id="{5744EC8B-4C4A-4237-A990-5CC8E90D971C}"/>
+                <a16:creationId xmlns:a16="http://schemas.microsoft.com/office/drawing/2014/main" id="{54379997-75DA-40CB-A734-C9885E5C70B3}"/>
               </a:ext>
             </a:extLst>
           </p:cNvPr>
-          <p:cNvSpPr>
-            <a:spLocks noGrp="1"/>
-          </p:cNvSpPr>
+          <p:cNvPicPr>
+            <a:picLocks noGrp="1" noChangeAspect="1"/>
+          </p:cNvPicPr>
           <p:nvPr>
             <p:ph idx="1"/>
           </p:nvPr>
-        </p:nvSpPr>
-        <p:spPr/>
-        <p:txBody>
-          <a:bodyPr/>
-          <a:lstStyle/>
-          <a:p>
-            <a:r>
-              <a:rPr lang="en-US" dirty="0"/>
-              <a:t>Test the module with Unit Test of test outside of the engine</a:t>
-            </a:r>
-          </a:p>
-          <a:p>
-            <a:r>
-              <a:rPr lang="en-US" dirty="0"/>
-              <a:t>Sometimes you need to test in the engine, publish the tags.</a:t>
-            </a:r>
-          </a:p>
-          <a:p>
-            <a:endParaRPr lang="en-US" dirty="0"/>
-          </a:p>
-        </p:txBody>
-      </p:sp>
+        </p:nvPicPr>
+        <p:blipFill>
+          <a:blip r:embed="rId2"/>
+          <a:stretch>
+            <a:fillRect/>
+          </a:stretch>
+        </p:blipFill>
+        <p:spPr>
+          <a:xfrm>
+            <a:off x="3354208" y="974725"/>
+            <a:ext cx="5474059" cy="4897438"/>
+          </a:xfrm>
+          <a:prstGeom prst="rect">
+            <a:avLst/>
+          </a:prstGeom>
+        </p:spPr>
+      </p:pic>
+      <p:pic>
+        <p:nvPicPr>
+          <p:cNvPr id="4" name="Picture 3">
+            <a:extLst>
+              <a:ext uri="{FF2B5EF4-FFF2-40B4-BE49-F238E27FC236}">
+                <a16:creationId xmlns:a16="http://schemas.microsoft.com/office/drawing/2014/main" id="{0D554380-973A-4D07-BE34-85FABA0F6FF2}"/>
+              </a:ext>
+            </a:extLst>
+          </p:cNvPr>
+          <p:cNvPicPr>
+            <a:picLocks noChangeAspect="1"/>
+          </p:cNvPicPr>
+          <p:nvPr/>
+        </p:nvPicPr>
+        <p:blipFill>
+          <a:blip r:embed="rId3"/>
+          <a:stretch>
+            <a:fillRect/>
+          </a:stretch>
+        </p:blipFill>
+        <p:spPr>
+          <a:xfrm>
+            <a:off x="10577513" y="6180527"/>
+            <a:ext cx="1233490" cy="427859"/>
+          </a:xfrm>
+          <a:prstGeom prst="rect">
+            <a:avLst/>
+          </a:prstGeom>
+        </p:spPr>
+      </p:pic>
     </p:spTree>
     <p:extLst>
       <p:ext uri="{BB962C8B-B14F-4D97-AF65-F5344CB8AC3E}">
-        <p14:creationId xmlns:p14="http://schemas.microsoft.com/office/powerpoint/2010/main" val="2683477547"/>
+        <p14:creationId xmlns:p14="http://schemas.microsoft.com/office/powerpoint/2010/main" val="2322323939"/>
       </p:ext>
     </p:extLst>
   </p:cSld>
@@ -7778,7 +8950,7 @@
           <p:cNvPr id="2" name="Title 1">
             <a:extLst>
               <a:ext uri="{FF2B5EF4-FFF2-40B4-BE49-F238E27FC236}">
-                <a16:creationId xmlns:a16="http://schemas.microsoft.com/office/drawing/2014/main" id="{DC3DD4B3-2936-4F19-B1C4-025DA874A6A8}"/>
+                <a16:creationId xmlns:a16="http://schemas.microsoft.com/office/drawing/2014/main" id="{E5FDC820-0050-4210-9C3D-B82FBA461E83}"/>
               </a:ext>
             </a:extLst>
           </p:cNvPr>
@@ -7794,39 +8966,79 @@
           <a:bodyPr/>
           <a:lstStyle/>
           <a:p>
-            <a:endParaRPr lang="en-US" dirty="0"/>
-          </a:p>
-        </p:txBody>
-      </p:sp>
-      <p:sp>
-        <p:nvSpPr>
-          <p:cNvPr id="3" name="Content Placeholder 2">
+            <a:r>
+              <a:rPr lang="en-US" dirty="0"/>
+              <a:t>Max</a:t>
+            </a:r>
+          </a:p>
+        </p:txBody>
+      </p:sp>
+      <p:pic>
+        <p:nvPicPr>
+          <p:cNvPr id="5" name="Content Placeholder 4">
             <a:extLst>
               <a:ext uri="{FF2B5EF4-FFF2-40B4-BE49-F238E27FC236}">
-                <a16:creationId xmlns:a16="http://schemas.microsoft.com/office/drawing/2014/main" id="{0AC0E4A4-7114-49CD-BAC9-C779530AAE65}"/>
+                <a16:creationId xmlns:a16="http://schemas.microsoft.com/office/drawing/2014/main" id="{BB3B792D-6341-4F9A-A87F-1F798FA3E8EA}"/>
               </a:ext>
             </a:extLst>
           </p:cNvPr>
-          <p:cNvSpPr>
-            <a:spLocks noGrp="1"/>
-          </p:cNvSpPr>
+          <p:cNvPicPr>
+            <a:picLocks noGrp="1" noChangeAspect="1"/>
+          </p:cNvPicPr>
           <p:nvPr>
             <p:ph idx="1"/>
           </p:nvPr>
-        </p:nvSpPr>
-        <p:spPr/>
-        <p:txBody>
-          <a:bodyPr/>
-          <a:lstStyle/>
-          <a:p>
-            <a:endParaRPr lang="en-US"/>
-          </a:p>
-        </p:txBody>
-      </p:sp>
+        </p:nvPicPr>
+        <p:blipFill>
+          <a:blip r:embed="rId2"/>
+          <a:stretch>
+            <a:fillRect/>
+          </a:stretch>
+        </p:blipFill>
+        <p:spPr>
+          <a:xfrm>
+            <a:off x="2486781" y="974725"/>
+            <a:ext cx="7208913" cy="4897438"/>
+          </a:xfrm>
+          <a:prstGeom prst="rect">
+            <a:avLst/>
+          </a:prstGeom>
+        </p:spPr>
+      </p:pic>
+      <p:pic>
+        <p:nvPicPr>
+          <p:cNvPr id="4" name="Picture 3">
+            <a:extLst>
+              <a:ext uri="{FF2B5EF4-FFF2-40B4-BE49-F238E27FC236}">
+                <a16:creationId xmlns:a16="http://schemas.microsoft.com/office/drawing/2014/main" id="{20CA51AB-6AAD-4333-B9AC-4867CBE50C20}"/>
+              </a:ext>
+            </a:extLst>
+          </p:cNvPr>
+          <p:cNvPicPr>
+            <a:picLocks noChangeAspect="1"/>
+          </p:cNvPicPr>
+          <p:nvPr/>
+        </p:nvPicPr>
+        <p:blipFill>
+          <a:blip r:embed="rId3"/>
+          <a:stretch>
+            <a:fillRect/>
+          </a:stretch>
+        </p:blipFill>
+        <p:spPr>
+          <a:xfrm>
+            <a:off x="10577513" y="6180527"/>
+            <a:ext cx="1233490" cy="427859"/>
+          </a:xfrm>
+          <a:prstGeom prst="rect">
+            <a:avLst/>
+          </a:prstGeom>
+        </p:spPr>
+      </p:pic>
     </p:spTree>
     <p:extLst>
       <p:ext uri="{BB962C8B-B14F-4D97-AF65-F5344CB8AC3E}">
-        <p14:creationId xmlns:p14="http://schemas.microsoft.com/office/powerpoint/2010/main" val="2026569288"/>
+        <p14:creationId xmlns:p14="http://schemas.microsoft.com/office/powerpoint/2010/main" val="3215111396"/>
       </p:ext>
     </p:extLst>
   </p:cSld>
@@ -7855,10 +9067,10 @@
       </p:grpSpPr>
       <p:sp>
         <p:nvSpPr>
-          <p:cNvPr id="6" name="Text Placeholder 5">
+          <p:cNvPr id="2" name="Title 1">
             <a:extLst>
               <a:ext uri="{FF2B5EF4-FFF2-40B4-BE49-F238E27FC236}">
-                <a16:creationId xmlns:a16="http://schemas.microsoft.com/office/drawing/2014/main" id="{AE7D9B36-B649-4C5D-AE68-ED0ADFB9E016}"/>
+                <a16:creationId xmlns:a16="http://schemas.microsoft.com/office/drawing/2014/main" id="{09DFB3AE-C167-47A4-8775-2D52A625A2CD}"/>
               </a:ext>
             </a:extLst>
           </p:cNvPr>
@@ -7866,7 +9078,7 @@
             <a:spLocks noGrp="1"/>
           </p:cNvSpPr>
           <p:nvPr>
-            <p:ph type="body" sz="quarter" idx="10"/>
+            <p:ph type="title"/>
           </p:nvPr>
         </p:nvSpPr>
         <p:spPr/>
@@ -7876,15 +9088,64 @@
           <a:p>
             <a:r>
               <a:rPr lang="en-US" dirty="0"/>
-              <a:t>Syslog</a:t>
-            </a:r>
+              <a:t>LEDs and Loop Backs</a:t>
+            </a:r>
+          </a:p>
+        </p:txBody>
+      </p:sp>
+      <p:sp>
+        <p:nvSpPr>
+          <p:cNvPr id="3" name="Content Placeholder 2">
+            <a:extLst>
+              <a:ext uri="{FF2B5EF4-FFF2-40B4-BE49-F238E27FC236}">
+                <a16:creationId xmlns:a16="http://schemas.microsoft.com/office/drawing/2014/main" id="{40A12C4D-4422-4B1A-9F46-2C32D55B8F5D}"/>
+              </a:ext>
+            </a:extLst>
+          </p:cNvPr>
+          <p:cNvSpPr>
+            <a:spLocks noGrp="1"/>
+          </p:cNvSpPr>
+          <p:nvPr>
+            <p:ph idx="1"/>
+          </p:nvPr>
+        </p:nvSpPr>
+        <p:spPr/>
+        <p:txBody>
+          <a:bodyPr/>
+          <a:lstStyle/>
+          <a:p>
+            <a:r>
+              <a:rPr lang="en-US" dirty="0"/>
+              <a:t>Check for “Loose Wires”</a:t>
+            </a:r>
+          </a:p>
+          <a:p>
+            <a:r>
+              <a:rPr lang="en-US" dirty="0"/>
+              <a:t>Some Modules have LEDs</a:t>
+            </a:r>
+          </a:p>
+          <a:p>
+            <a:r>
+              <a:rPr lang="en-US" dirty="0"/>
+              <a:t>The CRIO has User LEDS</a:t>
+            </a:r>
+          </a:p>
+          <a:p>
+            <a:r>
+              <a:rPr lang="en-US" dirty="0"/>
+              <a:t>Make Loopbacks in the modules</a:t>
+            </a:r>
+          </a:p>
+          <a:p>
+            <a:endParaRPr lang="en-US" dirty="0"/>
           </a:p>
         </p:txBody>
       </p:sp>
     </p:spTree>
     <p:extLst>
       <p:ext uri="{BB962C8B-B14F-4D97-AF65-F5344CB8AC3E}">
-        <p14:creationId xmlns:p14="http://schemas.microsoft.com/office/powerpoint/2010/main" val="1126713205"/>
+        <p14:creationId xmlns:p14="http://schemas.microsoft.com/office/powerpoint/2010/main" val="2221521506"/>
       </p:ext>
     </p:extLst>
   </p:cSld>
@@ -7913,12 +9174,18 @@
       </p:grpSpPr>
       <p:sp>
         <p:nvSpPr>
-          <p:cNvPr id="2" name="Title 1"/>
+          <p:cNvPr id="6" name="Text Placeholder 5">
+            <a:extLst>
+              <a:ext uri="{FF2B5EF4-FFF2-40B4-BE49-F238E27FC236}">
+                <a16:creationId xmlns:a16="http://schemas.microsoft.com/office/drawing/2014/main" id="{AE7D9B36-B649-4C5D-AE68-ED0ADFB9E016}"/>
+              </a:ext>
+            </a:extLst>
+          </p:cNvPr>
           <p:cNvSpPr>
             <a:spLocks noGrp="1"/>
           </p:cNvSpPr>
           <p:nvPr>
-            <p:ph type="title"/>
+            <p:ph type="body" sz="quarter" idx="10"/>
           </p:nvPr>
         </p:nvSpPr>
         <p:spPr/>
@@ -7928,91 +9195,15 @@
           <a:p>
             <a:r>
               <a:rPr lang="en-US" dirty="0"/>
-              <a:t>Syslog</a:t>
-            </a:r>
-          </a:p>
-        </p:txBody>
-      </p:sp>
-      <p:sp>
-        <p:nvSpPr>
-          <p:cNvPr id="3" name="Content Placeholder 2"/>
-          <p:cNvSpPr>
-            <a:spLocks noGrp="1"/>
-          </p:cNvSpPr>
-          <p:nvPr>
-            <p:ph idx="1"/>
-          </p:nvPr>
-        </p:nvSpPr>
-        <p:spPr/>
-        <p:txBody>
-          <a:bodyPr/>
-          <a:lstStyle/>
-          <a:p>
-            <a:r>
-              <a:rPr lang="en-US" dirty="0"/>
-              <a:t>Available in Linux RT Targets</a:t>
-            </a:r>
-          </a:p>
-          <a:p>
-            <a:r>
-              <a:rPr lang="en-US" dirty="0"/>
-              <a:t>Event sent to Log:</a:t>
-            </a:r>
-          </a:p>
-          <a:p>
-            <a:pPr lvl="1"/>
-            <a:r>
-              <a:rPr lang="en-US" dirty="0"/>
-              <a:t>Initialization and shutdown of all software modules</a:t>
-            </a:r>
-          </a:p>
-          <a:p>
-            <a:pPr lvl="1"/>
-            <a:r>
-              <a:rPr lang="en-US" dirty="0"/>
-              <a:t>Any error reported to the engine</a:t>
-            </a:r>
-          </a:p>
-          <a:p>
-            <a:pPr lvl="1"/>
-            <a:r>
-              <a:rPr lang="en-US" dirty="0"/>
-              <a:t>Any module trace messages added via the API</a:t>
-            </a:r>
-          </a:p>
-          <a:p>
-            <a:endParaRPr lang="en-US" dirty="0"/>
-          </a:p>
-        </p:txBody>
-      </p:sp>
-      <p:pic>
-        <p:nvPicPr>
-          <p:cNvPr id="5" name="Picture 4"/>
-          <p:cNvPicPr>
-            <a:picLocks noChangeAspect="1"/>
-          </p:cNvPicPr>
-          <p:nvPr/>
-        </p:nvPicPr>
-        <p:blipFill>
-          <a:blip r:embed="rId2"/>
-          <a:stretch>
-            <a:fillRect/>
-          </a:stretch>
-        </p:blipFill>
-        <p:spPr>
-          <a:xfrm>
-            <a:off x="765507" y="4436698"/>
-            <a:ext cx="9376010" cy="1875202"/>
-          </a:xfrm>
-          <a:prstGeom prst="rect">
-            <a:avLst/>
-          </a:prstGeom>
-        </p:spPr>
-      </p:pic>
+              <a:t>Hardware Debug Tools</a:t>
+            </a:r>
+          </a:p>
+        </p:txBody>
+      </p:sp>
     </p:spTree>
     <p:extLst>
       <p:ext uri="{BB962C8B-B14F-4D97-AF65-F5344CB8AC3E}">
-        <p14:creationId xmlns:p14="http://schemas.microsoft.com/office/powerpoint/2010/main" val="292420189"/>
+        <p14:creationId xmlns:p14="http://schemas.microsoft.com/office/powerpoint/2010/main" val="532667646"/>
       </p:ext>
     </p:extLst>
   </p:cSld>
@@ -8041,7 +9232,13 @@
       </p:grpSpPr>
       <p:sp>
         <p:nvSpPr>
-          <p:cNvPr id="2" name="Title 1"/>
+          <p:cNvPr id="2" name="Title 1">
+            <a:extLst>
+              <a:ext uri="{FF2B5EF4-FFF2-40B4-BE49-F238E27FC236}">
+                <a16:creationId xmlns:a16="http://schemas.microsoft.com/office/drawing/2014/main" id="{DC3DD4B3-2936-4F19-B1C4-025DA874A6A8}"/>
+              </a:ext>
+            </a:extLst>
+          </p:cNvPr>
           <p:cNvSpPr>
             <a:spLocks noGrp="1"/>
           </p:cNvSpPr>
@@ -8056,58 +9253,67 @@
           <a:p>
             <a:r>
               <a:rPr lang="en-US" dirty="0"/>
-              <a:t>Syslog - System Log View</a:t>
-            </a:r>
-          </a:p>
-        </p:txBody>
-      </p:sp>
-      <p:pic>
-        <p:nvPicPr>
-          <p:cNvPr id="1026" name="Picture 2" descr="wif.png"/>
-          <p:cNvPicPr>
-            <a:picLocks noGrp="1" noChangeAspect="1" noChangeArrowheads="1"/>
-          </p:cNvPicPr>
+              <a:t>Basic Debug</a:t>
+            </a:r>
+          </a:p>
+        </p:txBody>
+      </p:sp>
+      <p:sp>
+        <p:nvSpPr>
+          <p:cNvPr id="3" name="Content Placeholder 2">
+            <a:extLst>
+              <a:ext uri="{FF2B5EF4-FFF2-40B4-BE49-F238E27FC236}">
+                <a16:creationId xmlns:a16="http://schemas.microsoft.com/office/drawing/2014/main" id="{0AC0E4A4-7114-49CD-BAC9-C779530AAE65}"/>
+              </a:ext>
+            </a:extLst>
+          </p:cNvPr>
+          <p:cNvSpPr>
+            <a:spLocks noGrp="1"/>
+          </p:cNvSpPr>
           <p:nvPr>
             <p:ph idx="1"/>
           </p:nvPr>
-        </p:nvPicPr>
-        <p:blipFill>
-          <a:blip r:embed="rId2">
-            <a:extLst>
-              <a:ext uri="{28A0092B-C50C-407E-A947-70E740481C1C}">
-                <a14:useLocalDpi xmlns:a14="http://schemas.microsoft.com/office/drawing/2010/main" val="0"/>
-              </a:ext>
-            </a:extLst>
-          </a:blip>
-          <a:srcRect/>
-          <a:stretch>
-            <a:fillRect/>
-          </a:stretch>
-        </p:blipFill>
-        <p:spPr bwMode="auto">
-          <a:xfrm>
-            <a:off x="652462" y="1383412"/>
-            <a:ext cx="10887075" cy="4091176"/>
-          </a:xfrm>
-          <a:prstGeom prst="rect">
-            <a:avLst/>
-          </a:prstGeom>
-          <a:noFill/>
-          <a:extLst>
-            <a:ext uri="{909E8E84-426E-40DD-AFC4-6F175D3DCCD1}">
-              <a14:hiddenFill xmlns:a14="http://schemas.microsoft.com/office/drawing/2010/main">
-                <a:solidFill>
-                  <a:srgbClr val="FFFFFF"/>
-                </a:solidFill>
-              </a14:hiddenFill>
-            </a:ext>
-          </a:extLst>
-        </p:spPr>
-      </p:pic>
+        </p:nvSpPr>
+        <p:spPr/>
+        <p:txBody>
+          <a:bodyPr/>
+          <a:lstStyle/>
+          <a:p>
+            <a:r>
+              <a:rPr lang="en-US" dirty="0"/>
+              <a:t>Breakpoints</a:t>
+            </a:r>
+          </a:p>
+          <a:p>
+            <a:r>
+              <a:rPr lang="en-US" dirty="0"/>
+              <a:t>Probes</a:t>
+            </a:r>
+          </a:p>
+          <a:p>
+            <a:r>
+              <a:rPr lang="en-US" dirty="0"/>
+              <a:t>Conditional Probes</a:t>
+            </a:r>
+          </a:p>
+          <a:p>
+            <a:r>
+              <a:rPr lang="en-US" dirty="0"/>
+              <a:t>Hold Error Wire</a:t>
+            </a:r>
+          </a:p>
+          <a:p>
+            <a:r>
+              <a:rPr lang="en-US" dirty="0"/>
+              <a:t>Highlight Execution</a:t>
+            </a:r>
+          </a:p>
+        </p:txBody>
+      </p:sp>
     </p:spTree>
     <p:extLst>
       <p:ext uri="{BB962C8B-B14F-4D97-AF65-F5344CB8AC3E}">
-        <p14:creationId xmlns:p14="http://schemas.microsoft.com/office/powerpoint/2010/main" val="1056925072"/>
+        <p14:creationId xmlns:p14="http://schemas.microsoft.com/office/powerpoint/2010/main" val="109381916"/>
       </p:ext>
     </p:extLst>
   </p:cSld>
@@ -8136,7 +9342,13 @@
       </p:grpSpPr>
       <p:sp>
         <p:nvSpPr>
-          <p:cNvPr id="2" name="Title 1"/>
+          <p:cNvPr id="2" name="Title 1">
+            <a:extLst>
+              <a:ext uri="{FF2B5EF4-FFF2-40B4-BE49-F238E27FC236}">
+                <a16:creationId xmlns:a16="http://schemas.microsoft.com/office/drawing/2014/main" id="{DC3DD4B3-2936-4F19-B1C4-025DA874A6A8}"/>
+              </a:ext>
+            </a:extLst>
+          </p:cNvPr>
           <p:cNvSpPr>
             <a:spLocks noGrp="1"/>
           </p:cNvSpPr>
@@ -8151,56 +9363,47 @@
           <a:p>
             <a:r>
               <a:rPr lang="en-US" dirty="0"/>
-              <a:t>Syslog - System Log View</a:t>
+              <a:t>Front Panel Information</a:t>
             </a:r>
           </a:p>
         </p:txBody>
       </p:sp>
       <p:pic>
         <p:nvPicPr>
-          <p:cNvPr id="5" name="Picture 4" descr="error.png"/>
+          <p:cNvPr id="4" name="Content Placeholder 3">
+            <a:extLst>
+              <a:ext uri="{FF2B5EF4-FFF2-40B4-BE49-F238E27FC236}">
+                <a16:creationId xmlns:a16="http://schemas.microsoft.com/office/drawing/2014/main" id="{F701E084-9D7A-4726-A71F-D0BEF35961D3}"/>
+              </a:ext>
+            </a:extLst>
+          </p:cNvPr>
           <p:cNvPicPr>
-            <a:picLocks noChangeAspect="1" noChangeArrowheads="1"/>
+            <a:picLocks noGrp="1" noChangeAspect="1"/>
           </p:cNvPicPr>
-          <p:nvPr/>
+          <p:nvPr>
+            <p:ph idx="1"/>
+          </p:nvPr>
         </p:nvPicPr>
         <p:blipFill>
-          <a:blip r:embed="rId2">
-            <a:extLst>
-              <a:ext uri="{28A0092B-C50C-407E-A947-70E740481C1C}">
-                <a14:useLocalDpi xmlns:a14="http://schemas.microsoft.com/office/drawing/2010/main" val="0"/>
-              </a:ext>
-            </a:extLst>
-          </a:blip>
-          <a:srcRect/>
+          <a:blip r:embed="rId2"/>
           <a:stretch>
             <a:fillRect/>
           </a:stretch>
         </p:blipFill>
-        <p:spPr bwMode="auto">
-          <a:xfrm>
-            <a:off x="0" y="2333625"/>
-            <a:ext cx="12192000" cy="2190750"/>
+        <p:spPr>
+          <a:xfrm>
+            <a:off x="2431893" y="974725"/>
+            <a:ext cx="7318690" cy="4897438"/>
           </a:xfrm>
           <a:prstGeom prst="rect">
             <a:avLst/>
           </a:prstGeom>
-          <a:noFill/>
-          <a:extLst>
-            <a:ext uri="{909E8E84-426E-40DD-AFC4-6F175D3DCCD1}">
-              <a14:hiddenFill xmlns:a14="http://schemas.microsoft.com/office/drawing/2010/main">
-                <a:solidFill>
-                  <a:srgbClr val="FFFFFF"/>
-                </a:solidFill>
-              </a14:hiddenFill>
-            </a:ext>
-          </a:extLst>
         </p:spPr>
       </p:pic>
     </p:spTree>
     <p:extLst>
       <p:ext uri="{BB962C8B-B14F-4D97-AF65-F5344CB8AC3E}">
-        <p14:creationId xmlns:p14="http://schemas.microsoft.com/office/powerpoint/2010/main" val="3135684955"/>
+        <p14:creationId xmlns:p14="http://schemas.microsoft.com/office/powerpoint/2010/main" val="2569432390"/>
       </p:ext>
     </p:extLst>
   </p:cSld>
@@ -8232,7 +9435,7 @@
           <p:cNvPr id="2" name="Title 1">
             <a:extLst>
               <a:ext uri="{FF2B5EF4-FFF2-40B4-BE49-F238E27FC236}">
-                <a16:creationId xmlns:a16="http://schemas.microsoft.com/office/drawing/2014/main" id="{AABED4E5-1885-4213-AB73-5A879018F720}"/>
+                <a16:creationId xmlns:a16="http://schemas.microsoft.com/office/drawing/2014/main" id="{DC3DD4B3-2936-4F19-B1C4-025DA874A6A8}"/>
               </a:ext>
             </a:extLst>
           </p:cNvPr>
@@ -8250,83 +9453,37 @@
           <a:p>
             <a:r>
               <a:rPr lang="en-US" dirty="0"/>
-              <a:t>Syslog</a:t>
-            </a:r>
-          </a:p>
-        </p:txBody>
-      </p:sp>
-      <p:sp>
-        <p:nvSpPr>
-          <p:cNvPr id="6" name="Content Placeholder 5">
+              <a:t>Code Stumps and Wrappers</a:t>
+            </a:r>
+          </a:p>
+        </p:txBody>
+      </p:sp>
+      <p:pic>
+        <p:nvPicPr>
+          <p:cNvPr id="4" name="Content Placeholder 6">
             <a:extLst>
               <a:ext uri="{FF2B5EF4-FFF2-40B4-BE49-F238E27FC236}">
-                <a16:creationId xmlns:a16="http://schemas.microsoft.com/office/drawing/2014/main" id="{088F3AB2-213F-40DE-89FE-B050C108D933}"/>
-              </a:ext>
-            </a:extLst>
-          </p:cNvPr>
-          <p:cNvSpPr>
-            <a:spLocks noGrp="1"/>
-          </p:cNvSpPr>
-          <p:nvPr>
-            <p:ph sz="half" idx="1"/>
-          </p:nvPr>
-        </p:nvSpPr>
-        <p:spPr/>
-        <p:txBody>
-          <a:bodyPr/>
-          <a:lstStyle/>
-          <a:p>
-            <a:r>
-              <a:rPr lang="en-US" dirty="0"/>
-              <a:t>NI Linux RT targets </a:t>
-            </a:r>
-            <a:r>
-              <a:rPr lang="en-US" b="1" dirty="0"/>
-              <a:t>already have </a:t>
-            </a:r>
-            <a:r>
-              <a:rPr lang="en-US" dirty="0"/>
-              <a:t>a syslog-ng daemon running</a:t>
-            </a:r>
-          </a:p>
-          <a:p>
-            <a:r>
-              <a:rPr lang="en-US" dirty="0"/>
-              <a:t>DCAF taps into the existing background process to log and report messages</a:t>
-            </a:r>
-          </a:p>
-          <a:p>
-            <a:r>
-              <a:rPr lang="en-US" dirty="0"/>
-              <a:t>You can, too!</a:t>
-            </a:r>
-          </a:p>
-        </p:txBody>
-      </p:sp>
-      <p:pic>
-        <p:nvPicPr>
-          <p:cNvPr id="7" name="Picture 6">
-            <a:extLst>
-              <a:ext uri="{FF2B5EF4-FFF2-40B4-BE49-F238E27FC236}">
-                <a16:creationId xmlns:a16="http://schemas.microsoft.com/office/drawing/2014/main" id="{34BA4BC9-2EE0-464D-913D-5FCABF71CEC1}"/>
+                <a16:creationId xmlns:a16="http://schemas.microsoft.com/office/drawing/2014/main" id="{9D7257E4-F67A-4C3C-8655-D9F9AA03A046}"/>
               </a:ext>
             </a:extLst>
           </p:cNvPr>
           <p:cNvPicPr>
-            <a:picLocks noChangeAspect="1"/>
+            <a:picLocks noGrp="1" noChangeAspect="1"/>
           </p:cNvPicPr>
-          <p:nvPr/>
+          <p:nvPr>
+            <p:ph idx="1"/>
+          </p:nvPr>
         </p:nvPicPr>
         <p:blipFill>
-          <a:blip r:embed="rId3"/>
+          <a:blip r:embed="rId2"/>
           <a:stretch>
             <a:fillRect/>
           </a:stretch>
         </p:blipFill>
         <p:spPr>
           <a:xfrm>
-            <a:off x="6172200" y="1143122"/>
-            <a:ext cx="5930747" cy="4571755"/>
+            <a:off x="414338" y="1008870"/>
+            <a:ext cx="11277316" cy="4796618"/>
           </a:xfrm>
           <a:prstGeom prst="rect">
             <a:avLst/>
@@ -8336,13 +9493,91 @@
     </p:spTree>
     <p:extLst>
       <p:ext uri="{BB962C8B-B14F-4D97-AF65-F5344CB8AC3E}">
-        <p14:creationId xmlns:p14="http://schemas.microsoft.com/office/powerpoint/2010/main" val="2600151340"/>
+        <p14:creationId xmlns:p14="http://schemas.microsoft.com/office/powerpoint/2010/main" val="2026569288"/>
       </p:ext>
     </p:extLst>
   </p:cSld>
   <p:clrMapOvr>
     <a:masterClrMapping/>
   </p:clrMapOvr>
+  <p:timing>
+    <p:tnLst>
+      <p:par>
+        <p:cTn id="1" dur="indefinite" restart="never" nodeType="tmRoot">
+          <p:childTnLst>
+            <p:seq concurrent="1" nextAc="seek">
+              <p:cTn id="2" dur="indefinite" nodeType="mainSeq">
+                <p:childTnLst>
+                  <p:par>
+                    <p:cTn id="3" fill="hold">
+                      <p:stCondLst>
+                        <p:cond delay="indefinite"/>
+                        <p:cond evt="onBegin" delay="0">
+                          <p:tn val="2"/>
+                        </p:cond>
+                      </p:stCondLst>
+                      <p:childTnLst>
+                        <p:par>
+                          <p:cTn id="4" fill="hold">
+                            <p:stCondLst>
+                              <p:cond delay="0"/>
+                            </p:stCondLst>
+                            <p:childTnLst>
+                              <p:par>
+                                <p:cTn id="5" presetID="1" presetClass="entr" presetSubtype="0" fill="hold" nodeType="withEffect">
+                                  <p:stCondLst>
+                                    <p:cond delay="0"/>
+                                  </p:stCondLst>
+                                  <p:childTnLst>
+                                    <p:set>
+                                      <p:cBhvr>
+                                        <p:cTn id="6" dur="1" fill="hold">
+                                          <p:stCondLst>
+                                            <p:cond delay="0"/>
+                                          </p:stCondLst>
+                                        </p:cTn>
+                                        <p:tgtEl>
+                                          <p:spTgt spid="4"/>
+                                        </p:tgtEl>
+                                        <p:attrNameLst>
+                                          <p:attrName>style.visibility</p:attrName>
+                                        </p:attrNameLst>
+                                      </p:cBhvr>
+                                      <p:to>
+                                        <p:strVal val="visible"/>
+                                      </p:to>
+                                    </p:set>
+                                  </p:childTnLst>
+                                </p:cTn>
+                              </p:par>
+                            </p:childTnLst>
+                          </p:cTn>
+                        </p:par>
+                      </p:childTnLst>
+                    </p:cTn>
+                  </p:par>
+                </p:childTnLst>
+              </p:cTn>
+              <p:prevCondLst>
+                <p:cond evt="onPrev" delay="0">
+                  <p:tgtEl>
+                    <p:sldTgt/>
+                  </p:tgtEl>
+                </p:cond>
+              </p:prevCondLst>
+              <p:nextCondLst>
+                <p:cond evt="onNext" delay="0">
+                  <p:tgtEl>
+                    <p:sldTgt/>
+                  </p:tgtEl>
+                </p:cond>
+              </p:nextCondLst>
+            </p:seq>
+          </p:childTnLst>
+        </p:cTn>
+      </p:par>
+    </p:tnLst>
+  </p:timing>
 </p:sld>
 </file>
 
@@ -8420,7 +9655,7 @@
           <a:p>
             <a:r>
               <a:rPr lang="en-US" dirty="0"/>
-              <a:t>Basics RT Debugging</a:t>
+              <a:t>Debugging</a:t>
             </a:r>
           </a:p>
           <a:p>
@@ -8506,10 +9741,10 @@
       </p:grpSpPr>
       <p:sp>
         <p:nvSpPr>
-          <p:cNvPr id="6" name="Text Placeholder 5">
+          <p:cNvPr id="3" name="Title 2">
             <a:extLst>
               <a:ext uri="{FF2B5EF4-FFF2-40B4-BE49-F238E27FC236}">
-                <a16:creationId xmlns:a16="http://schemas.microsoft.com/office/drawing/2014/main" id="{AE7D9B36-B649-4C5D-AE68-ED0ADFB9E016}"/>
+                <a16:creationId xmlns:a16="http://schemas.microsoft.com/office/drawing/2014/main" id="{E2F58680-E048-4249-8517-2B6D459C7391}"/>
               </a:ext>
             </a:extLst>
           </p:cNvPr>
@@ -8517,7 +9752,7 @@
             <a:spLocks noGrp="1"/>
           </p:cNvSpPr>
           <p:nvPr>
-            <p:ph type="body" sz="quarter" idx="10"/>
+            <p:ph type="title"/>
           </p:nvPr>
         </p:nvSpPr>
         <p:spPr/>
@@ -8527,15 +9762,122 @@
           <a:p>
             <a:r>
               <a:rPr lang="en-US" dirty="0"/>
-              <a:t>CVT</a:t>
-            </a:r>
+              <a:t>Unit Test</a:t>
+            </a:r>
+          </a:p>
+        </p:txBody>
+      </p:sp>
+      <p:sp>
+        <p:nvSpPr>
+          <p:cNvPr id="4" name="Content Placeholder 3">
+            <a:extLst>
+              <a:ext uri="{FF2B5EF4-FFF2-40B4-BE49-F238E27FC236}">
+                <a16:creationId xmlns:a16="http://schemas.microsoft.com/office/drawing/2014/main" id="{5744EC8B-4C4A-4237-A990-5CC8E90D971C}"/>
+              </a:ext>
+            </a:extLst>
+          </p:cNvPr>
+          <p:cNvSpPr>
+            <a:spLocks noGrp="1"/>
+          </p:cNvSpPr>
+          <p:nvPr>
+            <p:ph idx="1"/>
+          </p:nvPr>
+        </p:nvSpPr>
+        <p:spPr/>
+        <p:txBody>
+          <a:bodyPr/>
+          <a:lstStyle/>
+          <a:p>
+            <a:pPr marL="0" indent="0">
+              <a:buNone/>
+            </a:pPr>
+            <a:r>
+              <a:rPr lang="en-US" altLang="en-US" b="1" dirty="0">
+                <a:solidFill>
+                  <a:srgbClr val="262626"/>
+                </a:solidFill>
+              </a:rPr>
+              <a:t> Unit Testing</a:t>
+            </a:r>
+            <a:r>
+              <a:rPr lang="en-US" altLang="en-US" dirty="0">
+                <a:solidFill>
+                  <a:srgbClr val="262626"/>
+                </a:solidFill>
+              </a:rPr>
+              <a:t>: Looking for errors in a subsystem in isolation.</a:t>
+            </a:r>
+          </a:p>
+          <a:p>
+            <a:pPr marL="0" indent="0">
+              <a:buNone/>
+            </a:pPr>
+            <a:endParaRPr lang="en-US" altLang="en-US" dirty="0">
+              <a:solidFill>
+                <a:srgbClr val="262626"/>
+              </a:solidFill>
+            </a:endParaRPr>
+          </a:p>
+          <a:p>
+            <a:r>
+              <a:rPr lang="en-US" b="1" u="sng" dirty="0"/>
+              <a:t>You can NOT Test everything, </a:t>
+            </a:r>
+            <a:r>
+              <a:rPr lang="en-US" dirty="0"/>
+              <a:t>so choose wisely.</a:t>
+            </a:r>
+          </a:p>
+          <a:p>
+            <a:r>
+              <a:rPr lang="en-US" b="1" dirty="0"/>
+              <a:t>You can NOT do proper testing </a:t>
+            </a:r>
+            <a:r>
+              <a:rPr lang="en-US" dirty="0"/>
+              <a:t>without requirements</a:t>
+            </a:r>
+          </a:p>
+          <a:p>
+            <a:r>
+              <a:rPr lang="en-US" dirty="0"/>
+              <a:t>Testing adds overhead but reduces time spent in debugging.</a:t>
+            </a:r>
+          </a:p>
+          <a:p>
+            <a:r>
+              <a:rPr lang="en-US" dirty="0"/>
+              <a:t>You should do Unit Tests.</a:t>
+            </a:r>
+          </a:p>
+          <a:p>
+            <a:r>
+              <a:rPr lang="en-US" dirty="0"/>
+              <a:t>Make Time for testing.</a:t>
+            </a:r>
+          </a:p>
+          <a:p>
+            <a:pPr marL="0" indent="0">
+              <a:buNone/>
+            </a:pPr>
+            <a:endParaRPr lang="en-US" altLang="en-US" dirty="0">
+              <a:solidFill>
+                <a:srgbClr val="262626"/>
+              </a:solidFill>
+            </a:endParaRPr>
+          </a:p>
+          <a:p>
+            <a:endParaRPr lang="en-US" dirty="0"/>
+          </a:p>
+          <a:p>
+            <a:endParaRPr lang="en-US" dirty="0"/>
           </a:p>
         </p:txBody>
       </p:sp>
     </p:spTree>
     <p:extLst>
       <p:ext uri="{BB962C8B-B14F-4D97-AF65-F5344CB8AC3E}">
-        <p14:creationId xmlns:p14="http://schemas.microsoft.com/office/powerpoint/2010/main" val="3224837406"/>
+        <p14:creationId xmlns:p14="http://schemas.microsoft.com/office/powerpoint/2010/main" val="2683477547"/>
       </p:ext>
     </p:extLst>
   </p:cSld>
@@ -8564,13 +9906,7 @@
       </p:grpSpPr>
       <p:sp>
         <p:nvSpPr>
-          <p:cNvPr id="3" name="Title 2">
-            <a:extLst>
-              <a:ext uri="{FF2B5EF4-FFF2-40B4-BE49-F238E27FC236}">
-                <a16:creationId xmlns:a16="http://schemas.microsoft.com/office/drawing/2014/main" id="{B2039BAC-96DA-4E31-BD10-DFBC32F234C0}"/>
-              </a:ext>
-            </a:extLst>
-          </p:cNvPr>
+          <p:cNvPr id="2" name="Title 1"/>
           <p:cNvSpPr>
             <a:spLocks noGrp="1"/>
           </p:cNvSpPr>
@@ -8585,24 +9921,14 @@
           <a:p>
             <a:r>
               <a:rPr lang="en-US" dirty="0"/>
-              <a:t>What is CVT</a:t>
-            </a:r>
-            <a:br>
-              <a:rPr lang="en-US" dirty="0"/>
-            </a:br>
-            <a:endParaRPr lang="en-US" dirty="0"/>
-          </a:p>
-        </p:txBody>
-      </p:sp>
-      <p:sp>
-        <p:nvSpPr>
-          <p:cNvPr id="4" name="Content Placeholder 3">
-            <a:extLst>
-              <a:ext uri="{FF2B5EF4-FFF2-40B4-BE49-F238E27FC236}">
-                <a16:creationId xmlns:a16="http://schemas.microsoft.com/office/drawing/2014/main" id="{D868F674-D2E1-4342-8B23-4C1A7D786F88}"/>
-              </a:ext>
-            </a:extLst>
-          </p:cNvPr>
+              <a:t>Syslog</a:t>
+            </a:r>
+          </a:p>
+        </p:txBody>
+      </p:sp>
+      <p:sp>
+        <p:nvSpPr>
+          <p:cNvPr id="3" name="Content Placeholder 2"/>
           <p:cNvSpPr>
             <a:spLocks noGrp="1"/>
           </p:cNvSpPr>
@@ -8617,19 +9943,34 @@
           <a:p>
             <a:r>
               <a:rPr lang="en-US" dirty="0"/>
-              <a:t>Use DCAF CVT Module</a:t>
-            </a:r>
-          </a:p>
-          <a:p>
-            <a:r>
-              <a:rPr lang="en-US" dirty="0"/>
-              <a:t>ADD CVT tags to the main VI</a:t>
-            </a:r>
-          </a:p>
-          <a:p>
-            <a:r>
-              <a:rPr lang="en-US" dirty="0"/>
-              <a:t>Make sure the name is correct (handle errors for the tags)</a:t>
+              <a:t>Available in Linux RT Targets</a:t>
+            </a:r>
+          </a:p>
+          <a:p>
+            <a:r>
+              <a:rPr lang="en-US" dirty="0"/>
+              <a:t>Event sent to Log:</a:t>
+            </a:r>
+          </a:p>
+          <a:p>
+            <a:pPr lvl="1"/>
+            <a:r>
+              <a:rPr lang="en-US" dirty="0"/>
+              <a:t>Initialization and shutdown of all software modules</a:t>
+            </a:r>
+          </a:p>
+          <a:p>
+            <a:pPr lvl="1"/>
+            <a:r>
+              <a:rPr lang="en-US" dirty="0"/>
+              <a:t>Any error reported to the engine</a:t>
+            </a:r>
+          </a:p>
+          <a:p>
+            <a:pPr lvl="1"/>
+            <a:r>
+              <a:rPr lang="en-US" dirty="0"/>
+              <a:t>Any module trace messages added via the API</a:t>
             </a:r>
           </a:p>
           <a:p>
@@ -8637,10 +9978,34 @@
           </a:p>
         </p:txBody>
       </p:sp>
+      <p:pic>
+        <p:nvPicPr>
+          <p:cNvPr id="5" name="Picture 4"/>
+          <p:cNvPicPr>
+            <a:picLocks noChangeAspect="1"/>
+          </p:cNvPicPr>
+          <p:nvPr/>
+        </p:nvPicPr>
+        <p:blipFill>
+          <a:blip r:embed="rId2"/>
+          <a:stretch>
+            <a:fillRect/>
+          </a:stretch>
+        </p:blipFill>
+        <p:spPr>
+          <a:xfrm>
+            <a:off x="765507" y="4436698"/>
+            <a:ext cx="9376010" cy="1875202"/>
+          </a:xfrm>
+          <a:prstGeom prst="rect">
+            <a:avLst/>
+          </a:prstGeom>
+        </p:spPr>
+      </p:pic>
     </p:spTree>
     <p:extLst>
       <p:ext uri="{BB962C8B-B14F-4D97-AF65-F5344CB8AC3E}">
-        <p14:creationId xmlns:p14="http://schemas.microsoft.com/office/powerpoint/2010/main" val="1616841979"/>
+        <p14:creationId xmlns:p14="http://schemas.microsoft.com/office/powerpoint/2010/main" val="292420189"/>
       </p:ext>
     </p:extLst>
   </p:cSld>
@@ -8669,6 +10034,536 @@
       </p:grpSpPr>
       <p:sp>
         <p:nvSpPr>
+          <p:cNvPr id="2" name="Title 1"/>
+          <p:cNvSpPr>
+            <a:spLocks noGrp="1"/>
+          </p:cNvSpPr>
+          <p:nvPr>
+            <p:ph type="title"/>
+          </p:nvPr>
+        </p:nvSpPr>
+        <p:spPr/>
+        <p:txBody>
+          <a:bodyPr/>
+          <a:lstStyle/>
+          <a:p>
+            <a:r>
+              <a:rPr lang="en-US" dirty="0"/>
+              <a:t>Syslog - System Log View</a:t>
+            </a:r>
+          </a:p>
+        </p:txBody>
+      </p:sp>
+      <p:pic>
+        <p:nvPicPr>
+          <p:cNvPr id="1026" name="Picture 2" descr="wif.png"/>
+          <p:cNvPicPr>
+            <a:picLocks noGrp="1" noChangeAspect="1" noChangeArrowheads="1"/>
+          </p:cNvPicPr>
+          <p:nvPr>
+            <p:ph idx="1"/>
+          </p:nvPr>
+        </p:nvPicPr>
+        <p:blipFill>
+          <a:blip r:embed="rId2">
+            <a:extLst>
+              <a:ext uri="{28A0092B-C50C-407E-A947-70E740481C1C}">
+                <a14:useLocalDpi xmlns:a14="http://schemas.microsoft.com/office/drawing/2010/main" val="0"/>
+              </a:ext>
+            </a:extLst>
+          </a:blip>
+          <a:srcRect/>
+          <a:stretch>
+            <a:fillRect/>
+          </a:stretch>
+        </p:blipFill>
+        <p:spPr bwMode="auto">
+          <a:xfrm>
+            <a:off x="652462" y="1383412"/>
+            <a:ext cx="10887075" cy="4091176"/>
+          </a:xfrm>
+          <a:prstGeom prst="rect">
+            <a:avLst/>
+          </a:prstGeom>
+          <a:noFill/>
+          <a:extLst>
+            <a:ext uri="{909E8E84-426E-40DD-AFC4-6F175D3DCCD1}">
+              <a14:hiddenFill xmlns:a14="http://schemas.microsoft.com/office/drawing/2010/main">
+                <a:solidFill>
+                  <a:srgbClr val="FFFFFF"/>
+                </a:solidFill>
+              </a14:hiddenFill>
+            </a:ext>
+          </a:extLst>
+        </p:spPr>
+      </p:pic>
+    </p:spTree>
+    <p:extLst>
+      <p:ext uri="{BB962C8B-B14F-4D97-AF65-F5344CB8AC3E}">
+        <p14:creationId xmlns:p14="http://schemas.microsoft.com/office/powerpoint/2010/main" val="1056925072"/>
+      </p:ext>
+    </p:extLst>
+  </p:cSld>
+  <p:clrMapOvr>
+    <a:masterClrMapping/>
+  </p:clrMapOvr>
+</p:sld>
+</file>
+
+<file path=ppt/slides/slide23.xml><?xml version="1.0" encoding="utf-8"?>
+<p:sld xmlns:a="http://schemas.openxmlformats.org/drawingml/2006/main" xmlns:r="http://schemas.openxmlformats.org/officeDocument/2006/relationships" xmlns:p="http://schemas.openxmlformats.org/presentationml/2006/main">
+  <p:cSld>
+    <p:spTree>
+      <p:nvGrpSpPr>
+        <p:cNvPr id="1" name=""/>
+        <p:cNvGrpSpPr/>
+        <p:nvPr/>
+      </p:nvGrpSpPr>
+      <p:grpSpPr>
+        <a:xfrm>
+          <a:off x="0" y="0"/>
+          <a:ext cx="0" cy="0"/>
+          <a:chOff x="0" y="0"/>
+          <a:chExt cx="0" cy="0"/>
+        </a:xfrm>
+      </p:grpSpPr>
+      <p:sp>
+        <p:nvSpPr>
+          <p:cNvPr id="2" name="Title 1"/>
+          <p:cNvSpPr>
+            <a:spLocks noGrp="1"/>
+          </p:cNvSpPr>
+          <p:nvPr>
+            <p:ph type="title"/>
+          </p:nvPr>
+        </p:nvSpPr>
+        <p:spPr/>
+        <p:txBody>
+          <a:bodyPr/>
+          <a:lstStyle/>
+          <a:p>
+            <a:r>
+              <a:rPr lang="en-US" dirty="0"/>
+              <a:t>Syslog - System Log View</a:t>
+            </a:r>
+          </a:p>
+        </p:txBody>
+      </p:sp>
+      <p:pic>
+        <p:nvPicPr>
+          <p:cNvPr id="5" name="Picture 4" descr="error.png"/>
+          <p:cNvPicPr>
+            <a:picLocks noChangeAspect="1" noChangeArrowheads="1"/>
+          </p:cNvPicPr>
+          <p:nvPr/>
+        </p:nvPicPr>
+        <p:blipFill>
+          <a:blip r:embed="rId2">
+            <a:extLst>
+              <a:ext uri="{28A0092B-C50C-407E-A947-70E740481C1C}">
+                <a14:useLocalDpi xmlns:a14="http://schemas.microsoft.com/office/drawing/2010/main" val="0"/>
+              </a:ext>
+            </a:extLst>
+          </a:blip>
+          <a:srcRect/>
+          <a:stretch>
+            <a:fillRect/>
+          </a:stretch>
+        </p:blipFill>
+        <p:spPr bwMode="auto">
+          <a:xfrm>
+            <a:off x="0" y="2333625"/>
+            <a:ext cx="12192000" cy="2190750"/>
+          </a:xfrm>
+          <a:prstGeom prst="rect">
+            <a:avLst/>
+          </a:prstGeom>
+          <a:noFill/>
+          <a:extLst>
+            <a:ext uri="{909E8E84-426E-40DD-AFC4-6F175D3DCCD1}">
+              <a14:hiddenFill xmlns:a14="http://schemas.microsoft.com/office/drawing/2010/main">
+                <a:solidFill>
+                  <a:srgbClr val="FFFFFF"/>
+                </a:solidFill>
+              </a14:hiddenFill>
+            </a:ext>
+          </a:extLst>
+        </p:spPr>
+      </p:pic>
+    </p:spTree>
+    <p:extLst>
+      <p:ext uri="{BB962C8B-B14F-4D97-AF65-F5344CB8AC3E}">
+        <p14:creationId xmlns:p14="http://schemas.microsoft.com/office/powerpoint/2010/main" val="3135684955"/>
+      </p:ext>
+    </p:extLst>
+  </p:cSld>
+  <p:clrMapOvr>
+    <a:masterClrMapping/>
+  </p:clrMapOvr>
+</p:sld>
+</file>
+
+<file path=ppt/slides/slide24.xml><?xml version="1.0" encoding="utf-8"?>
+<p:sld xmlns:a="http://schemas.openxmlformats.org/drawingml/2006/main" xmlns:r="http://schemas.openxmlformats.org/officeDocument/2006/relationships" xmlns:p="http://schemas.openxmlformats.org/presentationml/2006/main">
+  <p:cSld>
+    <p:spTree>
+      <p:nvGrpSpPr>
+        <p:cNvPr id="1" name=""/>
+        <p:cNvGrpSpPr/>
+        <p:nvPr/>
+      </p:nvGrpSpPr>
+      <p:grpSpPr>
+        <a:xfrm>
+          <a:off x="0" y="0"/>
+          <a:ext cx="0" cy="0"/>
+          <a:chOff x="0" y="0"/>
+          <a:chExt cx="0" cy="0"/>
+        </a:xfrm>
+      </p:grpSpPr>
+      <p:sp>
+        <p:nvSpPr>
+          <p:cNvPr id="2" name="Title 1">
+            <a:extLst>
+              <a:ext uri="{FF2B5EF4-FFF2-40B4-BE49-F238E27FC236}">
+                <a16:creationId xmlns:a16="http://schemas.microsoft.com/office/drawing/2014/main" id="{AABED4E5-1885-4213-AB73-5A879018F720}"/>
+              </a:ext>
+            </a:extLst>
+          </p:cNvPr>
+          <p:cNvSpPr>
+            <a:spLocks noGrp="1"/>
+          </p:cNvSpPr>
+          <p:nvPr>
+            <p:ph type="title"/>
+          </p:nvPr>
+        </p:nvSpPr>
+        <p:spPr/>
+        <p:txBody>
+          <a:bodyPr/>
+          <a:lstStyle/>
+          <a:p>
+            <a:r>
+              <a:rPr lang="en-US" dirty="0"/>
+              <a:t>Syslog</a:t>
+            </a:r>
+          </a:p>
+        </p:txBody>
+      </p:sp>
+      <p:sp>
+        <p:nvSpPr>
+          <p:cNvPr id="6" name="Content Placeholder 5">
+            <a:extLst>
+              <a:ext uri="{FF2B5EF4-FFF2-40B4-BE49-F238E27FC236}">
+                <a16:creationId xmlns:a16="http://schemas.microsoft.com/office/drawing/2014/main" id="{088F3AB2-213F-40DE-89FE-B050C108D933}"/>
+              </a:ext>
+            </a:extLst>
+          </p:cNvPr>
+          <p:cNvSpPr>
+            <a:spLocks noGrp="1"/>
+          </p:cNvSpPr>
+          <p:nvPr>
+            <p:ph sz="half" idx="1"/>
+          </p:nvPr>
+        </p:nvSpPr>
+        <p:spPr/>
+        <p:txBody>
+          <a:bodyPr/>
+          <a:lstStyle/>
+          <a:p>
+            <a:r>
+              <a:rPr lang="en-US" dirty="0"/>
+              <a:t>NI Linux RT targets </a:t>
+            </a:r>
+            <a:r>
+              <a:rPr lang="en-US" b="1" dirty="0"/>
+              <a:t>already have </a:t>
+            </a:r>
+            <a:r>
+              <a:rPr lang="en-US" dirty="0"/>
+              <a:t>a syslog-ng daemon running</a:t>
+            </a:r>
+          </a:p>
+          <a:p>
+            <a:r>
+              <a:rPr lang="en-US" dirty="0"/>
+              <a:t>DCAF taps into the existing background process to log and report messages</a:t>
+            </a:r>
+          </a:p>
+          <a:p>
+            <a:r>
+              <a:rPr lang="en-US" dirty="0"/>
+              <a:t>You can, too!</a:t>
+            </a:r>
+          </a:p>
+        </p:txBody>
+      </p:sp>
+      <p:pic>
+        <p:nvPicPr>
+          <p:cNvPr id="7" name="Picture 6">
+            <a:extLst>
+              <a:ext uri="{FF2B5EF4-FFF2-40B4-BE49-F238E27FC236}">
+                <a16:creationId xmlns:a16="http://schemas.microsoft.com/office/drawing/2014/main" id="{34BA4BC9-2EE0-464D-913D-5FCABF71CEC1}"/>
+              </a:ext>
+            </a:extLst>
+          </p:cNvPr>
+          <p:cNvPicPr>
+            <a:picLocks noChangeAspect="1"/>
+          </p:cNvPicPr>
+          <p:nvPr/>
+        </p:nvPicPr>
+        <p:blipFill>
+          <a:blip r:embed="rId3"/>
+          <a:stretch>
+            <a:fillRect/>
+          </a:stretch>
+        </p:blipFill>
+        <p:spPr>
+          <a:xfrm>
+            <a:off x="6172200" y="1143122"/>
+            <a:ext cx="5930747" cy="4571755"/>
+          </a:xfrm>
+          <a:prstGeom prst="rect">
+            <a:avLst/>
+          </a:prstGeom>
+        </p:spPr>
+      </p:pic>
+    </p:spTree>
+    <p:extLst>
+      <p:ext uri="{BB962C8B-B14F-4D97-AF65-F5344CB8AC3E}">
+        <p14:creationId xmlns:p14="http://schemas.microsoft.com/office/powerpoint/2010/main" val="2600151340"/>
+      </p:ext>
+    </p:extLst>
+  </p:cSld>
+  <p:clrMapOvr>
+    <a:masterClrMapping/>
+  </p:clrMapOvr>
+</p:sld>
+</file>
+
+<file path=ppt/slides/slide25.xml><?xml version="1.0" encoding="utf-8"?>
+<p:sld xmlns:a="http://schemas.openxmlformats.org/drawingml/2006/main" xmlns:r="http://schemas.openxmlformats.org/officeDocument/2006/relationships" xmlns:p="http://schemas.openxmlformats.org/presentationml/2006/main">
+  <p:cSld>
+    <p:spTree>
+      <p:nvGrpSpPr>
+        <p:cNvPr id="1" name=""/>
+        <p:cNvGrpSpPr/>
+        <p:nvPr/>
+      </p:nvGrpSpPr>
+      <p:grpSpPr>
+        <a:xfrm>
+          <a:off x="0" y="0"/>
+          <a:ext cx="0" cy="0"/>
+          <a:chOff x="0" y="0"/>
+          <a:chExt cx="0" cy="0"/>
+        </a:xfrm>
+      </p:grpSpPr>
+      <p:sp>
+        <p:nvSpPr>
+          <p:cNvPr id="3" name="Title 2">
+            <a:extLst>
+              <a:ext uri="{FF2B5EF4-FFF2-40B4-BE49-F238E27FC236}">
+                <a16:creationId xmlns:a16="http://schemas.microsoft.com/office/drawing/2014/main" id="{B2039BAC-96DA-4E31-BD10-DFBC32F234C0}"/>
+              </a:ext>
+            </a:extLst>
+          </p:cNvPr>
+          <p:cNvSpPr>
+            <a:spLocks noGrp="1"/>
+          </p:cNvSpPr>
+          <p:nvPr>
+            <p:ph type="title"/>
+          </p:nvPr>
+        </p:nvSpPr>
+        <p:spPr/>
+        <p:txBody>
+          <a:bodyPr/>
+          <a:lstStyle/>
+          <a:p>
+            <a:r>
+              <a:rPr lang="en-US" dirty="0"/>
+              <a:t>What is CVT</a:t>
+            </a:r>
+            <a:br>
+              <a:rPr lang="en-US" dirty="0"/>
+            </a:br>
+            <a:endParaRPr lang="en-US" dirty="0"/>
+          </a:p>
+        </p:txBody>
+      </p:sp>
+      <p:sp>
+        <p:nvSpPr>
+          <p:cNvPr id="4" name="Content Placeholder 3">
+            <a:extLst>
+              <a:ext uri="{FF2B5EF4-FFF2-40B4-BE49-F238E27FC236}">
+                <a16:creationId xmlns:a16="http://schemas.microsoft.com/office/drawing/2014/main" id="{D868F674-D2E1-4342-8B23-4C1A7D786F88}"/>
+              </a:ext>
+            </a:extLst>
+          </p:cNvPr>
+          <p:cNvSpPr>
+            <a:spLocks noGrp="1"/>
+          </p:cNvSpPr>
+          <p:nvPr>
+            <p:ph idx="1"/>
+          </p:nvPr>
+        </p:nvSpPr>
+        <p:spPr/>
+        <p:txBody>
+          <a:bodyPr/>
+          <a:lstStyle/>
+          <a:p>
+            <a:r>
+              <a:rPr lang="en-US" dirty="0"/>
+              <a:t>Current Value Table</a:t>
+            </a:r>
+          </a:p>
+          <a:p>
+            <a:r>
+              <a:rPr lang="en-US" dirty="0"/>
+              <a:t>Can be used as probe</a:t>
+            </a:r>
+          </a:p>
+          <a:p>
+            <a:r>
+              <a:rPr lang="en-US" dirty="0"/>
+              <a:t>Can be used to inject values</a:t>
+            </a:r>
+          </a:p>
+          <a:p>
+            <a:endParaRPr lang="en-US" dirty="0"/>
+          </a:p>
+          <a:p>
+            <a:endParaRPr lang="en-US" dirty="0"/>
+          </a:p>
+          <a:p>
+            <a:endParaRPr lang="en-US" dirty="0"/>
+          </a:p>
+        </p:txBody>
+      </p:sp>
+    </p:spTree>
+    <p:extLst>
+      <p:ext uri="{BB962C8B-B14F-4D97-AF65-F5344CB8AC3E}">
+        <p14:creationId xmlns:p14="http://schemas.microsoft.com/office/powerpoint/2010/main" val="2739885342"/>
+      </p:ext>
+    </p:extLst>
+  </p:cSld>
+  <p:clrMapOvr>
+    <a:masterClrMapping/>
+  </p:clrMapOvr>
+</p:sld>
+</file>
+
+<file path=ppt/slides/slide26.xml><?xml version="1.0" encoding="utf-8"?>
+<p:sld xmlns:a="http://schemas.openxmlformats.org/drawingml/2006/main" xmlns:r="http://schemas.openxmlformats.org/officeDocument/2006/relationships" xmlns:p="http://schemas.openxmlformats.org/presentationml/2006/main">
+  <p:cSld>
+    <p:spTree>
+      <p:nvGrpSpPr>
+        <p:cNvPr id="1" name=""/>
+        <p:cNvGrpSpPr/>
+        <p:nvPr/>
+      </p:nvGrpSpPr>
+      <p:grpSpPr>
+        <a:xfrm>
+          <a:off x="0" y="0"/>
+          <a:ext cx="0" cy="0"/>
+          <a:chOff x="0" y="0"/>
+          <a:chExt cx="0" cy="0"/>
+        </a:xfrm>
+      </p:grpSpPr>
+      <p:sp>
+        <p:nvSpPr>
+          <p:cNvPr id="3" name="Title 2">
+            <a:extLst>
+              <a:ext uri="{FF2B5EF4-FFF2-40B4-BE49-F238E27FC236}">
+                <a16:creationId xmlns:a16="http://schemas.microsoft.com/office/drawing/2014/main" id="{B2039BAC-96DA-4E31-BD10-DFBC32F234C0}"/>
+              </a:ext>
+            </a:extLst>
+          </p:cNvPr>
+          <p:cNvSpPr>
+            <a:spLocks noGrp="1"/>
+          </p:cNvSpPr>
+          <p:nvPr>
+            <p:ph type="title"/>
+          </p:nvPr>
+        </p:nvSpPr>
+        <p:spPr/>
+        <p:txBody>
+          <a:bodyPr/>
+          <a:lstStyle/>
+          <a:p>
+            <a:r>
+              <a:rPr lang="en-US" dirty="0"/>
+              <a:t>What is CVT with DCAF</a:t>
+            </a:r>
+          </a:p>
+        </p:txBody>
+      </p:sp>
+      <p:sp>
+        <p:nvSpPr>
+          <p:cNvPr id="4" name="Content Placeholder 3">
+            <a:extLst>
+              <a:ext uri="{FF2B5EF4-FFF2-40B4-BE49-F238E27FC236}">
+                <a16:creationId xmlns:a16="http://schemas.microsoft.com/office/drawing/2014/main" id="{D868F674-D2E1-4342-8B23-4C1A7D786F88}"/>
+              </a:ext>
+            </a:extLst>
+          </p:cNvPr>
+          <p:cNvSpPr>
+            <a:spLocks noGrp="1"/>
+          </p:cNvSpPr>
+          <p:nvPr>
+            <p:ph idx="1"/>
+          </p:nvPr>
+        </p:nvSpPr>
+        <p:spPr/>
+        <p:txBody>
+          <a:bodyPr/>
+          <a:lstStyle/>
+          <a:p>
+            <a:r>
+              <a:rPr lang="en-US" dirty="0"/>
+              <a:t>Add CVT tags to the main VI</a:t>
+            </a:r>
+          </a:p>
+          <a:p>
+            <a:r>
+              <a:rPr lang="en-US" dirty="0"/>
+              <a:t>Make sure the name is correct (handle errors for the tags)</a:t>
+            </a:r>
+          </a:p>
+          <a:p>
+            <a:endParaRPr lang="en-US" dirty="0"/>
+          </a:p>
+        </p:txBody>
+      </p:sp>
+    </p:spTree>
+    <p:extLst>
+      <p:ext uri="{BB962C8B-B14F-4D97-AF65-F5344CB8AC3E}">
+        <p14:creationId xmlns:p14="http://schemas.microsoft.com/office/powerpoint/2010/main" val="1616841979"/>
+      </p:ext>
+    </p:extLst>
+  </p:cSld>
+  <p:clrMapOvr>
+    <a:masterClrMapping/>
+  </p:clrMapOvr>
+</p:sld>
+</file>
+
+<file path=ppt/slides/slide27.xml><?xml version="1.0" encoding="utf-8"?>
+<p:sld xmlns:a="http://schemas.openxmlformats.org/drawingml/2006/main" xmlns:r="http://schemas.openxmlformats.org/officeDocument/2006/relationships" xmlns:p="http://schemas.openxmlformats.org/presentationml/2006/main">
+  <p:cSld>
+    <p:spTree>
+      <p:nvGrpSpPr>
+        <p:cNvPr id="1" name=""/>
+        <p:cNvGrpSpPr/>
+        <p:nvPr/>
+      </p:nvGrpSpPr>
+      <p:grpSpPr>
+        <a:xfrm>
+          <a:off x="0" y="0"/>
+          <a:ext cx="0" cy="0"/>
+          <a:chOff x="0" y="0"/>
+          <a:chExt cx="0" cy="0"/>
+        </a:xfrm>
+      </p:grpSpPr>
+      <p:sp>
+        <p:nvSpPr>
           <p:cNvPr id="2" name="Title 1">
             <a:extLst>
               <a:ext uri="{FF2B5EF4-FFF2-40B4-BE49-F238E27FC236}">
@@ -8736,6 +10631,179 @@
     <p:extLst>
       <p:ext uri="{BB962C8B-B14F-4D97-AF65-F5344CB8AC3E}">
         <p14:creationId xmlns:p14="http://schemas.microsoft.com/office/powerpoint/2010/main" val="599492445"/>
+      </p:ext>
+    </p:extLst>
+  </p:cSld>
+  <p:clrMapOvr>
+    <a:masterClrMapping/>
+  </p:clrMapOvr>
+</p:sld>
+</file>
+
+<file path=ppt/slides/slide28.xml><?xml version="1.0" encoding="utf-8"?>
+<p:sld xmlns:a="http://schemas.openxmlformats.org/drawingml/2006/main" xmlns:r="http://schemas.openxmlformats.org/officeDocument/2006/relationships" xmlns:p="http://schemas.openxmlformats.org/presentationml/2006/main">
+  <p:cSld>
+    <p:spTree>
+      <p:nvGrpSpPr>
+        <p:cNvPr id="1" name=""/>
+        <p:cNvGrpSpPr/>
+        <p:nvPr/>
+      </p:nvGrpSpPr>
+      <p:grpSpPr>
+        <a:xfrm>
+          <a:off x="0" y="0"/>
+          <a:ext cx="0" cy="0"/>
+          <a:chOff x="0" y="0"/>
+          <a:chExt cx="0" cy="0"/>
+        </a:xfrm>
+      </p:grpSpPr>
+      <p:sp>
+        <p:nvSpPr>
+          <p:cNvPr id="6" name="Text Placeholder 5">
+            <a:extLst>
+              <a:ext uri="{FF2B5EF4-FFF2-40B4-BE49-F238E27FC236}">
+                <a16:creationId xmlns:a16="http://schemas.microsoft.com/office/drawing/2014/main" id="{AE7D9B36-B649-4C5D-AE68-ED0ADFB9E016}"/>
+              </a:ext>
+            </a:extLst>
+          </p:cNvPr>
+          <p:cNvSpPr>
+            <a:spLocks noGrp="1"/>
+          </p:cNvSpPr>
+          <p:nvPr>
+            <p:ph type="body" sz="quarter" idx="10"/>
+          </p:nvPr>
+        </p:nvSpPr>
+        <p:spPr/>
+        <p:txBody>
+          <a:bodyPr/>
+          <a:lstStyle/>
+          <a:p>
+            <a:r>
+              <a:rPr lang="en-US" dirty="0"/>
+              <a:t>Debugging Reentrant VIs</a:t>
+            </a:r>
+          </a:p>
+        </p:txBody>
+      </p:sp>
+    </p:spTree>
+    <p:extLst>
+      <p:ext uri="{BB962C8B-B14F-4D97-AF65-F5344CB8AC3E}">
+        <p14:creationId xmlns:p14="http://schemas.microsoft.com/office/powerpoint/2010/main" val="2744844697"/>
+      </p:ext>
+    </p:extLst>
+  </p:cSld>
+  <p:clrMapOvr>
+    <a:masterClrMapping/>
+  </p:clrMapOvr>
+</p:sld>
+</file>
+
+<file path=ppt/slides/slide29.xml><?xml version="1.0" encoding="utf-8"?>
+<p:sld xmlns:a="http://schemas.openxmlformats.org/drawingml/2006/main" xmlns:r="http://schemas.openxmlformats.org/officeDocument/2006/relationships" xmlns:p="http://schemas.openxmlformats.org/presentationml/2006/main">
+  <p:cSld>
+    <p:spTree>
+      <p:nvGrpSpPr>
+        <p:cNvPr id="1" name=""/>
+        <p:cNvGrpSpPr/>
+        <p:nvPr/>
+      </p:nvGrpSpPr>
+      <p:grpSpPr>
+        <a:xfrm>
+          <a:off x="0" y="0"/>
+          <a:ext cx="0" cy="0"/>
+          <a:chOff x="0" y="0"/>
+          <a:chExt cx="0" cy="0"/>
+        </a:xfrm>
+      </p:grpSpPr>
+      <p:sp>
+        <p:nvSpPr>
+          <p:cNvPr id="3" name="Title 2">
+            <a:extLst>
+              <a:ext uri="{FF2B5EF4-FFF2-40B4-BE49-F238E27FC236}">
+                <a16:creationId xmlns:a16="http://schemas.microsoft.com/office/drawing/2014/main" id="{DF49AEC4-B33C-499A-9924-FE28288E4BC6}"/>
+              </a:ext>
+            </a:extLst>
+          </p:cNvPr>
+          <p:cNvSpPr>
+            <a:spLocks noGrp="1"/>
+          </p:cNvSpPr>
+          <p:nvPr>
+            <p:ph type="title"/>
+          </p:nvPr>
+        </p:nvSpPr>
+        <p:spPr/>
+        <p:txBody>
+          <a:bodyPr/>
+          <a:lstStyle/>
+          <a:p>
+            <a:r>
+              <a:rPr lang="en-US" dirty="0"/>
+              <a:t>Reentrant clones.</a:t>
+            </a:r>
+          </a:p>
+        </p:txBody>
+      </p:sp>
+      <p:sp>
+        <p:nvSpPr>
+          <p:cNvPr id="4" name="Content Placeholder 3">
+            <a:extLst>
+              <a:ext uri="{FF2B5EF4-FFF2-40B4-BE49-F238E27FC236}">
+                <a16:creationId xmlns:a16="http://schemas.microsoft.com/office/drawing/2014/main" id="{835344D7-D47E-414A-97EC-07594FE8A744}"/>
+              </a:ext>
+            </a:extLst>
+          </p:cNvPr>
+          <p:cNvSpPr>
+            <a:spLocks noGrp="1"/>
+          </p:cNvSpPr>
+          <p:nvPr>
+            <p:ph idx="1"/>
+          </p:nvPr>
+        </p:nvSpPr>
+        <p:spPr/>
+        <p:txBody>
+          <a:bodyPr/>
+          <a:lstStyle/>
+          <a:p>
+            <a:r>
+              <a:rPr lang="en-US" dirty="0"/>
+              <a:t>Use breakpoints</a:t>
+            </a:r>
+          </a:p>
+          <a:p>
+            <a:r>
+              <a:rPr lang="en-US" dirty="0"/>
+              <a:t>Use no reentrant VIs (useful if you only have 1 instance)</a:t>
+            </a:r>
+          </a:p>
+          <a:p>
+            <a:r>
+              <a:rPr lang="en-US" dirty="0"/>
+              <a:t>Use syslog (but include clone information)</a:t>
+            </a:r>
+          </a:p>
+          <a:p>
+            <a:r>
+              <a:rPr lang="en-US" dirty="0"/>
+              <a:t>Non Reentrant </a:t>
+            </a:r>
+            <a:r>
+              <a:rPr lang="en-US" dirty="0" err="1"/>
+              <a:t>SubVI</a:t>
+            </a:r>
+            <a:endParaRPr lang="en-US" dirty="0"/>
+          </a:p>
+          <a:p>
+            <a:endParaRPr lang="en-US" dirty="0"/>
+          </a:p>
+          <a:p>
+            <a:endParaRPr lang="en-US" dirty="0"/>
+          </a:p>
+        </p:txBody>
+      </p:sp>
+    </p:spTree>
+    <p:extLst>
+      <p:ext uri="{BB962C8B-B14F-4D97-AF65-F5344CB8AC3E}">
+        <p14:creationId xmlns:p14="http://schemas.microsoft.com/office/powerpoint/2010/main" val="1054654857"/>
       </p:ext>
     </p:extLst>
   </p:cSld>
@@ -9781,6 +11849,1193 @@
     <p:extLst>
       <p:ext uri="{BB962C8B-B14F-4D97-AF65-F5344CB8AC3E}">
         <p14:creationId xmlns:p14="http://schemas.microsoft.com/office/powerpoint/2010/main" val="2569856924"/>
+      </p:ext>
+    </p:extLst>
+  </p:cSld>
+  <p:clrMapOvr>
+    <a:masterClrMapping/>
+  </p:clrMapOvr>
+</p:sld>
+</file>
+
+<file path=ppt/slides/slide30.xml><?xml version="1.0" encoding="utf-8"?>
+<p:sld xmlns:a="http://schemas.openxmlformats.org/drawingml/2006/main" xmlns:r="http://schemas.openxmlformats.org/officeDocument/2006/relationships" xmlns:p="http://schemas.openxmlformats.org/presentationml/2006/main">
+  <p:cSld>
+    <p:spTree>
+      <p:nvGrpSpPr>
+        <p:cNvPr id="1" name=""/>
+        <p:cNvGrpSpPr/>
+        <p:nvPr/>
+      </p:nvGrpSpPr>
+      <p:grpSpPr>
+        <a:xfrm>
+          <a:off x="0" y="0"/>
+          <a:ext cx="0" cy="0"/>
+          <a:chOff x="0" y="0"/>
+          <a:chExt cx="0" cy="0"/>
+        </a:xfrm>
+      </p:grpSpPr>
+      <p:sp>
+        <p:nvSpPr>
+          <p:cNvPr id="2" name="Title 1">
+            <a:extLst>
+              <a:ext uri="{FF2B5EF4-FFF2-40B4-BE49-F238E27FC236}">
+                <a16:creationId xmlns:a16="http://schemas.microsoft.com/office/drawing/2014/main" id="{EC4CB2D9-6989-43E4-A6B4-7FB58F3563C5}"/>
+              </a:ext>
+            </a:extLst>
+          </p:cNvPr>
+          <p:cNvSpPr>
+            <a:spLocks noGrp="1"/>
+          </p:cNvSpPr>
+          <p:nvPr>
+            <p:ph type="title"/>
+          </p:nvPr>
+        </p:nvSpPr>
+        <p:spPr/>
+        <p:txBody>
+          <a:bodyPr/>
+          <a:lstStyle/>
+          <a:p>
+            <a:r>
+              <a:rPr lang="en-US" dirty="0"/>
+              <a:t>Conclusions</a:t>
+            </a:r>
+          </a:p>
+        </p:txBody>
+      </p:sp>
+      <p:sp>
+        <p:nvSpPr>
+          <p:cNvPr id="3" name="Content Placeholder 2">
+            <a:extLst>
+              <a:ext uri="{FF2B5EF4-FFF2-40B4-BE49-F238E27FC236}">
+                <a16:creationId xmlns:a16="http://schemas.microsoft.com/office/drawing/2014/main" id="{D67999E8-7A68-4A49-9C9A-B49BD817E7C1}"/>
+              </a:ext>
+            </a:extLst>
+          </p:cNvPr>
+          <p:cNvSpPr>
+            <a:spLocks noGrp="1"/>
+          </p:cNvSpPr>
+          <p:nvPr>
+            <p:ph idx="1"/>
+          </p:nvPr>
+        </p:nvSpPr>
+        <p:spPr/>
+        <p:txBody>
+          <a:bodyPr/>
+          <a:lstStyle/>
+          <a:p>
+            <a:r>
+              <a:rPr lang="en-US" dirty="0"/>
+              <a:t>Use good practices to prevent bugs and make them easier to find</a:t>
+            </a:r>
+          </a:p>
+          <a:p>
+            <a:r>
+              <a:rPr lang="en-US" dirty="0"/>
+              <a:t>Consider what is causing the bug</a:t>
+            </a:r>
+          </a:p>
+          <a:p>
+            <a:r>
+              <a:rPr lang="en-US" dirty="0"/>
+              <a:t>Use unit test</a:t>
+            </a:r>
+          </a:p>
+          <a:p>
+            <a:r>
+              <a:rPr lang="en-US" dirty="0"/>
+              <a:t>Don’t rule out simple causes</a:t>
+            </a:r>
+          </a:p>
+          <a:p>
+            <a:r>
+              <a:rPr lang="en-US" dirty="0"/>
+              <a:t>Use all </a:t>
+            </a:r>
+            <a:r>
+              <a:rPr lang="en-US"/>
+              <a:t>the different tools</a:t>
+            </a:r>
+            <a:endParaRPr lang="en-US" dirty="0"/>
+          </a:p>
+          <a:p>
+            <a:endParaRPr lang="en-US" dirty="0"/>
+          </a:p>
+        </p:txBody>
+      </p:sp>
+    </p:spTree>
+    <p:extLst>
+      <p:ext uri="{BB962C8B-B14F-4D97-AF65-F5344CB8AC3E}">
+        <p14:creationId xmlns:p14="http://schemas.microsoft.com/office/powerpoint/2010/main" val="2418670157"/>
+      </p:ext>
+    </p:extLst>
+  </p:cSld>
+  <p:clrMapOvr>
+    <a:masterClrMapping/>
+  </p:clrMapOvr>
+</p:sld>
+</file>
+
+<file path=ppt/slides/slide31.xml><?xml version="1.0" encoding="utf-8"?>
+<p:sld xmlns:a="http://schemas.openxmlformats.org/drawingml/2006/main" xmlns:r="http://schemas.openxmlformats.org/officeDocument/2006/relationships" xmlns:p="http://schemas.openxmlformats.org/presentationml/2006/main" show="0">
+  <p:cSld>
+    <p:spTree>
+      <p:nvGrpSpPr>
+        <p:cNvPr id="1" name=""/>
+        <p:cNvGrpSpPr/>
+        <p:nvPr/>
+      </p:nvGrpSpPr>
+      <p:grpSpPr>
+        <a:xfrm>
+          <a:off x="0" y="0"/>
+          <a:ext cx="0" cy="0"/>
+          <a:chOff x="0" y="0"/>
+          <a:chExt cx="0" cy="0"/>
+        </a:xfrm>
+      </p:grpSpPr>
+      <p:sp>
+        <p:nvSpPr>
+          <p:cNvPr id="2" name="Title 1">
+            <a:extLst>
+              <a:ext uri="{FF2B5EF4-FFF2-40B4-BE49-F238E27FC236}">
+                <a16:creationId xmlns:a16="http://schemas.microsoft.com/office/drawing/2014/main" id="{656AC729-C6C8-478F-8BA6-E7563608C8BF}"/>
+              </a:ext>
+            </a:extLst>
+          </p:cNvPr>
+          <p:cNvSpPr>
+            <a:spLocks noGrp="1"/>
+          </p:cNvSpPr>
+          <p:nvPr>
+            <p:ph type="title"/>
+          </p:nvPr>
+        </p:nvSpPr>
+        <p:spPr/>
+        <p:txBody>
+          <a:bodyPr/>
+          <a:lstStyle/>
+          <a:p>
+            <a:endParaRPr lang="en-US"/>
+          </a:p>
+        </p:txBody>
+      </p:sp>
+      <p:sp>
+        <p:nvSpPr>
+          <p:cNvPr id="3" name="Content Placeholder 2">
+            <a:extLst>
+              <a:ext uri="{FF2B5EF4-FFF2-40B4-BE49-F238E27FC236}">
+                <a16:creationId xmlns:a16="http://schemas.microsoft.com/office/drawing/2014/main" id="{8971C631-49E2-47E2-A4A1-83CF6F19FCED}"/>
+              </a:ext>
+            </a:extLst>
+          </p:cNvPr>
+          <p:cNvSpPr>
+            <a:spLocks noGrp="1"/>
+          </p:cNvSpPr>
+          <p:nvPr>
+            <p:ph idx="1"/>
+          </p:nvPr>
+        </p:nvSpPr>
+        <p:spPr/>
+        <p:txBody>
+          <a:bodyPr/>
+          <a:lstStyle/>
+          <a:p>
+            <a:endParaRPr lang="en-US" dirty="0"/>
+          </a:p>
+        </p:txBody>
+      </p:sp>
+      <p:sp>
+        <p:nvSpPr>
+          <p:cNvPr id="4" name="Rectangle: Rounded Corners 3">
+            <a:extLst>
+              <a:ext uri="{FF2B5EF4-FFF2-40B4-BE49-F238E27FC236}">
+                <a16:creationId xmlns:a16="http://schemas.microsoft.com/office/drawing/2014/main" id="{B486C8B7-77BB-4497-804B-4B98D497DFC8}"/>
+              </a:ext>
+            </a:extLst>
+          </p:cNvPr>
+          <p:cNvSpPr/>
+          <p:nvPr/>
+        </p:nvSpPr>
+        <p:spPr>
+          <a:xfrm>
+            <a:off x="8673266" y="1488513"/>
+            <a:ext cx="1469409" cy="555009"/>
+          </a:xfrm>
+          <a:prstGeom prst="roundRect">
+            <a:avLst/>
+          </a:prstGeom>
+          <a:noFill/>
+          <a:ln w="12700">
+            <a:solidFill>
+              <a:schemeClr val="bg2">
+                <a:lumMod val="25000"/>
+              </a:schemeClr>
+            </a:solidFill>
+          </a:ln>
+          <a:effectLst/>
+        </p:spPr>
+        <p:style>
+          <a:lnRef idx="1">
+            <a:schemeClr val="accent1"/>
+          </a:lnRef>
+          <a:fillRef idx="3">
+            <a:schemeClr val="accent1"/>
+          </a:fillRef>
+          <a:effectRef idx="2">
+            <a:schemeClr val="accent1"/>
+          </a:effectRef>
+          <a:fontRef idx="minor">
+            <a:schemeClr val="lt1"/>
+          </a:fontRef>
+        </p:style>
+        <p:txBody>
+          <a:bodyPr rot="0" spcFirstLastPara="0" vertOverflow="overflow" horzOverflow="overflow" vert="horz" wrap="square" lIns="0" tIns="45720" rIns="0" bIns="45720" numCol="1" spcCol="0" rtlCol="0" fromWordArt="0" anchor="ctr" anchorCtr="0" forceAA="0" compatLnSpc="1">
+            <a:prstTxWarp prst="textNoShape">
+              <a:avLst/>
+            </a:prstTxWarp>
+            <a:noAutofit/>
+          </a:bodyPr>
+          <a:lstStyle/>
+          <a:p>
+            <a:pPr algn="ctr"/>
+            <a:r>
+              <a:rPr lang="en-US" sz="1600" dirty="0">
+                <a:solidFill>
+                  <a:schemeClr val="bg2">
+                    <a:lumMod val="25000"/>
+                  </a:schemeClr>
+                </a:solidFill>
+              </a:rPr>
+              <a:t>UI VI</a:t>
+            </a:r>
+          </a:p>
+        </p:txBody>
+      </p:sp>
+      <p:sp>
+        <p:nvSpPr>
+          <p:cNvPr id="5" name="Rectangle: Rounded Corners 4">
+            <a:extLst>
+              <a:ext uri="{FF2B5EF4-FFF2-40B4-BE49-F238E27FC236}">
+                <a16:creationId xmlns:a16="http://schemas.microsoft.com/office/drawing/2014/main" id="{DDE854B1-AB1E-4B69-B659-8AD82849439F}"/>
+              </a:ext>
+            </a:extLst>
+          </p:cNvPr>
+          <p:cNvSpPr/>
+          <p:nvPr/>
+        </p:nvSpPr>
+        <p:spPr>
+          <a:xfrm>
+            <a:off x="6615047" y="1488514"/>
+            <a:ext cx="1469409" cy="555009"/>
+          </a:xfrm>
+          <a:prstGeom prst="roundRect">
+            <a:avLst/>
+          </a:prstGeom>
+          <a:noFill/>
+          <a:ln w="12700">
+            <a:solidFill>
+              <a:schemeClr val="bg2">
+                <a:lumMod val="25000"/>
+              </a:schemeClr>
+            </a:solidFill>
+          </a:ln>
+          <a:effectLst/>
+        </p:spPr>
+        <p:style>
+          <a:lnRef idx="1">
+            <a:schemeClr val="accent1"/>
+          </a:lnRef>
+          <a:fillRef idx="3">
+            <a:schemeClr val="accent1"/>
+          </a:fillRef>
+          <a:effectRef idx="2">
+            <a:schemeClr val="accent1"/>
+          </a:effectRef>
+          <a:fontRef idx="minor">
+            <a:schemeClr val="lt1"/>
+          </a:fontRef>
+        </p:style>
+        <p:txBody>
+          <a:bodyPr rot="0" spcFirstLastPara="0" vertOverflow="overflow" horzOverflow="overflow" vert="horz" wrap="square" lIns="0" tIns="45720" rIns="0" bIns="45720" numCol="1" spcCol="0" rtlCol="0" fromWordArt="0" anchor="ctr" anchorCtr="0" forceAA="0" compatLnSpc="1">
+            <a:prstTxWarp prst="textNoShape">
+              <a:avLst/>
+            </a:prstTxWarp>
+            <a:noAutofit/>
+          </a:bodyPr>
+          <a:lstStyle/>
+          <a:p>
+            <a:pPr algn="ctr"/>
+            <a:r>
+              <a:rPr lang="en-US" sz="1600" dirty="0">
+                <a:solidFill>
+                  <a:schemeClr val="bg2">
+                    <a:lumMod val="25000"/>
+                  </a:schemeClr>
+                </a:solidFill>
+              </a:rPr>
+              <a:t>DCAF UI Module</a:t>
+            </a:r>
+          </a:p>
+        </p:txBody>
+      </p:sp>
+      <p:sp>
+        <p:nvSpPr>
+          <p:cNvPr id="6" name="Rectangle: Rounded Corners 5">
+            <a:extLst>
+              <a:ext uri="{FF2B5EF4-FFF2-40B4-BE49-F238E27FC236}">
+                <a16:creationId xmlns:a16="http://schemas.microsoft.com/office/drawing/2014/main" id="{59F53893-E7DD-4081-8D9C-91494A392D13}"/>
+              </a:ext>
+            </a:extLst>
+          </p:cNvPr>
+          <p:cNvSpPr/>
+          <p:nvPr/>
+        </p:nvSpPr>
+        <p:spPr>
+          <a:xfrm>
+            <a:off x="3358918" y="3885599"/>
+            <a:ext cx="1469409" cy="555009"/>
+          </a:xfrm>
+          <a:prstGeom prst="roundRect">
+            <a:avLst/>
+          </a:prstGeom>
+          <a:noFill/>
+          <a:ln w="12700">
+            <a:solidFill>
+              <a:schemeClr val="bg2">
+                <a:lumMod val="25000"/>
+              </a:schemeClr>
+            </a:solidFill>
+          </a:ln>
+          <a:effectLst/>
+        </p:spPr>
+        <p:style>
+          <a:lnRef idx="1">
+            <a:schemeClr val="accent1"/>
+          </a:lnRef>
+          <a:fillRef idx="3">
+            <a:schemeClr val="accent1"/>
+          </a:fillRef>
+          <a:effectRef idx="2">
+            <a:schemeClr val="accent1"/>
+          </a:effectRef>
+          <a:fontRef idx="minor">
+            <a:schemeClr val="lt1"/>
+          </a:fontRef>
+        </p:style>
+        <p:txBody>
+          <a:bodyPr rot="0" spcFirstLastPara="0" vertOverflow="overflow" horzOverflow="overflow" vert="horz" wrap="square" lIns="0" tIns="45720" rIns="0" bIns="45720" numCol="1" spcCol="0" rtlCol="0" fromWordArt="0" anchor="ctr" anchorCtr="0" forceAA="0" compatLnSpc="1">
+            <a:prstTxWarp prst="textNoShape">
+              <a:avLst/>
+            </a:prstTxWarp>
+            <a:noAutofit/>
+          </a:bodyPr>
+          <a:lstStyle/>
+          <a:p>
+            <a:pPr algn="ctr"/>
+            <a:r>
+              <a:rPr lang="en-US" sz="1600" dirty="0">
+                <a:solidFill>
+                  <a:schemeClr val="bg2">
+                    <a:lumMod val="25000"/>
+                  </a:schemeClr>
+                </a:solidFill>
+              </a:rPr>
+              <a:t>DCAF UDP Module</a:t>
+            </a:r>
+          </a:p>
+        </p:txBody>
+      </p:sp>
+      <p:sp>
+        <p:nvSpPr>
+          <p:cNvPr id="7" name="Rectangle: Rounded Corners 6">
+            <a:extLst>
+              <a:ext uri="{FF2B5EF4-FFF2-40B4-BE49-F238E27FC236}">
+                <a16:creationId xmlns:a16="http://schemas.microsoft.com/office/drawing/2014/main" id="{944275B4-4F93-42F7-BF4F-AE5C69D059D2}"/>
+              </a:ext>
+            </a:extLst>
+          </p:cNvPr>
+          <p:cNvSpPr/>
+          <p:nvPr/>
+        </p:nvSpPr>
+        <p:spPr>
+          <a:xfrm>
+            <a:off x="3358918" y="2688495"/>
+            <a:ext cx="1469409" cy="555009"/>
+          </a:xfrm>
+          <a:prstGeom prst="roundRect">
+            <a:avLst/>
+          </a:prstGeom>
+          <a:noFill/>
+          <a:ln w="12700">
+            <a:solidFill>
+              <a:schemeClr val="bg2">
+                <a:lumMod val="25000"/>
+              </a:schemeClr>
+            </a:solidFill>
+          </a:ln>
+          <a:effectLst/>
+        </p:spPr>
+        <p:style>
+          <a:lnRef idx="1">
+            <a:schemeClr val="accent1"/>
+          </a:lnRef>
+          <a:fillRef idx="3">
+            <a:schemeClr val="accent1"/>
+          </a:fillRef>
+          <a:effectRef idx="2">
+            <a:schemeClr val="accent1"/>
+          </a:effectRef>
+          <a:fontRef idx="minor">
+            <a:schemeClr val="lt1"/>
+          </a:fontRef>
+        </p:style>
+        <p:txBody>
+          <a:bodyPr rot="0" spcFirstLastPara="0" vertOverflow="overflow" horzOverflow="overflow" vert="horz" wrap="square" lIns="0" tIns="45720" rIns="0" bIns="45720" numCol="1" spcCol="0" rtlCol="0" fromWordArt="0" anchor="ctr" anchorCtr="0" forceAA="0" compatLnSpc="1">
+            <a:prstTxWarp prst="textNoShape">
+              <a:avLst/>
+            </a:prstTxWarp>
+            <a:noAutofit/>
+          </a:bodyPr>
+          <a:lstStyle/>
+          <a:p>
+            <a:pPr algn="ctr"/>
+            <a:r>
+              <a:rPr lang="en-US" sz="1600" dirty="0">
+                <a:solidFill>
+                  <a:schemeClr val="bg2">
+                    <a:lumMod val="25000"/>
+                  </a:schemeClr>
+                </a:solidFill>
+              </a:rPr>
+              <a:t>DCAF Engine</a:t>
+            </a:r>
+          </a:p>
+        </p:txBody>
+      </p:sp>
+      <p:sp>
+        <p:nvSpPr>
+          <p:cNvPr id="8" name="Rectangle: Rounded Corners 7">
+            <a:extLst>
+              <a:ext uri="{FF2B5EF4-FFF2-40B4-BE49-F238E27FC236}">
+                <a16:creationId xmlns:a16="http://schemas.microsoft.com/office/drawing/2014/main" id="{62E40DB6-9150-4D9B-A1A9-CE9D42C63842}"/>
+              </a:ext>
+            </a:extLst>
+          </p:cNvPr>
+          <p:cNvSpPr/>
+          <p:nvPr/>
+        </p:nvSpPr>
+        <p:spPr>
+          <a:xfrm>
+            <a:off x="6615046" y="2688495"/>
+            <a:ext cx="1469409" cy="555009"/>
+          </a:xfrm>
+          <a:prstGeom prst="roundRect">
+            <a:avLst/>
+          </a:prstGeom>
+          <a:noFill/>
+          <a:ln w="12700">
+            <a:solidFill>
+              <a:schemeClr val="bg2">
+                <a:lumMod val="25000"/>
+              </a:schemeClr>
+            </a:solidFill>
+          </a:ln>
+          <a:effectLst/>
+        </p:spPr>
+        <p:style>
+          <a:lnRef idx="1">
+            <a:schemeClr val="accent1"/>
+          </a:lnRef>
+          <a:fillRef idx="3">
+            <a:schemeClr val="accent1"/>
+          </a:fillRef>
+          <a:effectRef idx="2">
+            <a:schemeClr val="accent1"/>
+          </a:effectRef>
+          <a:fontRef idx="minor">
+            <a:schemeClr val="lt1"/>
+          </a:fontRef>
+        </p:style>
+        <p:txBody>
+          <a:bodyPr rot="0" spcFirstLastPara="0" vertOverflow="overflow" horzOverflow="overflow" vert="horz" wrap="square" lIns="0" tIns="45720" rIns="0" bIns="45720" numCol="1" spcCol="0" rtlCol="0" fromWordArt="0" anchor="ctr" anchorCtr="0" forceAA="0" compatLnSpc="1">
+            <a:prstTxWarp prst="textNoShape">
+              <a:avLst/>
+            </a:prstTxWarp>
+            <a:noAutofit/>
+          </a:bodyPr>
+          <a:lstStyle/>
+          <a:p>
+            <a:pPr algn="ctr"/>
+            <a:r>
+              <a:rPr lang="en-US" sz="1600" dirty="0">
+                <a:solidFill>
+                  <a:schemeClr val="bg2">
+                    <a:lumMod val="25000"/>
+                  </a:schemeClr>
+                </a:solidFill>
+              </a:rPr>
+              <a:t>DCAF Engine</a:t>
+            </a:r>
+          </a:p>
+        </p:txBody>
+      </p:sp>
+      <p:sp>
+        <p:nvSpPr>
+          <p:cNvPr id="9" name="Rectangle: Rounded Corners 8">
+            <a:extLst>
+              <a:ext uri="{FF2B5EF4-FFF2-40B4-BE49-F238E27FC236}">
+                <a16:creationId xmlns:a16="http://schemas.microsoft.com/office/drawing/2014/main" id="{210C72EB-3D44-4E98-B54E-6AABDDA960F9}"/>
+              </a:ext>
+            </a:extLst>
+          </p:cNvPr>
+          <p:cNvSpPr/>
+          <p:nvPr/>
+        </p:nvSpPr>
+        <p:spPr>
+          <a:xfrm>
+            <a:off x="6615048" y="3885598"/>
+            <a:ext cx="1469409" cy="555009"/>
+          </a:xfrm>
+          <a:prstGeom prst="roundRect">
+            <a:avLst/>
+          </a:prstGeom>
+          <a:noFill/>
+          <a:ln w="12700">
+            <a:solidFill>
+              <a:schemeClr val="bg2">
+                <a:lumMod val="25000"/>
+              </a:schemeClr>
+            </a:solidFill>
+          </a:ln>
+          <a:effectLst/>
+        </p:spPr>
+        <p:style>
+          <a:lnRef idx="1">
+            <a:schemeClr val="accent1"/>
+          </a:lnRef>
+          <a:fillRef idx="3">
+            <a:schemeClr val="accent1"/>
+          </a:fillRef>
+          <a:effectRef idx="2">
+            <a:schemeClr val="accent1"/>
+          </a:effectRef>
+          <a:fontRef idx="minor">
+            <a:schemeClr val="lt1"/>
+          </a:fontRef>
+        </p:style>
+        <p:txBody>
+          <a:bodyPr rot="0" spcFirstLastPara="0" vertOverflow="overflow" horzOverflow="overflow" vert="horz" wrap="square" lIns="0" tIns="45720" rIns="0" bIns="45720" numCol="1" spcCol="0" rtlCol="0" fromWordArt="0" anchor="ctr" anchorCtr="0" forceAA="0" compatLnSpc="1">
+            <a:prstTxWarp prst="textNoShape">
+              <a:avLst/>
+            </a:prstTxWarp>
+            <a:noAutofit/>
+          </a:bodyPr>
+          <a:lstStyle/>
+          <a:p>
+            <a:pPr algn="ctr"/>
+            <a:r>
+              <a:rPr lang="en-US" sz="1600" dirty="0">
+                <a:solidFill>
+                  <a:schemeClr val="bg2">
+                    <a:lumMod val="25000"/>
+                  </a:schemeClr>
+                </a:solidFill>
+              </a:rPr>
+              <a:t>DCAF UDP Module</a:t>
+            </a:r>
+          </a:p>
+        </p:txBody>
+      </p:sp>
+      <p:sp>
+        <p:nvSpPr>
+          <p:cNvPr id="10" name="Rectangle: Rounded Corners 9">
+            <a:extLst>
+              <a:ext uri="{FF2B5EF4-FFF2-40B4-BE49-F238E27FC236}">
+                <a16:creationId xmlns:a16="http://schemas.microsoft.com/office/drawing/2014/main" id="{C00A2B1F-30D0-49E5-B123-E358E1F943CC}"/>
+              </a:ext>
+            </a:extLst>
+          </p:cNvPr>
+          <p:cNvSpPr/>
+          <p:nvPr/>
+        </p:nvSpPr>
+        <p:spPr>
+          <a:xfrm>
+            <a:off x="3358919" y="1514901"/>
+            <a:ext cx="1469409" cy="555009"/>
+          </a:xfrm>
+          <a:prstGeom prst="roundRect">
+            <a:avLst/>
+          </a:prstGeom>
+          <a:noFill/>
+          <a:ln w="12700">
+            <a:solidFill>
+              <a:schemeClr val="bg2">
+                <a:lumMod val="25000"/>
+              </a:schemeClr>
+            </a:solidFill>
+          </a:ln>
+          <a:effectLst/>
+        </p:spPr>
+        <p:style>
+          <a:lnRef idx="1">
+            <a:schemeClr val="accent1"/>
+          </a:lnRef>
+          <a:fillRef idx="3">
+            <a:schemeClr val="accent1"/>
+          </a:fillRef>
+          <a:effectRef idx="2">
+            <a:schemeClr val="accent1"/>
+          </a:effectRef>
+          <a:fontRef idx="minor">
+            <a:schemeClr val="lt1"/>
+          </a:fontRef>
+        </p:style>
+        <p:txBody>
+          <a:bodyPr rot="0" spcFirstLastPara="0" vertOverflow="overflow" horzOverflow="overflow" vert="horz" wrap="square" lIns="0" tIns="45720" rIns="0" bIns="45720" numCol="1" spcCol="0" rtlCol="0" fromWordArt="0" anchor="ctr" anchorCtr="0" forceAA="0" compatLnSpc="1">
+            <a:prstTxWarp prst="textNoShape">
+              <a:avLst/>
+            </a:prstTxWarp>
+            <a:noAutofit/>
+          </a:bodyPr>
+          <a:lstStyle/>
+          <a:p>
+            <a:pPr algn="ctr"/>
+            <a:r>
+              <a:rPr lang="en-US" sz="1600" dirty="0">
+                <a:solidFill>
+                  <a:schemeClr val="bg2">
+                    <a:lumMod val="25000"/>
+                  </a:schemeClr>
+                </a:solidFill>
+              </a:rPr>
+              <a:t>DCAF Scan Engine Module</a:t>
+            </a:r>
+          </a:p>
+        </p:txBody>
+      </p:sp>
+      <p:sp>
+        <p:nvSpPr>
+          <p:cNvPr id="11" name="Rectangle: Rounded Corners 10">
+            <a:extLst>
+              <a:ext uri="{FF2B5EF4-FFF2-40B4-BE49-F238E27FC236}">
+                <a16:creationId xmlns:a16="http://schemas.microsoft.com/office/drawing/2014/main" id="{83378891-FE49-42E0-90F4-C8205FAACCF3}"/>
+              </a:ext>
+            </a:extLst>
+          </p:cNvPr>
+          <p:cNvSpPr/>
+          <p:nvPr/>
+        </p:nvSpPr>
+        <p:spPr>
+          <a:xfrm>
+            <a:off x="1300700" y="1488514"/>
+            <a:ext cx="1469409" cy="555009"/>
+          </a:xfrm>
+          <a:prstGeom prst="roundRect">
+            <a:avLst/>
+          </a:prstGeom>
+          <a:solidFill>
+            <a:schemeClr val="accent2"/>
+          </a:solidFill>
+          <a:ln w="12700">
+            <a:solidFill>
+              <a:schemeClr val="bg2">
+                <a:lumMod val="25000"/>
+              </a:schemeClr>
+            </a:solidFill>
+          </a:ln>
+          <a:effectLst/>
+        </p:spPr>
+        <p:style>
+          <a:lnRef idx="1">
+            <a:schemeClr val="accent1"/>
+          </a:lnRef>
+          <a:fillRef idx="3">
+            <a:schemeClr val="accent1"/>
+          </a:fillRef>
+          <a:effectRef idx="2">
+            <a:schemeClr val="accent1"/>
+          </a:effectRef>
+          <a:fontRef idx="minor">
+            <a:schemeClr val="lt1"/>
+          </a:fontRef>
+        </p:style>
+        <p:txBody>
+          <a:bodyPr rot="0" spcFirstLastPara="0" vertOverflow="overflow" horzOverflow="overflow" vert="horz" wrap="square" lIns="0" tIns="45720" rIns="0" bIns="45720" numCol="1" spcCol="0" rtlCol="0" fromWordArt="0" anchor="ctr" anchorCtr="0" forceAA="0" compatLnSpc="1">
+            <a:prstTxWarp prst="textNoShape">
+              <a:avLst/>
+            </a:prstTxWarp>
+            <a:noAutofit/>
+          </a:bodyPr>
+          <a:lstStyle/>
+          <a:p>
+            <a:pPr algn="ctr"/>
+            <a:r>
+              <a:rPr lang="en-US" sz="1600" dirty="0">
+                <a:solidFill>
+                  <a:schemeClr val="bg2">
+                    <a:lumMod val="25000"/>
+                  </a:schemeClr>
+                </a:solidFill>
+              </a:rPr>
+              <a:t>CRIO Hardware</a:t>
+            </a:r>
+          </a:p>
+        </p:txBody>
+      </p:sp>
+      <p:sp>
+        <p:nvSpPr>
+          <p:cNvPr id="12" name="Arrow: Left-Right 11">
+            <a:extLst>
+              <a:ext uri="{FF2B5EF4-FFF2-40B4-BE49-F238E27FC236}">
+                <a16:creationId xmlns:a16="http://schemas.microsoft.com/office/drawing/2014/main" id="{9301E6FD-C3C4-44F2-BE25-847E3A7B0308}"/>
+              </a:ext>
+            </a:extLst>
+          </p:cNvPr>
+          <p:cNvSpPr/>
+          <p:nvPr/>
+        </p:nvSpPr>
+        <p:spPr>
+          <a:xfrm>
+            <a:off x="2857508" y="1652588"/>
+            <a:ext cx="442913" cy="185737"/>
+          </a:xfrm>
+          <a:prstGeom prst="leftRightArrow">
+            <a:avLst/>
+          </a:prstGeom>
+          <a:noFill/>
+          <a:ln w="12700">
+            <a:solidFill>
+              <a:schemeClr val="bg2">
+                <a:lumMod val="25000"/>
+              </a:schemeClr>
+            </a:solidFill>
+          </a:ln>
+          <a:effectLst/>
+        </p:spPr>
+        <p:style>
+          <a:lnRef idx="1">
+            <a:schemeClr val="accent1"/>
+          </a:lnRef>
+          <a:fillRef idx="3">
+            <a:schemeClr val="accent1"/>
+          </a:fillRef>
+          <a:effectRef idx="2">
+            <a:schemeClr val="accent1"/>
+          </a:effectRef>
+          <a:fontRef idx="minor">
+            <a:schemeClr val="lt1"/>
+          </a:fontRef>
+        </p:style>
+        <p:txBody>
+          <a:bodyPr rot="0" spcFirstLastPara="0" vertOverflow="overflow" horzOverflow="overflow" vert="horz" wrap="square" lIns="0" tIns="45720" rIns="0" bIns="45720" numCol="1" spcCol="0" rtlCol="0" fromWordArt="0" anchor="ctr" anchorCtr="0" forceAA="0" compatLnSpc="1">
+            <a:prstTxWarp prst="textNoShape">
+              <a:avLst/>
+            </a:prstTxWarp>
+            <a:noAutofit/>
+          </a:bodyPr>
+          <a:lstStyle/>
+          <a:p>
+            <a:pPr algn="ctr"/>
+            <a:endParaRPr lang="en-US" sz="1600" dirty="0" err="1">
+              <a:solidFill>
+                <a:schemeClr val="bg2">
+                  <a:lumMod val="25000"/>
+                </a:schemeClr>
+              </a:solidFill>
+            </a:endParaRPr>
+          </a:p>
+        </p:txBody>
+      </p:sp>
+      <p:sp>
+        <p:nvSpPr>
+          <p:cNvPr id="13" name="Arrow: Left-Right 12">
+            <a:extLst>
+              <a:ext uri="{FF2B5EF4-FFF2-40B4-BE49-F238E27FC236}">
+                <a16:creationId xmlns:a16="http://schemas.microsoft.com/office/drawing/2014/main" id="{62F85A59-B6BF-4626-B80B-E4EC3D1317E9}"/>
+              </a:ext>
+            </a:extLst>
+          </p:cNvPr>
+          <p:cNvSpPr/>
+          <p:nvPr/>
+        </p:nvSpPr>
+        <p:spPr>
+          <a:xfrm>
+            <a:off x="8157404" y="1654969"/>
+            <a:ext cx="442913" cy="185737"/>
+          </a:xfrm>
+          <a:prstGeom prst="leftRightArrow">
+            <a:avLst/>
+          </a:prstGeom>
+          <a:noFill/>
+          <a:ln w="12700">
+            <a:solidFill>
+              <a:schemeClr val="bg2">
+                <a:lumMod val="25000"/>
+              </a:schemeClr>
+            </a:solidFill>
+          </a:ln>
+          <a:effectLst/>
+        </p:spPr>
+        <p:style>
+          <a:lnRef idx="1">
+            <a:schemeClr val="accent1"/>
+          </a:lnRef>
+          <a:fillRef idx="3">
+            <a:schemeClr val="accent1"/>
+          </a:fillRef>
+          <a:effectRef idx="2">
+            <a:schemeClr val="accent1"/>
+          </a:effectRef>
+          <a:fontRef idx="minor">
+            <a:schemeClr val="lt1"/>
+          </a:fontRef>
+        </p:style>
+        <p:txBody>
+          <a:bodyPr rot="0" spcFirstLastPara="0" vertOverflow="overflow" horzOverflow="overflow" vert="horz" wrap="square" lIns="0" tIns="45720" rIns="0" bIns="45720" numCol="1" spcCol="0" rtlCol="0" fromWordArt="0" anchor="ctr" anchorCtr="0" forceAA="0" compatLnSpc="1">
+            <a:prstTxWarp prst="textNoShape">
+              <a:avLst/>
+            </a:prstTxWarp>
+            <a:noAutofit/>
+          </a:bodyPr>
+          <a:lstStyle/>
+          <a:p>
+            <a:pPr algn="ctr"/>
+            <a:endParaRPr lang="en-US" sz="1600" dirty="0" err="1">
+              <a:solidFill>
+                <a:schemeClr val="bg2">
+                  <a:lumMod val="25000"/>
+                </a:schemeClr>
+              </a:solidFill>
+            </a:endParaRPr>
+          </a:p>
+        </p:txBody>
+      </p:sp>
+      <p:sp>
+        <p:nvSpPr>
+          <p:cNvPr id="14" name="Arrow: Left-Right 13">
+            <a:extLst>
+              <a:ext uri="{FF2B5EF4-FFF2-40B4-BE49-F238E27FC236}">
+                <a16:creationId xmlns:a16="http://schemas.microsoft.com/office/drawing/2014/main" id="{5DA4CC68-730E-41B7-812C-B4A38375D8C4}"/>
+              </a:ext>
+            </a:extLst>
+          </p:cNvPr>
+          <p:cNvSpPr/>
+          <p:nvPr/>
+        </p:nvSpPr>
+        <p:spPr>
+          <a:xfrm>
+            <a:off x="5195896" y="3885598"/>
+            <a:ext cx="1171575" cy="555009"/>
+          </a:xfrm>
+          <a:prstGeom prst="leftRightArrow">
+            <a:avLst/>
+          </a:prstGeom>
+          <a:noFill/>
+          <a:ln w="12700">
+            <a:solidFill>
+              <a:schemeClr val="bg2">
+                <a:lumMod val="25000"/>
+              </a:schemeClr>
+            </a:solidFill>
+          </a:ln>
+          <a:effectLst/>
+        </p:spPr>
+        <p:style>
+          <a:lnRef idx="1">
+            <a:schemeClr val="accent1"/>
+          </a:lnRef>
+          <a:fillRef idx="3">
+            <a:schemeClr val="accent1"/>
+          </a:fillRef>
+          <a:effectRef idx="2">
+            <a:schemeClr val="accent1"/>
+          </a:effectRef>
+          <a:fontRef idx="minor">
+            <a:schemeClr val="lt1"/>
+          </a:fontRef>
+        </p:style>
+        <p:txBody>
+          <a:bodyPr rot="0" spcFirstLastPara="0" vertOverflow="overflow" horzOverflow="overflow" vert="horz" wrap="square" lIns="0" tIns="45720" rIns="0" bIns="45720" numCol="1" spcCol="0" rtlCol="0" fromWordArt="0" anchor="ctr" anchorCtr="0" forceAA="0" compatLnSpc="1">
+            <a:prstTxWarp prst="textNoShape">
+              <a:avLst/>
+            </a:prstTxWarp>
+            <a:noAutofit/>
+          </a:bodyPr>
+          <a:lstStyle/>
+          <a:p>
+            <a:pPr algn="ctr"/>
+            <a:r>
+              <a:rPr lang="en-US" sz="1600" dirty="0">
+                <a:solidFill>
+                  <a:schemeClr val="bg2">
+                    <a:lumMod val="25000"/>
+                  </a:schemeClr>
+                </a:solidFill>
+              </a:rPr>
+              <a:t>UDP</a:t>
+            </a:r>
+          </a:p>
+        </p:txBody>
+      </p:sp>
+      <p:sp>
+        <p:nvSpPr>
+          <p:cNvPr id="15" name="Arrow: Up-Down 14">
+            <a:extLst>
+              <a:ext uri="{FF2B5EF4-FFF2-40B4-BE49-F238E27FC236}">
+                <a16:creationId xmlns:a16="http://schemas.microsoft.com/office/drawing/2014/main" id="{94E27432-4F3A-425C-89F9-71F2BF4FCD89}"/>
+              </a:ext>
+            </a:extLst>
+          </p:cNvPr>
+          <p:cNvSpPr/>
+          <p:nvPr/>
+        </p:nvSpPr>
+        <p:spPr>
+          <a:xfrm>
+            <a:off x="3952597" y="2119313"/>
+            <a:ext cx="247936" cy="447675"/>
+          </a:xfrm>
+          <a:prstGeom prst="upDownArrow">
+            <a:avLst/>
+          </a:prstGeom>
+          <a:noFill/>
+          <a:ln w="12700">
+            <a:solidFill>
+              <a:schemeClr val="bg2">
+                <a:lumMod val="25000"/>
+              </a:schemeClr>
+            </a:solidFill>
+          </a:ln>
+          <a:effectLst/>
+        </p:spPr>
+        <p:style>
+          <a:lnRef idx="1">
+            <a:schemeClr val="accent1"/>
+          </a:lnRef>
+          <a:fillRef idx="3">
+            <a:schemeClr val="accent1"/>
+          </a:fillRef>
+          <a:effectRef idx="2">
+            <a:schemeClr val="accent1"/>
+          </a:effectRef>
+          <a:fontRef idx="minor">
+            <a:schemeClr val="lt1"/>
+          </a:fontRef>
+        </p:style>
+        <p:txBody>
+          <a:bodyPr rot="0" spcFirstLastPara="0" vertOverflow="overflow" horzOverflow="overflow" vert="horz" wrap="square" lIns="0" tIns="45720" rIns="0" bIns="45720" numCol="1" spcCol="0" rtlCol="0" fromWordArt="0" anchor="ctr" anchorCtr="0" forceAA="0" compatLnSpc="1">
+            <a:prstTxWarp prst="textNoShape">
+              <a:avLst/>
+            </a:prstTxWarp>
+            <a:noAutofit/>
+          </a:bodyPr>
+          <a:lstStyle/>
+          <a:p>
+            <a:pPr algn="ctr"/>
+            <a:endParaRPr lang="en-US" sz="1600" dirty="0" err="1">
+              <a:solidFill>
+                <a:schemeClr val="bg2">
+                  <a:lumMod val="25000"/>
+                </a:schemeClr>
+              </a:solidFill>
+            </a:endParaRPr>
+          </a:p>
+        </p:txBody>
+      </p:sp>
+      <p:sp>
+        <p:nvSpPr>
+          <p:cNvPr id="16" name="Arrow: Up-Down 15">
+            <a:extLst>
+              <a:ext uri="{FF2B5EF4-FFF2-40B4-BE49-F238E27FC236}">
+                <a16:creationId xmlns:a16="http://schemas.microsoft.com/office/drawing/2014/main" id="{78089CAB-2178-4B0F-A85E-E200EBAAE9BE}"/>
+              </a:ext>
+            </a:extLst>
+          </p:cNvPr>
+          <p:cNvSpPr/>
+          <p:nvPr/>
+        </p:nvSpPr>
+        <p:spPr>
+          <a:xfrm>
+            <a:off x="7225782" y="2119313"/>
+            <a:ext cx="247936" cy="447675"/>
+          </a:xfrm>
+          <a:prstGeom prst="upDownArrow">
+            <a:avLst/>
+          </a:prstGeom>
+          <a:noFill/>
+          <a:ln w="12700">
+            <a:solidFill>
+              <a:schemeClr val="bg2">
+                <a:lumMod val="25000"/>
+              </a:schemeClr>
+            </a:solidFill>
+          </a:ln>
+          <a:effectLst/>
+        </p:spPr>
+        <p:style>
+          <a:lnRef idx="1">
+            <a:schemeClr val="accent1"/>
+          </a:lnRef>
+          <a:fillRef idx="3">
+            <a:schemeClr val="accent1"/>
+          </a:fillRef>
+          <a:effectRef idx="2">
+            <a:schemeClr val="accent1"/>
+          </a:effectRef>
+          <a:fontRef idx="minor">
+            <a:schemeClr val="lt1"/>
+          </a:fontRef>
+        </p:style>
+        <p:txBody>
+          <a:bodyPr rot="0" spcFirstLastPara="0" vertOverflow="overflow" horzOverflow="overflow" vert="horz" wrap="square" lIns="0" tIns="45720" rIns="0" bIns="45720" numCol="1" spcCol="0" rtlCol="0" fromWordArt="0" anchor="ctr" anchorCtr="0" forceAA="0" compatLnSpc="1">
+            <a:prstTxWarp prst="textNoShape">
+              <a:avLst/>
+            </a:prstTxWarp>
+            <a:noAutofit/>
+          </a:bodyPr>
+          <a:lstStyle/>
+          <a:p>
+            <a:pPr algn="ctr"/>
+            <a:endParaRPr lang="en-US" sz="1600" dirty="0" err="1">
+              <a:solidFill>
+                <a:schemeClr val="bg2">
+                  <a:lumMod val="25000"/>
+                </a:schemeClr>
+              </a:solidFill>
+            </a:endParaRPr>
+          </a:p>
+        </p:txBody>
+      </p:sp>
+      <p:sp>
+        <p:nvSpPr>
+          <p:cNvPr id="17" name="Arrow: Up-Down 16">
+            <a:extLst>
+              <a:ext uri="{FF2B5EF4-FFF2-40B4-BE49-F238E27FC236}">
+                <a16:creationId xmlns:a16="http://schemas.microsoft.com/office/drawing/2014/main" id="{FD2677C4-E454-4AA2-AE2D-7783EF8DDAC7}"/>
+              </a:ext>
+            </a:extLst>
+          </p:cNvPr>
+          <p:cNvSpPr/>
+          <p:nvPr/>
+        </p:nvSpPr>
+        <p:spPr>
+          <a:xfrm>
+            <a:off x="3952597" y="3362748"/>
+            <a:ext cx="247936" cy="447675"/>
+          </a:xfrm>
+          <a:prstGeom prst="upDownArrow">
+            <a:avLst/>
+          </a:prstGeom>
+          <a:noFill/>
+          <a:ln w="12700">
+            <a:solidFill>
+              <a:schemeClr val="bg2">
+                <a:lumMod val="25000"/>
+              </a:schemeClr>
+            </a:solidFill>
+          </a:ln>
+          <a:effectLst/>
+        </p:spPr>
+        <p:style>
+          <a:lnRef idx="1">
+            <a:schemeClr val="accent1"/>
+          </a:lnRef>
+          <a:fillRef idx="3">
+            <a:schemeClr val="accent1"/>
+          </a:fillRef>
+          <a:effectRef idx="2">
+            <a:schemeClr val="accent1"/>
+          </a:effectRef>
+          <a:fontRef idx="minor">
+            <a:schemeClr val="lt1"/>
+          </a:fontRef>
+        </p:style>
+        <p:txBody>
+          <a:bodyPr rot="0" spcFirstLastPara="0" vertOverflow="overflow" horzOverflow="overflow" vert="horz" wrap="square" lIns="0" tIns="45720" rIns="0" bIns="45720" numCol="1" spcCol="0" rtlCol="0" fromWordArt="0" anchor="ctr" anchorCtr="0" forceAA="0" compatLnSpc="1">
+            <a:prstTxWarp prst="textNoShape">
+              <a:avLst/>
+            </a:prstTxWarp>
+            <a:noAutofit/>
+          </a:bodyPr>
+          <a:lstStyle/>
+          <a:p>
+            <a:pPr algn="ctr"/>
+            <a:endParaRPr lang="en-US" sz="1600" dirty="0" err="1">
+              <a:solidFill>
+                <a:schemeClr val="bg2">
+                  <a:lumMod val="25000"/>
+                </a:schemeClr>
+              </a:solidFill>
+            </a:endParaRPr>
+          </a:p>
+        </p:txBody>
+      </p:sp>
+      <p:sp>
+        <p:nvSpPr>
+          <p:cNvPr id="18" name="Arrow: Up-Down 17">
+            <a:extLst>
+              <a:ext uri="{FF2B5EF4-FFF2-40B4-BE49-F238E27FC236}">
+                <a16:creationId xmlns:a16="http://schemas.microsoft.com/office/drawing/2014/main" id="{FE673DE1-B810-4F11-8C5A-8B131765F0C1}"/>
+              </a:ext>
+            </a:extLst>
+          </p:cNvPr>
+          <p:cNvSpPr/>
+          <p:nvPr/>
+        </p:nvSpPr>
+        <p:spPr>
+          <a:xfrm>
+            <a:off x="7251367" y="3318679"/>
+            <a:ext cx="247936" cy="447675"/>
+          </a:xfrm>
+          <a:prstGeom prst="upDownArrow">
+            <a:avLst/>
+          </a:prstGeom>
+          <a:noFill/>
+          <a:ln w="12700">
+            <a:solidFill>
+              <a:schemeClr val="bg2">
+                <a:lumMod val="25000"/>
+              </a:schemeClr>
+            </a:solidFill>
+          </a:ln>
+          <a:effectLst/>
+        </p:spPr>
+        <p:style>
+          <a:lnRef idx="1">
+            <a:schemeClr val="accent1"/>
+          </a:lnRef>
+          <a:fillRef idx="3">
+            <a:schemeClr val="accent1"/>
+          </a:fillRef>
+          <a:effectRef idx="2">
+            <a:schemeClr val="accent1"/>
+          </a:effectRef>
+          <a:fontRef idx="minor">
+            <a:schemeClr val="lt1"/>
+          </a:fontRef>
+        </p:style>
+        <p:txBody>
+          <a:bodyPr rot="0" spcFirstLastPara="0" vertOverflow="overflow" horzOverflow="overflow" vert="horz" wrap="square" lIns="0" tIns="45720" rIns="0" bIns="45720" numCol="1" spcCol="0" rtlCol="0" fromWordArt="0" anchor="ctr" anchorCtr="0" forceAA="0" compatLnSpc="1">
+            <a:prstTxWarp prst="textNoShape">
+              <a:avLst/>
+            </a:prstTxWarp>
+            <a:noAutofit/>
+          </a:bodyPr>
+          <a:lstStyle/>
+          <a:p>
+            <a:pPr algn="ctr"/>
+            <a:endParaRPr lang="en-US" sz="1600" dirty="0" err="1">
+              <a:solidFill>
+                <a:schemeClr val="bg2">
+                  <a:lumMod val="25000"/>
+                </a:schemeClr>
+              </a:solidFill>
+            </a:endParaRPr>
+          </a:p>
+        </p:txBody>
+      </p:sp>
+    </p:spTree>
+    <p:extLst>
+      <p:ext uri="{BB962C8B-B14F-4D97-AF65-F5344CB8AC3E}">
+        <p14:creationId xmlns:p14="http://schemas.microsoft.com/office/powerpoint/2010/main" val="4006721400"/>
       </p:ext>
     </p:extLst>
   </p:cSld>
@@ -9961,7 +13216,7 @@
           <a:p>
             <a:r>
               <a:rPr lang="en-US" dirty="0"/>
-              <a:t>Basics RT Debugging</a:t>
+              <a:t>Debugging Core Methodology</a:t>
             </a:r>
           </a:p>
         </p:txBody>
@@ -10137,10 +13392,10 @@
       </p:grpSpPr>
       <p:sp>
         <p:nvSpPr>
-          <p:cNvPr id="3" name="Title 2">
+          <p:cNvPr id="2" name="Title 1">
             <a:extLst>
               <a:ext uri="{FF2B5EF4-FFF2-40B4-BE49-F238E27FC236}">
-                <a16:creationId xmlns:a16="http://schemas.microsoft.com/office/drawing/2014/main" id="{5BF0A7A1-54AB-4AC1-9EBC-D6F9385782EC}"/>
+                <a16:creationId xmlns:a16="http://schemas.microsoft.com/office/drawing/2014/main" id="{5A4AC4BB-712D-4F6D-B7D5-291BC4402D85}"/>
               </a:ext>
             </a:extLst>
           </p:cNvPr>
@@ -10158,141 +13413,64 @@
           <a:p>
             <a:r>
               <a:rPr lang="en-US" dirty="0"/>
-              <a:t>Where is the Bug?</a:t>
-            </a:r>
-          </a:p>
-        </p:txBody>
-      </p:sp>
-      <p:sp>
-        <p:nvSpPr>
-          <p:cNvPr id="4" name="Content Placeholder 3">
+              <a:t>Every Bug has a Cause</a:t>
+            </a:r>
+          </a:p>
+        </p:txBody>
+      </p:sp>
+      <p:pic>
+        <p:nvPicPr>
+          <p:cNvPr id="1026" name="Picture 2" descr="Fixing Problems">
             <a:extLst>
               <a:ext uri="{FF2B5EF4-FFF2-40B4-BE49-F238E27FC236}">
-                <a16:creationId xmlns:a16="http://schemas.microsoft.com/office/drawing/2014/main" id="{714FFCFE-2D37-4950-95AF-26A2EB38AB9B}"/>
-              </a:ext>
-            </a:extLst>
-          </p:cNvPr>
-          <p:cNvSpPr>
-            <a:spLocks noGrp="1"/>
-          </p:cNvSpPr>
-          <p:nvPr>
-            <p:ph idx="1"/>
-          </p:nvPr>
-        </p:nvSpPr>
-        <p:spPr/>
-        <p:txBody>
-          <a:bodyPr/>
-          <a:lstStyle/>
-          <a:p>
-            <a:r>
-              <a:rPr lang="en-US" dirty="0"/>
-              <a:t>Modular Code and Unit Testing</a:t>
-            </a:r>
-          </a:p>
-          <a:p>
-            <a:pPr lvl="1"/>
-            <a:r>
-              <a:rPr lang="en-US" dirty="0"/>
-              <a:t>If we don’t know if individual components work </a:t>
-            </a:r>
-          </a:p>
-          <a:p>
-            <a:pPr marL="365751" lvl="1" indent="0">
-              <a:buNone/>
-            </a:pPr>
-            <a:r>
-              <a:rPr lang="en-US" dirty="0"/>
-              <a:t>we don’t know if the whole system works</a:t>
-            </a:r>
-          </a:p>
-          <a:p>
-            <a:r>
-              <a:rPr lang="en-US" dirty="0"/>
-              <a:t>Error Handling</a:t>
-            </a:r>
-          </a:p>
-          <a:p>
-            <a:pPr lvl="1"/>
-            <a:r>
-              <a:rPr lang="en-US" dirty="0"/>
-              <a:t>Hard to find ignored errors and errors that are</a:t>
-            </a:r>
-          </a:p>
-          <a:p>
-            <a:pPr marL="365751" lvl="1" indent="0">
-              <a:buNone/>
-            </a:pPr>
-            <a:r>
-              <a:rPr lang="en-US" dirty="0"/>
-              <a:t> overwritten</a:t>
-            </a:r>
-          </a:p>
-          <a:p>
-            <a:r>
-              <a:rPr lang="en-US" dirty="0"/>
-              <a:t>Use External Tools like Max </a:t>
-            </a:r>
-          </a:p>
-          <a:p>
-            <a:pPr marL="365751" lvl="1" indent="0">
-              <a:buNone/>
-            </a:pPr>
-            <a:r>
-              <a:rPr lang="en-US" dirty="0"/>
-              <a:t>and Distributed System Manager</a:t>
-            </a:r>
-          </a:p>
-          <a:p>
-            <a:endParaRPr lang="en-US" dirty="0"/>
-          </a:p>
-          <a:p>
-            <a:endParaRPr lang="en-US" dirty="0"/>
-          </a:p>
-          <a:p>
-            <a:endParaRPr lang="en-US" dirty="0"/>
-          </a:p>
-          <a:p>
-            <a:r>
-              <a:rPr lang="en-US" dirty="0"/>
-              <a:t> </a:t>
-            </a:r>
-          </a:p>
-        </p:txBody>
-      </p:sp>
-      <p:pic>
-        <p:nvPicPr>
-          <p:cNvPr id="5" name="Picture 4">
-            <a:extLst>
-              <a:ext uri="{FF2B5EF4-FFF2-40B4-BE49-F238E27FC236}">
-                <a16:creationId xmlns:a16="http://schemas.microsoft.com/office/drawing/2014/main" id="{DF6DF86E-1A35-4A49-88C7-F5BBA2D1F462}"/>
+                <a16:creationId xmlns:a16="http://schemas.microsoft.com/office/drawing/2014/main" id="{EB9D6F2A-B8D4-435C-8CCF-323336F89047}"/>
               </a:ext>
             </a:extLst>
           </p:cNvPr>
           <p:cNvPicPr>
-            <a:picLocks noChangeAspect="1"/>
+            <a:picLocks noGrp="1" noChangeAspect="1" noChangeArrowheads="1"/>
           </p:cNvPicPr>
-          <p:nvPr/>
+          <p:nvPr>
+            <p:ph idx="1"/>
+          </p:nvPr>
         </p:nvPicPr>
         <p:blipFill>
-          <a:blip r:embed="rId3"/>
+          <a:blip r:embed="rId3">
+            <a:extLst>
+              <a:ext uri="{28A0092B-C50C-407E-A947-70E740481C1C}">
+                <a14:useLocalDpi xmlns:a14="http://schemas.microsoft.com/office/drawing/2010/main" val="0"/>
+              </a:ext>
+            </a:extLst>
+          </a:blip>
+          <a:srcRect/>
           <a:stretch>
             <a:fillRect/>
           </a:stretch>
         </p:blipFill>
-        <p:spPr>
-          <a:xfrm>
-            <a:off x="6873514" y="1490690"/>
-            <a:ext cx="4523624" cy="2505673"/>
+        <p:spPr bwMode="auto">
+          <a:xfrm>
+            <a:off x="3934354" y="1149442"/>
+            <a:ext cx="4314825" cy="4245677"/>
           </a:xfrm>
           <a:prstGeom prst="rect">
             <a:avLst/>
           </a:prstGeom>
+          <a:noFill/>
+          <a:extLst>
+            <a:ext uri="{909E8E84-426E-40DD-AFC4-6F175D3DCCD1}">
+              <a14:hiddenFill xmlns:a14="http://schemas.microsoft.com/office/drawing/2010/main">
+                <a:solidFill>
+                  <a:srgbClr val="FFFFFF"/>
+                </a:solidFill>
+              </a14:hiddenFill>
+            </a:ext>
+          </a:extLst>
         </p:spPr>
       </p:pic>
     </p:spTree>
     <p:extLst>
       <p:ext uri="{BB962C8B-B14F-4D97-AF65-F5344CB8AC3E}">
-        <p14:creationId xmlns:p14="http://schemas.microsoft.com/office/powerpoint/2010/main" val="2041235494"/>
+        <p14:creationId xmlns:p14="http://schemas.microsoft.com/office/powerpoint/2010/main" val="225129571"/>
       </p:ext>
     </p:extLst>
   </p:cSld>
@@ -10370,26 +13548,67 @@
           <a:p>
             <a:r>
               <a:rPr lang="en-US" dirty="0"/>
-              <a:t>Error Propagation</a:t>
-            </a:r>
-          </a:p>
-          <a:p>
+              <a:t>Error propagation</a:t>
+            </a:r>
+          </a:p>
+          <a:p>
+            <a:pPr lvl="1"/>
+            <a:r>
+              <a:rPr lang="en-US" dirty="0"/>
+              <a:t>Merge Error order</a:t>
+            </a:r>
+          </a:p>
+          <a:p>
+            <a:r>
+              <a:rPr lang="en-US" dirty="0"/>
+              <a:t>Unreported errors</a:t>
+            </a:r>
+          </a:p>
+          <a:p>
+            <a:pPr lvl="1"/>
             <a:r>
               <a:rPr lang="en-US" dirty="0"/>
               <a:t>Unwired errors</a:t>
             </a:r>
           </a:p>
           <a:p>
-            <a:r>
-              <a:rPr lang="en-US" dirty="0"/>
-              <a:t>Unreported errors</a:t>
-            </a:r>
-          </a:p>
-          <a:p>
             <a:endParaRPr lang="en-US" dirty="0"/>
           </a:p>
-        </p:txBody>
-      </p:sp>
+          <a:p>
+            <a:endParaRPr lang="en-US" dirty="0"/>
+          </a:p>
+        </p:txBody>
+      </p:sp>
+      <p:pic>
+        <p:nvPicPr>
+          <p:cNvPr id="5" name="Picture 4">
+            <a:extLst>
+              <a:ext uri="{FF2B5EF4-FFF2-40B4-BE49-F238E27FC236}">
+                <a16:creationId xmlns:a16="http://schemas.microsoft.com/office/drawing/2014/main" id="{2BF6A581-9AF1-4CC6-9826-F242AD79FE91}"/>
+              </a:ext>
+            </a:extLst>
+          </p:cNvPr>
+          <p:cNvPicPr>
+            <a:picLocks noChangeAspect="1"/>
+          </p:cNvPicPr>
+          <p:nvPr/>
+        </p:nvPicPr>
+        <p:blipFill>
+          <a:blip r:embed="rId2"/>
+          <a:stretch>
+            <a:fillRect/>
+          </a:stretch>
+        </p:blipFill>
+        <p:spPr>
+          <a:xfrm>
+            <a:off x="6015037" y="1738313"/>
+            <a:ext cx="4943475" cy="2895600"/>
+          </a:xfrm>
+          <a:prstGeom prst="rect">
+            <a:avLst/>
+          </a:prstGeom>
+        </p:spPr>
+      </p:pic>
     </p:spTree>
     <p:extLst>
       <p:ext uri="{BB962C8B-B14F-4D97-AF65-F5344CB8AC3E}">

</xml_diff>